<commit_message>
adding content to quantization-based slide
</commit_message>
<xml_diff>
--- a/slides/aaai19-tutorial.pptx
+++ b/slides/aaai19-tutorial.pptx
@@ -280,7 +280,7 @@
           <a:p>
             <a:fld id="{D6B7C6C1-58CA-4905-AEDC-9C13740575B8}" type="datetimeFigureOut">
               <a:rPr lang="en-SG" smtClean="0"/>
-              <a:t>1/1/19</a:t>
+              <a:t>2/1/2019</a:t>
             </a:fld>
             <a:endParaRPr lang="en-SG"/>
           </a:p>
@@ -5651,7 +5651,7 @@
                               <a:solidFill>
                                 <a:srgbClr val="002060"/>
                               </a:solidFill>
-                              <a:latin typeface="Cambria Math" charset="0"/>
+                              <a:latin typeface="Cambria Math" panose="02040503050406030204" pitchFamily="18" charset="0"/>
                               <a:cs typeface="Times New Roman" panose="02020603050405020304" pitchFamily="18" charset="0"/>
                             </a:rPr>
                           </m:ctrlPr>
@@ -5679,7 +5679,7 @@
                                   <a:solidFill>
                                     <a:srgbClr val="002060"/>
                                   </a:solidFill>
-                                  <a:latin typeface="Cambria Math" charset="0"/>
+                                  <a:latin typeface="Cambria Math" panose="02040503050406030204" pitchFamily="18" charset="0"/>
                                   <a:cs typeface="Times New Roman" panose="02020603050405020304" pitchFamily="18" charset="0"/>
                                 </a:rPr>
                               </m:ctrlPr>
@@ -5692,7 +5692,7 @@
                                       <a:solidFill>
                                         <a:srgbClr val="002060"/>
                                       </a:solidFill>
-                                      <a:latin typeface="Cambria Math" charset="0"/>
+                                      <a:latin typeface="Cambria Math" panose="02040503050406030204" pitchFamily="18" charset="0"/>
                                       <a:cs typeface="Times New Roman" panose="02020603050405020304" pitchFamily="18" charset="0"/>
                                     </a:rPr>
                                   </m:ctrlPr>
@@ -5764,7 +5764,7 @@
                                       <a:solidFill>
                                         <a:srgbClr val="002060"/>
                                       </a:solidFill>
-                                      <a:latin typeface="Cambria Math" charset="0"/>
+                                      <a:latin typeface="Cambria Math" panose="02040503050406030204" pitchFamily="18" charset="0"/>
                                       <a:cs typeface="Times New Roman" panose="02020603050405020304" pitchFamily="18" charset="0"/>
                                     </a:rPr>
                                   </m:ctrlPr>
@@ -5813,7 +5813,7 @@
                                       <a:solidFill>
                                         <a:srgbClr val="002060"/>
                                       </a:solidFill>
-                                      <a:latin typeface="Cambria Math" charset="0"/>
+                                      <a:latin typeface="Cambria Math" panose="02040503050406030204" pitchFamily="18" charset="0"/>
                                       <a:cs typeface="Times New Roman" panose="02020603050405020304" pitchFamily="18" charset="0"/>
                                     </a:rPr>
                                   </m:ctrlPr>
@@ -5953,7 +5953,7 @@
                       <m:sSubPr>
                         <m:ctrlPr>
                           <a:rPr lang="en-US" sz="3200" i="1">
-                            <a:latin typeface="Cambria Math" charset="0"/>
+                            <a:latin typeface="Cambria Math" panose="02040503050406030204" pitchFamily="18" charset="0"/>
                             <a:cs typeface="Times New Roman" panose="02020603050405020304" pitchFamily="18" charset="0"/>
                           </a:rPr>
                         </m:ctrlPr>
@@ -6330,7 +6330,7 @@
                               <a:solidFill>
                                 <a:srgbClr val="002060"/>
                               </a:solidFill>
-                              <a:latin typeface="Cambria Math" charset="0"/>
+                              <a:latin typeface="Cambria Math" panose="02040503050406030204" pitchFamily="18" charset="0"/>
                               <a:cs typeface="Times New Roman" panose="02020603050405020304" pitchFamily="18" charset="0"/>
                             </a:rPr>
                           </m:ctrlPr>
@@ -6358,7 +6358,7 @@
                                   <a:solidFill>
                                     <a:srgbClr val="002060"/>
                                   </a:solidFill>
-                                  <a:latin typeface="Cambria Math" charset="0"/>
+                                  <a:latin typeface="Cambria Math" panose="02040503050406030204" pitchFamily="18" charset="0"/>
                                   <a:cs typeface="Times New Roman" panose="02020603050405020304" pitchFamily="18" charset="0"/>
                                 </a:rPr>
                               </m:ctrlPr>
@@ -6371,7 +6371,7 @@
                                       <a:solidFill>
                                         <a:srgbClr val="002060"/>
                                       </a:solidFill>
-                                      <a:latin typeface="Cambria Math" charset="0"/>
+                                      <a:latin typeface="Cambria Math" panose="02040503050406030204" pitchFamily="18" charset="0"/>
                                       <a:cs typeface="Times New Roman" panose="02020603050405020304" pitchFamily="18" charset="0"/>
                                     </a:rPr>
                                   </m:ctrlPr>
@@ -6456,7 +6456,7 @@
                                       <a:solidFill>
                                         <a:srgbClr val="002060"/>
                                       </a:solidFill>
-                                      <a:latin typeface="Cambria Math" charset="0"/>
+                                      <a:latin typeface="Cambria Math" panose="02040503050406030204" pitchFamily="18" charset="0"/>
                                       <a:cs typeface="Times New Roman" panose="02020603050405020304" pitchFamily="18" charset="0"/>
                                     </a:rPr>
                                   </m:ctrlPr>
@@ -6471,7 +6471,7 @@
                                           <a:solidFill>
                                             <a:srgbClr val="002060"/>
                                           </a:solidFill>
-                                          <a:latin typeface="Cambria Math" charset="0"/>
+                                          <a:latin typeface="Cambria Math" panose="02040503050406030204" pitchFamily="18" charset="0"/>
                                           <a:cs typeface="Times New Roman" panose="02020603050405020304" pitchFamily="18" charset="0"/>
                                         </a:rPr>
                                       </m:ctrlPr>
@@ -6486,7 +6486,7 @@
                                               <a:solidFill>
                                                 <a:srgbClr val="002060"/>
                                               </a:solidFill>
-                                              <a:latin typeface="Cambria Math" charset="0"/>
+                                              <a:latin typeface="Cambria Math" panose="02040503050406030204" pitchFamily="18" charset="0"/>
                                               <a:cs typeface="Times New Roman" panose="02020603050405020304" pitchFamily="18" charset="0"/>
                                             </a:rPr>
                                           </m:ctrlPr>
@@ -6499,7 +6499,7 @@
                                                   <a:solidFill>
                                                     <a:srgbClr val="002060"/>
                                                   </a:solidFill>
-                                                  <a:latin typeface="Cambria Math" charset="0"/>
+                                                  <a:latin typeface="Cambria Math" panose="02040503050406030204" pitchFamily="18" charset="0"/>
                                                   <a:cs typeface="Times New Roman" panose="02020603050405020304" pitchFamily="18" charset="0"/>
                                                 </a:rPr>
                                               </m:ctrlPr>
@@ -6546,7 +6546,7 @@
                                                   <a:solidFill>
                                                     <a:srgbClr val="002060"/>
                                                   </a:solidFill>
-                                                  <a:latin typeface="Cambria Math" charset="0"/>
+                                                  <a:latin typeface="Cambria Math" panose="02040503050406030204" pitchFamily="18" charset="0"/>
                                                   <a:cs typeface="Times New Roman" panose="02020603050405020304" pitchFamily="18" charset="0"/>
                                                 </a:rPr>
                                               </m:ctrlPr>
@@ -6615,7 +6615,7 @@
                               <a:solidFill>
                                 <a:srgbClr val="002060"/>
                               </a:solidFill>
-                              <a:latin typeface="Cambria Math" charset="0"/>
+                              <a:latin typeface="Cambria Math" panose="02040503050406030204" pitchFamily="18" charset="0"/>
                               <a:cs typeface="Times New Roman" panose="02020603050405020304" pitchFamily="18" charset="0"/>
                             </a:rPr>
                           </m:ctrlPr>
@@ -6643,7 +6643,7 @@
                                   <a:solidFill>
                                     <a:srgbClr val="002060"/>
                                   </a:solidFill>
-                                  <a:latin typeface="Cambria Math" charset="0"/>
+                                  <a:latin typeface="Cambria Math" panose="02040503050406030204" pitchFamily="18" charset="0"/>
                                   <a:cs typeface="Times New Roman" panose="02020603050405020304" pitchFamily="18" charset="0"/>
                                 </a:rPr>
                               </m:ctrlPr>
@@ -6656,7 +6656,7 @@
                                       <a:solidFill>
                                         <a:srgbClr val="002060"/>
                                       </a:solidFill>
-                                      <a:latin typeface="Cambria Math" charset="0"/>
+                                      <a:latin typeface="Cambria Math" panose="02040503050406030204" pitchFamily="18" charset="0"/>
                                       <a:cs typeface="Times New Roman" panose="02020603050405020304" pitchFamily="18" charset="0"/>
                                     </a:rPr>
                                   </m:ctrlPr>
@@ -6741,7 +6741,7 @@
                                       <a:solidFill>
                                         <a:srgbClr val="002060"/>
                                       </a:solidFill>
-                                      <a:latin typeface="Cambria Math" charset="0"/>
+                                      <a:latin typeface="Cambria Math" panose="02040503050406030204" pitchFamily="18" charset="0"/>
                                       <a:cs typeface="Times New Roman" panose="02020603050405020304" pitchFamily="18" charset="0"/>
                                     </a:rPr>
                                   </m:ctrlPr>
@@ -6754,7 +6754,7 @@
                                           <a:solidFill>
                                             <a:srgbClr val="002060"/>
                                           </a:solidFill>
-                                          <a:latin typeface="Cambria Math" charset="0"/>
+                                          <a:latin typeface="Cambria Math" panose="02040503050406030204" pitchFamily="18" charset="0"/>
                                           <a:cs typeface="Times New Roman" panose="02020603050405020304" pitchFamily="18" charset="0"/>
                                         </a:rPr>
                                       </m:ctrlPr>
@@ -6769,7 +6769,7 @@
                                               <a:solidFill>
                                                 <a:srgbClr val="002060"/>
                                               </a:solidFill>
-                                              <a:latin typeface="Cambria Math" charset="0"/>
+                                              <a:latin typeface="Cambria Math" panose="02040503050406030204" pitchFamily="18" charset="0"/>
                                               <a:cs typeface="Times New Roman" panose="02020603050405020304" pitchFamily="18" charset="0"/>
                                             </a:rPr>
                                           </m:ctrlPr>
@@ -6784,7 +6784,7 @@
                                                   <a:solidFill>
                                                     <a:srgbClr val="002060"/>
                                                   </a:solidFill>
-                                                  <a:latin typeface="Cambria Math" charset="0"/>
+                                                  <a:latin typeface="Cambria Math" panose="02040503050406030204" pitchFamily="18" charset="0"/>
                                                   <a:cs typeface="Times New Roman" panose="02020603050405020304" pitchFamily="18" charset="0"/>
                                                 </a:rPr>
                                               </m:ctrlPr>
@@ -6797,7 +6797,7 @@
                                                       <a:solidFill>
                                                         <a:srgbClr val="002060"/>
                                                       </a:solidFill>
-                                                      <a:latin typeface="Cambria Math" charset="0"/>
+                                                      <a:latin typeface="Cambria Math" panose="02040503050406030204" pitchFamily="18" charset="0"/>
                                                       <a:cs typeface="Times New Roman" panose="02020603050405020304" pitchFamily="18" charset="0"/>
                                                     </a:rPr>
                                                   </m:ctrlPr>
@@ -6874,7 +6874,7 @@
                                           <a:solidFill>
                                             <a:srgbClr val="002060"/>
                                           </a:solidFill>
-                                          <a:latin typeface="Cambria Math" charset="0"/>
+                                          <a:latin typeface="Cambria Math" panose="02040503050406030204" pitchFamily="18" charset="0"/>
                                           <a:cs typeface="Times New Roman" panose="02020603050405020304" pitchFamily="18" charset="0"/>
                                         </a:rPr>
                                       </m:ctrlPr>
@@ -6923,7 +6923,7 @@
                                           <a:solidFill>
                                             <a:srgbClr val="002060"/>
                                           </a:solidFill>
-                                          <a:latin typeface="Cambria Math" charset="0"/>
+                                          <a:latin typeface="Cambria Math" panose="02040503050406030204" pitchFamily="18" charset="0"/>
                                           <a:cs typeface="Times New Roman" panose="02020603050405020304" pitchFamily="18" charset="0"/>
                                         </a:rPr>
                                       </m:ctrlPr>
@@ -7051,7 +7051,7 @@
                             <a:solidFill>
                               <a:srgbClr val="002060"/>
                             </a:solidFill>
-                            <a:latin typeface="Cambria Math" charset="0"/>
+                            <a:latin typeface="Cambria Math" panose="02040503050406030204" pitchFamily="18" charset="0"/>
                             <a:cs typeface="Times New Roman" panose="02020603050405020304" pitchFamily="18" charset="0"/>
                           </a:rPr>
                         </m:ctrlPr>
@@ -7079,7 +7079,7 @@
                                 <a:solidFill>
                                   <a:srgbClr val="002060"/>
                                 </a:solidFill>
-                                <a:latin typeface="Cambria Math" charset="0"/>
+                                <a:latin typeface="Cambria Math" panose="02040503050406030204" pitchFamily="18" charset="0"/>
                                 <a:cs typeface="Times New Roman" panose="02020603050405020304" pitchFamily="18" charset="0"/>
                               </a:rPr>
                             </m:ctrlPr>
@@ -7092,7 +7092,7 @@
                                     <a:solidFill>
                                       <a:srgbClr val="002060"/>
                                     </a:solidFill>
-                                    <a:latin typeface="Cambria Math" charset="0"/>
+                                    <a:latin typeface="Cambria Math" panose="02040503050406030204" pitchFamily="18" charset="0"/>
                                     <a:cs typeface="Times New Roman" panose="02020603050405020304" pitchFamily="18" charset="0"/>
                                   </a:rPr>
                                 </m:ctrlPr>
@@ -7164,7 +7164,7 @@
                                     <a:solidFill>
                                       <a:srgbClr val="002060"/>
                                     </a:solidFill>
-                                    <a:latin typeface="Cambria Math" charset="0"/>
+                                    <a:latin typeface="Cambria Math" panose="02040503050406030204" pitchFamily="18" charset="0"/>
                                     <a:cs typeface="Times New Roman" panose="02020603050405020304" pitchFamily="18" charset="0"/>
                                   </a:rPr>
                                 </m:ctrlPr>
@@ -7213,7 +7213,7 @@
                                     <a:solidFill>
                                       <a:srgbClr val="002060"/>
                                     </a:solidFill>
-                                    <a:latin typeface="Cambria Math" charset="0"/>
+                                    <a:latin typeface="Cambria Math" panose="02040503050406030204" pitchFamily="18" charset="0"/>
                                     <a:cs typeface="Times New Roman" panose="02020603050405020304" pitchFamily="18" charset="0"/>
                                   </a:rPr>
                                 </m:ctrlPr>
@@ -7833,7 +7833,7 @@
                         <m:sSubPr>
                           <m:ctrlPr>
                             <a:rPr lang="en-US" b="1" i="1" smtClean="0">
-                              <a:latin typeface="Cambria Math" charset="0"/>
+                              <a:latin typeface="Cambria Math" panose="02040503050406030204" pitchFamily="18" charset="0"/>
                             </a:rPr>
                           </m:ctrlPr>
                         </m:sSubPr>
@@ -7966,7 +7966,7 @@
                         <m:sSubPr>
                           <m:ctrlPr>
                             <a:rPr lang="en-US" b="1" i="1" smtClean="0">
-                              <a:latin typeface="Cambria Math" charset="0"/>
+                              <a:latin typeface="Cambria Math" panose="02040503050406030204" pitchFamily="18" charset="0"/>
                             </a:rPr>
                           </m:ctrlPr>
                         </m:sSubPr>
@@ -8099,7 +8099,7 @@
                         <m:sSubPr>
                           <m:ctrlPr>
                             <a:rPr lang="en-US" b="1" i="1" smtClean="0">
-                              <a:latin typeface="Cambria Math" charset="0"/>
+                              <a:latin typeface="Cambria Math" panose="02040503050406030204" pitchFamily="18" charset="0"/>
                             </a:rPr>
                           </m:ctrlPr>
                         </m:sSubPr>
@@ -8247,7 +8247,7 @@
                               <a:solidFill>
                                 <a:srgbClr val="002060"/>
                               </a:solidFill>
-                              <a:latin typeface="Cambria Math" charset="0"/>
+                              <a:latin typeface="Cambria Math" panose="02040503050406030204" pitchFamily="18" charset="0"/>
                             </a:rPr>
                           </m:ctrlPr>
                         </m:sSubPr>
@@ -8290,7 +8290,7 @@
                               <a:solidFill>
                                 <a:srgbClr val="002060"/>
                               </a:solidFill>
-                              <a:latin typeface="Cambria Math" charset="0"/>
+                              <a:latin typeface="Cambria Math" panose="02040503050406030204" pitchFamily="18" charset="0"/>
                             </a:rPr>
                           </m:ctrlPr>
                         </m:sSubSupPr>
@@ -8398,7 +8398,7 @@
                               <a:solidFill>
                                 <a:srgbClr val="002060"/>
                               </a:solidFill>
-                              <a:latin typeface="Cambria Math" charset="0"/>
+                              <a:latin typeface="Cambria Math" panose="02040503050406030204" pitchFamily="18" charset="0"/>
                             </a:rPr>
                           </m:ctrlPr>
                         </m:sSubPr>
@@ -8441,7 +8441,7 @@
                               <a:solidFill>
                                 <a:srgbClr val="002060"/>
                               </a:solidFill>
-                              <a:latin typeface="Cambria Math" charset="0"/>
+                              <a:latin typeface="Cambria Math" panose="02040503050406030204" pitchFamily="18" charset="0"/>
                             </a:rPr>
                           </m:ctrlPr>
                         </m:sSubSupPr>
@@ -8512,7 +8512,7 @@
                               <a:solidFill>
                                 <a:srgbClr val="002060"/>
                               </a:solidFill>
-                              <a:latin typeface="Cambria Math" charset="0"/>
+                              <a:latin typeface="Cambria Math" panose="02040503050406030204" pitchFamily="18" charset="0"/>
                             </a:rPr>
                           </m:ctrlPr>
                         </m:dPr>
@@ -8526,7 +8526,7 @@
                                   <a:solidFill>
                                     <a:srgbClr val="002060"/>
                                   </a:solidFill>
-                                  <a:latin typeface="Cambria Math" charset="0"/>
+                                  <a:latin typeface="Cambria Math" panose="02040503050406030204" pitchFamily="18" charset="0"/>
                                 </a:rPr>
                               </m:ctrlPr>
                             </m:dPr>
@@ -8538,7 +8538,7 @@
                                       <a:solidFill>
                                         <a:srgbClr val="002060"/>
                                       </a:solidFill>
-                                      <a:latin typeface="Cambria Math" charset="0"/>
+                                      <a:latin typeface="Cambria Math" panose="02040503050406030204" pitchFamily="18" charset="0"/>
                                     </a:rPr>
                                   </m:ctrlPr>
                                 </m:sSubPr>
@@ -8581,7 +8581,7 @@
                                       <a:solidFill>
                                         <a:srgbClr val="002060"/>
                                       </a:solidFill>
-                                      <a:latin typeface="Cambria Math" charset="0"/>
+                                      <a:latin typeface="Cambria Math" panose="02040503050406030204" pitchFamily="18" charset="0"/>
                                     </a:rPr>
                                   </m:ctrlPr>
                                 </m:sSubPr>
@@ -8684,7 +8684,7 @@
                               <a:solidFill>
                                 <a:srgbClr val="002060"/>
                               </a:solidFill>
-                              <a:latin typeface="Cambria Math" charset="0"/>
+                              <a:latin typeface="Cambria Math" panose="02040503050406030204" pitchFamily="18" charset="0"/>
                             </a:rPr>
                           </m:ctrlPr>
                         </m:dPr>
@@ -8698,7 +8698,7 @@
                                   <a:solidFill>
                                     <a:srgbClr val="002060"/>
                                   </a:solidFill>
-                                  <a:latin typeface="Cambria Math" charset="0"/>
+                                  <a:latin typeface="Cambria Math" panose="02040503050406030204" pitchFamily="18" charset="0"/>
                                 </a:rPr>
                               </m:ctrlPr>
                             </m:dPr>
@@ -8710,7 +8710,7 @@
                                       <a:solidFill>
                                         <a:srgbClr val="002060"/>
                                       </a:solidFill>
-                                      <a:latin typeface="Cambria Math" charset="0"/>
+                                      <a:latin typeface="Cambria Math" panose="02040503050406030204" pitchFamily="18" charset="0"/>
                                     </a:rPr>
                                   </m:ctrlPr>
                                 </m:sSubPr>
@@ -8753,7 +8753,7 @@
                                       <a:solidFill>
                                         <a:srgbClr val="002060"/>
                                       </a:solidFill>
-                                      <a:latin typeface="Cambria Math" charset="0"/>
+                                      <a:latin typeface="Cambria Math" panose="02040503050406030204" pitchFamily="18" charset="0"/>
                                     </a:rPr>
                                   </m:ctrlPr>
                                 </m:sSubPr>
@@ -8818,7 +8818,7 @@
                             <a:solidFill>
                               <a:srgbClr val="002060"/>
                             </a:solidFill>
-                            <a:latin typeface="Cambria Math" charset="0"/>
+                            <a:latin typeface="Cambria Math" panose="02040503050406030204" pitchFamily="18" charset="0"/>
                           </a:rPr>
                         </m:ctrlPr>
                       </m:fPr>
@@ -8830,7 +8830,7 @@
                                 <a:solidFill>
                                   <a:srgbClr val="002060"/>
                                 </a:solidFill>
-                                <a:latin typeface="Cambria Math" charset="0"/>
+                                <a:latin typeface="Cambria Math" panose="02040503050406030204" pitchFamily="18" charset="0"/>
                               </a:rPr>
                             </m:ctrlPr>
                           </m:sSubPr>
@@ -8873,7 +8873,7 @@
                                 <a:solidFill>
                                   <a:srgbClr val="002060"/>
                                 </a:solidFill>
-                                <a:latin typeface="Cambria Math" charset="0"/>
+                                <a:latin typeface="Cambria Math" panose="02040503050406030204" pitchFamily="18" charset="0"/>
                               </a:rPr>
                             </m:ctrlPr>
                           </m:sSubSupPr>
@@ -8922,7 +8922,7 @@
                                 <a:solidFill>
                                   <a:srgbClr val="002060"/>
                                 </a:solidFill>
-                                <a:latin typeface="Cambria Math" charset="0"/>
+                                <a:latin typeface="Cambria Math" panose="02040503050406030204" pitchFamily="18" charset="0"/>
                               </a:rPr>
                             </m:ctrlPr>
                           </m:dPr>
@@ -8936,7 +8936,7 @@
                                     <a:solidFill>
                                       <a:srgbClr val="002060"/>
                                     </a:solidFill>
-                                    <a:latin typeface="Cambria Math" charset="0"/>
+                                    <a:latin typeface="Cambria Math" panose="02040503050406030204" pitchFamily="18" charset="0"/>
                                   </a:rPr>
                                 </m:ctrlPr>
                               </m:dPr>
@@ -8948,7 +8948,7 @@
                                         <a:solidFill>
                                           <a:srgbClr val="002060"/>
                                         </a:solidFill>
-                                        <a:latin typeface="Cambria Math" charset="0"/>
+                                        <a:latin typeface="Cambria Math" panose="02040503050406030204" pitchFamily="18" charset="0"/>
                                       </a:rPr>
                                     </m:ctrlPr>
                                   </m:sSubPr>
@@ -8997,7 +8997,7 @@
                                 <a:solidFill>
                                   <a:srgbClr val="002060"/>
                                 </a:solidFill>
-                                <a:latin typeface="Cambria Math" charset="0"/>
+                                <a:latin typeface="Cambria Math" panose="02040503050406030204" pitchFamily="18" charset="0"/>
                               </a:rPr>
                             </m:ctrlPr>
                           </m:dPr>
@@ -9011,7 +9011,7 @@
                                     <a:solidFill>
                                       <a:srgbClr val="002060"/>
                                     </a:solidFill>
-                                    <a:latin typeface="Cambria Math" charset="0"/>
+                                    <a:latin typeface="Cambria Math" panose="02040503050406030204" pitchFamily="18" charset="0"/>
                                   </a:rPr>
                                 </m:ctrlPr>
                               </m:dPr>
@@ -9023,7 +9023,7 @@
                                         <a:solidFill>
                                           <a:srgbClr val="002060"/>
                                         </a:solidFill>
-                                        <a:latin typeface="Cambria Math" charset="0"/>
+                                        <a:latin typeface="Cambria Math" panose="02040503050406030204" pitchFamily="18" charset="0"/>
                                       </a:rPr>
                                     </m:ctrlPr>
                                   </m:sSubPr>
@@ -9144,7 +9144,7 @@
                             <a:solidFill>
                               <a:srgbClr val="002060"/>
                             </a:solidFill>
-                            <a:latin typeface="Cambria Math" charset="0"/>
+                            <a:latin typeface="Cambria Math" panose="02040503050406030204" pitchFamily="18" charset="0"/>
                           </a:rPr>
                         </m:ctrlPr>
                       </m:fPr>
@@ -9156,7 +9156,7 @@
                                 <a:solidFill>
                                   <a:srgbClr val="002060"/>
                                 </a:solidFill>
-                                <a:latin typeface="Cambria Math" charset="0"/>
+                                <a:latin typeface="Cambria Math" panose="02040503050406030204" pitchFamily="18" charset="0"/>
                               </a:rPr>
                             </m:ctrlPr>
                           </m:sSubPr>
@@ -9199,7 +9199,7 @@
                                 <a:solidFill>
                                   <a:srgbClr val="002060"/>
                                 </a:solidFill>
-                                <a:latin typeface="Cambria Math" charset="0"/>
+                                <a:latin typeface="Cambria Math" panose="02040503050406030204" pitchFamily="18" charset="0"/>
                               </a:rPr>
                             </m:ctrlPr>
                           </m:sSubSupPr>
@@ -9248,7 +9248,7 @@
                                 <a:solidFill>
                                   <a:srgbClr val="002060"/>
                                 </a:solidFill>
-                                <a:latin typeface="Cambria Math" charset="0"/>
+                                <a:latin typeface="Cambria Math" panose="02040503050406030204" pitchFamily="18" charset="0"/>
                               </a:rPr>
                             </m:ctrlPr>
                           </m:dPr>
@@ -9262,7 +9262,7 @@
                                     <a:solidFill>
                                       <a:srgbClr val="002060"/>
                                     </a:solidFill>
-                                    <a:latin typeface="Cambria Math" charset="0"/>
+                                    <a:latin typeface="Cambria Math" panose="02040503050406030204" pitchFamily="18" charset="0"/>
                                   </a:rPr>
                                 </m:ctrlPr>
                               </m:dPr>
@@ -9274,7 +9274,7 @@
                                         <a:solidFill>
                                           <a:srgbClr val="002060"/>
                                         </a:solidFill>
-                                        <a:latin typeface="Cambria Math" charset="0"/>
+                                        <a:latin typeface="Cambria Math" panose="02040503050406030204" pitchFamily="18" charset="0"/>
                                       </a:rPr>
                                     </m:ctrlPr>
                                   </m:sSubPr>
@@ -9323,7 +9323,7 @@
                                 <a:solidFill>
                                   <a:srgbClr val="002060"/>
                                 </a:solidFill>
-                                <a:latin typeface="Cambria Math" charset="0"/>
+                                <a:latin typeface="Cambria Math" panose="02040503050406030204" pitchFamily="18" charset="0"/>
                               </a:rPr>
                             </m:ctrlPr>
                           </m:dPr>
@@ -9337,7 +9337,7 @@
                                     <a:solidFill>
                                       <a:srgbClr val="002060"/>
                                     </a:solidFill>
-                                    <a:latin typeface="Cambria Math" charset="0"/>
+                                    <a:latin typeface="Cambria Math" panose="02040503050406030204" pitchFamily="18" charset="0"/>
                                   </a:rPr>
                                 </m:ctrlPr>
                               </m:dPr>
@@ -9349,7 +9349,7 @@
                                         <a:solidFill>
                                           <a:srgbClr val="002060"/>
                                         </a:solidFill>
-                                        <a:latin typeface="Cambria Math" charset="0"/>
+                                        <a:latin typeface="Cambria Math" panose="02040503050406030204" pitchFamily="18" charset="0"/>
                                       </a:rPr>
                                     </m:ctrlPr>
                                   </m:sSubPr>
@@ -9786,7 +9786,7 @@
         </p:nvSpPr>
         <p:spPr>
           <a:xfrm>
-            <a:off x="381000" y="287978"/>
+            <a:off x="152400" y="287978"/>
             <a:ext cx="6553200" cy="523220"/>
           </a:xfrm>
         </p:spPr>
@@ -9916,7 +9916,7 @@
                         <m:sSubSupPr>
                           <m:ctrlPr>
                             <a:rPr lang="en-US" b="0" i="1" smtClean="0">
-                              <a:latin typeface="Cambria Math" charset="0"/>
+                              <a:latin typeface="Cambria Math" panose="02040503050406030204" pitchFamily="18" charset="0"/>
                             </a:rPr>
                           </m:ctrlPr>
                         </m:sSubSupPr>
@@ -9953,7 +9953,7 @@
                             <m:sSubPr>
                               <m:ctrlPr>
                                 <a:rPr lang="en-US" b="0" i="1" smtClean="0">
-                                  <a:latin typeface="Cambria Math" charset="0"/>
+                                  <a:latin typeface="Cambria Math" panose="02040503050406030204" pitchFamily="18" charset="0"/>
                                 </a:rPr>
                               </m:ctrlPr>
                             </m:sSubPr>
@@ -9988,7 +9988,7 @@
                           <m:endChr m:val="⌋"/>
                           <m:ctrlPr>
                             <a:rPr lang="en-US" b="0" i="1" smtClean="0">
-                              <a:latin typeface="Cambria Math" charset="0"/>
+                              <a:latin typeface="Cambria Math" panose="02040503050406030204" pitchFamily="18" charset="0"/>
                             </a:rPr>
                           </m:ctrlPr>
                         </m:dPr>
@@ -9997,7 +9997,7 @@
                             <m:fPr>
                               <m:ctrlPr>
                                 <a:rPr lang="en-US" b="0" i="1" smtClean="0">
-                                  <a:latin typeface="Cambria Math" charset="0"/>
+                                  <a:latin typeface="Cambria Math" panose="02040503050406030204" pitchFamily="18" charset="0"/>
                                 </a:rPr>
                               </m:ctrlPr>
                             </m:fPr>
@@ -10006,7 +10006,7 @@
                                 <m:sSupPr>
                                   <m:ctrlPr>
                                     <a:rPr lang="en-US" b="0" i="1" smtClean="0">
-                                      <a:latin typeface="Cambria Math" charset="0"/>
+                                      <a:latin typeface="Cambria Math" panose="02040503050406030204" pitchFamily="18" charset="0"/>
                                     </a:rPr>
                                   </m:ctrlPr>
                                 </m:sSupPr>
@@ -10139,7 +10139,7 @@
                         <m:sSubPr>
                           <m:ctrlPr>
                             <a:rPr lang="en-US" b="0" i="1" smtClean="0">
-                              <a:latin typeface="Cambria Math" charset="0"/>
+                              <a:latin typeface="Cambria Math" panose="02040503050406030204" pitchFamily="18" charset="0"/>
                             </a:rPr>
                           </m:ctrlPr>
                         </m:sSubPr>
@@ -10176,7 +10176,7 @@
                         <m:dPr>
                           <m:ctrlPr>
                             <a:rPr lang="en-US" b="0" i="1" smtClean="0">
-                              <a:latin typeface="Cambria Math" charset="0"/>
+                              <a:latin typeface="Cambria Math" panose="02040503050406030204" pitchFamily="18" charset="0"/>
                             </a:rPr>
                           </m:ctrlPr>
                         </m:dPr>
@@ -10224,7 +10224,7 @@
                         <m:dPr>
                           <m:ctrlPr>
                             <a:rPr lang="en-US" i="1">
-                              <a:latin typeface="Cambria Math" charset="0"/>
+                              <a:latin typeface="Cambria Math" panose="02040503050406030204" pitchFamily="18" charset="0"/>
                             </a:rPr>
                           </m:ctrlPr>
                         </m:dPr>
@@ -10339,7 +10339,7 @@
         </p:nvSpPr>
         <p:spPr>
           <a:xfrm>
-            <a:off x="76200" y="259377"/>
+            <a:off x="76200" y="314980"/>
             <a:ext cx="7315200" cy="523220"/>
           </a:xfrm>
         </p:spPr>
@@ -10795,7 +10795,7 @@
                               <a:effectLst/>
                               <a:uLnTx/>
                               <a:uFillTx/>
-                              <a:latin typeface="Cambria Math" charset="0"/>
+                              <a:latin typeface="Cambria Math" panose="02040503050406030204" pitchFamily="18" charset="0"/>
                               <a:ea typeface="+mn-ea"/>
                               <a:cs typeface="+mn-cs"/>
                             </a:rPr>
@@ -10999,7 +10999,7 @@
                               <a:solidFill>
                                 <a:prstClr val="black"/>
                               </a:solidFill>
-                              <a:latin typeface="Cambria Math" charset="0"/>
+                              <a:latin typeface="Cambria Math" panose="02040503050406030204" pitchFamily="18" charset="0"/>
                             </a:rPr>
                           </m:ctrlPr>
                         </m:sSubPr>
@@ -13004,7 +13004,7 @@
                                 <a:effectLst/>
                                 <a:uLnTx/>
                                 <a:uFillTx/>
-                                <a:latin typeface="Cambria Math" charset="0"/>
+                                <a:latin typeface="Cambria Math" panose="02040503050406030204" pitchFamily="18" charset="0"/>
                                 <a:ea typeface="+mn-ea"/>
                                 <a:cs typeface="+mn-cs"/>
                               </a:rPr>
@@ -13156,7 +13156,7 @@
                               <a:solidFill>
                                 <a:prstClr val="black"/>
                               </a:solidFill>
-                              <a:latin typeface="Cambria Math" charset="0"/>
+                              <a:latin typeface="Cambria Math" panose="02040503050406030204" pitchFamily="18" charset="0"/>
                             </a:rPr>
                           </m:ctrlPr>
                         </m:sSubPr>
@@ -13883,7 +13883,7 @@
                               <a:solidFill>
                                 <a:srgbClr val="002060"/>
                               </a:solidFill>
-                              <a:latin typeface="Cambria Math" charset="0"/>
+                              <a:latin typeface="Cambria Math" panose="02040503050406030204" pitchFamily="18" charset="0"/>
                               <a:cs typeface="Times New Roman" panose="02020603050405020304" pitchFamily="18" charset="0"/>
                             </a:rPr>
                           </m:ctrlPr>
@@ -13898,7 +13898,7 @@
                                   <a:solidFill>
                                     <a:srgbClr val="002060"/>
                                   </a:solidFill>
-                                  <a:latin typeface="Cambria Math" charset="0"/>
+                                  <a:latin typeface="Cambria Math" panose="02040503050406030204" pitchFamily="18" charset="0"/>
                                   <a:cs typeface="Times New Roman" panose="02020603050405020304" pitchFamily="18" charset="0"/>
                                 </a:rPr>
                               </m:ctrlPr>
@@ -13911,7 +13911,7 @@
                                       <a:solidFill>
                                         <a:srgbClr val="002060"/>
                                       </a:solidFill>
-                                      <a:latin typeface="Cambria Math" charset="0"/>
+                                      <a:latin typeface="Cambria Math" panose="02040503050406030204" pitchFamily="18" charset="0"/>
                                       <a:cs typeface="Times New Roman" panose="02020603050405020304" pitchFamily="18" charset="0"/>
                                     </a:rPr>
                                   </m:ctrlPr>
@@ -13962,7 +13962,7 @@
                               <a:solidFill>
                                 <a:srgbClr val="002060"/>
                               </a:solidFill>
-                              <a:latin typeface="Cambria Math" charset="0"/>
+                              <a:latin typeface="Cambria Math" panose="02040503050406030204" pitchFamily="18" charset="0"/>
                               <a:cs typeface="Times New Roman" panose="02020603050405020304" pitchFamily="18" charset="0"/>
                             </a:rPr>
                           </m:ctrlPr>
@@ -14297,7 +14297,7 @@
                               <a:solidFill>
                                 <a:srgbClr val="002060"/>
                               </a:solidFill>
-                              <a:latin typeface="Cambria Math" charset="0"/>
+                              <a:latin typeface="Cambria Math" panose="02040503050406030204" pitchFamily="18" charset="0"/>
                               <a:cs typeface="Times New Roman" panose="02020603050405020304" pitchFamily="18" charset="0"/>
                             </a:rPr>
                           </m:ctrlPr>
@@ -14310,7 +14310,7 @@
                                   <a:solidFill>
                                     <a:srgbClr val="002060"/>
                                   </a:solidFill>
-                                  <a:latin typeface="Cambria Math" charset="0"/>
+                                  <a:latin typeface="Cambria Math" panose="02040503050406030204" pitchFamily="18" charset="0"/>
                                   <a:cs typeface="Times New Roman" panose="02020603050405020304" pitchFamily="18" charset="0"/>
                                 </a:rPr>
                               </m:ctrlPr>
@@ -14361,7 +14361,7 @@
                               <a:solidFill>
                                 <a:srgbClr val="002060"/>
                               </a:solidFill>
-                              <a:latin typeface="Cambria Math" charset="0"/>
+                              <a:latin typeface="Cambria Math" panose="02040503050406030204" pitchFamily="18" charset="0"/>
                               <a:cs typeface="Times New Roman" panose="02020603050405020304" pitchFamily="18" charset="0"/>
                             </a:rPr>
                           </m:ctrlPr>
@@ -14374,7 +14374,7 @@
                                   <a:solidFill>
                                     <a:srgbClr val="002060"/>
                                   </a:solidFill>
-                                  <a:latin typeface="Cambria Math" charset="0"/>
+                                  <a:latin typeface="Cambria Math" panose="02040503050406030204" pitchFamily="18" charset="0"/>
                                   <a:cs typeface="Times New Roman" panose="02020603050405020304" pitchFamily="18" charset="0"/>
                                 </a:rPr>
                               </m:ctrlPr>
@@ -14421,7 +14421,7 @@
                                   <a:solidFill>
                                     <a:srgbClr val="002060"/>
                                   </a:solidFill>
-                                  <a:latin typeface="Cambria Math" charset="0"/>
+                                  <a:latin typeface="Cambria Math" panose="02040503050406030204" pitchFamily="18" charset="0"/>
                                   <a:cs typeface="Times New Roman" panose="02020603050405020304" pitchFamily="18" charset="0"/>
                                 </a:rPr>
                               </m:ctrlPr>
@@ -14436,7 +14436,7 @@
                                       <a:solidFill>
                                         <a:srgbClr val="002060"/>
                                       </a:solidFill>
-                                      <a:latin typeface="Cambria Math" charset="0"/>
+                                      <a:latin typeface="Cambria Math" panose="02040503050406030204" pitchFamily="18" charset="0"/>
                                       <a:cs typeface="Times New Roman" panose="02020603050405020304" pitchFamily="18" charset="0"/>
                                     </a:rPr>
                                   </m:ctrlPr>
@@ -14451,7 +14451,7 @@
                                           <a:solidFill>
                                             <a:srgbClr val="002060"/>
                                           </a:solidFill>
-                                          <a:latin typeface="Cambria Math" charset="0"/>
+                                          <a:latin typeface="Cambria Math" panose="02040503050406030204" pitchFamily="18" charset="0"/>
                                           <a:cs typeface="Times New Roman" panose="02020603050405020304" pitchFamily="18" charset="0"/>
                                         </a:rPr>
                                       </m:ctrlPr>
@@ -14464,7 +14464,7 @@
                                               <a:solidFill>
                                                 <a:srgbClr val="002060"/>
                                               </a:solidFill>
-                                              <a:latin typeface="Cambria Math" charset="0"/>
+                                              <a:latin typeface="Cambria Math" panose="02040503050406030204" pitchFamily="18" charset="0"/>
                                               <a:cs typeface="Times New Roman" panose="02020603050405020304" pitchFamily="18" charset="0"/>
                                             </a:rPr>
                                           </m:ctrlPr>
@@ -14529,7 +14529,7 @@
                                   <a:solidFill>
                                     <a:srgbClr val="002060"/>
                                   </a:solidFill>
-                                  <a:latin typeface="Cambria Math" charset="0"/>
+                                  <a:latin typeface="Cambria Math" panose="02040503050406030204" pitchFamily="18" charset="0"/>
                                   <a:cs typeface="Times New Roman" panose="02020603050405020304" pitchFamily="18" charset="0"/>
                                 </a:rPr>
                               </m:ctrlPr>
@@ -14544,7 +14544,7 @@
                                       <a:solidFill>
                                         <a:srgbClr val="002060"/>
                                       </a:solidFill>
-                                      <a:latin typeface="Cambria Math" charset="0"/>
+                                      <a:latin typeface="Cambria Math" panose="02040503050406030204" pitchFamily="18" charset="0"/>
                                       <a:cs typeface="Times New Roman" panose="02020603050405020304" pitchFamily="18" charset="0"/>
                                     </a:rPr>
                                   </m:ctrlPr>
@@ -14559,7 +14559,7 @@
                                           <a:solidFill>
                                             <a:srgbClr val="002060"/>
                                           </a:solidFill>
-                                          <a:latin typeface="Cambria Math" charset="0"/>
+                                          <a:latin typeface="Cambria Math" panose="02040503050406030204" pitchFamily="18" charset="0"/>
                                           <a:cs typeface="Times New Roman" panose="02020603050405020304" pitchFamily="18" charset="0"/>
                                         </a:rPr>
                                       </m:ctrlPr>
@@ -14572,7 +14572,7 @@
                                               <a:solidFill>
                                                 <a:srgbClr val="002060"/>
                                               </a:solidFill>
-                                              <a:latin typeface="Cambria Math" charset="0"/>
+                                              <a:latin typeface="Cambria Math" panose="02040503050406030204" pitchFamily="18" charset="0"/>
                                               <a:cs typeface="Times New Roman" panose="02020603050405020304" pitchFamily="18" charset="0"/>
                                             </a:rPr>
                                           </m:ctrlPr>
@@ -14637,7 +14637,7 @@
                                   <a:solidFill>
                                     <a:srgbClr val="002060"/>
                                   </a:solidFill>
-                                  <a:latin typeface="Cambria Math" charset="0"/>
+                                  <a:latin typeface="Cambria Math" panose="02040503050406030204" pitchFamily="18" charset="0"/>
                                   <a:cs typeface="Times New Roman" panose="02020603050405020304" pitchFamily="18" charset="0"/>
                                 </a:rPr>
                               </m:ctrlPr>
@@ -14652,7 +14652,7 @@
                                       <a:solidFill>
                                         <a:srgbClr val="002060"/>
                                       </a:solidFill>
-                                      <a:latin typeface="Cambria Math" charset="0"/>
+                                      <a:latin typeface="Cambria Math" panose="02040503050406030204" pitchFamily="18" charset="0"/>
                                       <a:cs typeface="Times New Roman" panose="02020603050405020304" pitchFamily="18" charset="0"/>
                                     </a:rPr>
                                   </m:ctrlPr>
@@ -14667,7 +14667,7 @@
                                           <a:solidFill>
                                             <a:srgbClr val="002060"/>
                                           </a:solidFill>
-                                          <a:latin typeface="Cambria Math" charset="0"/>
+                                          <a:latin typeface="Cambria Math" panose="02040503050406030204" pitchFamily="18" charset="0"/>
                                           <a:cs typeface="Times New Roman" panose="02020603050405020304" pitchFamily="18" charset="0"/>
                                         </a:rPr>
                                       </m:ctrlPr>
@@ -14680,7 +14680,7 @@
                                               <a:solidFill>
                                                 <a:srgbClr val="002060"/>
                                               </a:solidFill>
-                                              <a:latin typeface="Cambria Math" charset="0"/>
+                                              <a:latin typeface="Cambria Math" panose="02040503050406030204" pitchFamily="18" charset="0"/>
                                               <a:cs typeface="Times New Roman" panose="02020603050405020304" pitchFamily="18" charset="0"/>
                                             </a:rPr>
                                           </m:ctrlPr>
@@ -14723,7 +14723,7 @@
                                       <a:solidFill>
                                         <a:srgbClr val="002060"/>
                                       </a:solidFill>
-                                      <a:latin typeface="Cambria Math" charset="0"/>
+                                      <a:latin typeface="Cambria Math" panose="02040503050406030204" pitchFamily="18" charset="0"/>
                                       <a:cs typeface="Times New Roman" panose="02020603050405020304" pitchFamily="18" charset="0"/>
                                     </a:rPr>
                                   </m:ctrlPr>
@@ -15075,7 +15075,7 @@
                               <a:solidFill>
                                 <a:srgbClr val="002060"/>
                               </a:solidFill>
-                              <a:latin typeface="Cambria Math" charset="0"/>
+                              <a:latin typeface="Cambria Math" panose="02040503050406030204" pitchFamily="18" charset="0"/>
                               <a:cs typeface="Times New Roman" panose="02020603050405020304" pitchFamily="18" charset="0"/>
                             </a:rPr>
                           </m:ctrlPr>
@@ -15088,7 +15088,7 @@
                                   <a:solidFill>
                                     <a:srgbClr val="002060"/>
                                   </a:solidFill>
-                                  <a:latin typeface="Cambria Math" charset="0"/>
+                                  <a:latin typeface="Cambria Math" panose="02040503050406030204" pitchFamily="18" charset="0"/>
                                   <a:cs typeface="Times New Roman" panose="02020603050405020304" pitchFamily="18" charset="0"/>
                                 </a:rPr>
                               </m:ctrlPr>
@@ -15139,7 +15139,7 @@
                               <a:solidFill>
                                 <a:srgbClr val="002060"/>
                               </a:solidFill>
-                              <a:latin typeface="Cambria Math" charset="0"/>
+                              <a:latin typeface="Cambria Math" panose="02040503050406030204" pitchFamily="18" charset="0"/>
                               <a:cs typeface="Times New Roman" panose="02020603050405020304" pitchFamily="18" charset="0"/>
                             </a:rPr>
                           </m:ctrlPr>
@@ -15152,7 +15152,7 @@
                                   <a:solidFill>
                                     <a:srgbClr val="002060"/>
                                   </a:solidFill>
-                                  <a:latin typeface="Cambria Math" charset="0"/>
+                                  <a:latin typeface="Cambria Math" panose="02040503050406030204" pitchFamily="18" charset="0"/>
                                   <a:cs typeface="Times New Roman" panose="02020603050405020304" pitchFamily="18" charset="0"/>
                                 </a:rPr>
                               </m:ctrlPr>
@@ -15199,7 +15199,7 @@
                                   <a:solidFill>
                                     <a:srgbClr val="002060"/>
                                   </a:solidFill>
-                                  <a:latin typeface="Cambria Math" charset="0"/>
+                                  <a:latin typeface="Cambria Math" panose="02040503050406030204" pitchFamily="18" charset="0"/>
                                   <a:cs typeface="Times New Roman" panose="02020603050405020304" pitchFamily="18" charset="0"/>
                                 </a:rPr>
                               </m:ctrlPr>
@@ -15246,7 +15246,7 @@
                                   <a:solidFill>
                                     <a:srgbClr val="002060"/>
                                   </a:solidFill>
-                                  <a:latin typeface="Cambria Math" charset="0"/>
+                                  <a:latin typeface="Cambria Math" panose="02040503050406030204" pitchFamily="18" charset="0"/>
                                   <a:cs typeface="Times New Roman" panose="02020603050405020304" pitchFamily="18" charset="0"/>
                                 </a:rPr>
                               </m:ctrlPr>
@@ -15293,7 +15293,7 @@
                                   <a:solidFill>
                                     <a:srgbClr val="002060"/>
                                   </a:solidFill>
-                                  <a:latin typeface="Cambria Math" charset="0"/>
+                                  <a:latin typeface="Cambria Math" panose="02040503050406030204" pitchFamily="18" charset="0"/>
                                   <a:cs typeface="Times New Roman" panose="02020603050405020304" pitchFamily="18" charset="0"/>
                                 </a:rPr>
                               </m:ctrlPr>
@@ -15703,7 +15703,7 @@
                               <a:solidFill>
                                 <a:srgbClr val="002060"/>
                               </a:solidFill>
-                              <a:latin typeface="Cambria Math" charset="0"/>
+                              <a:latin typeface="Cambria Math" panose="02040503050406030204" pitchFamily="18" charset="0"/>
                               <a:cs typeface="Times New Roman" panose="02020603050405020304" pitchFamily="18" charset="0"/>
                             </a:rPr>
                           </m:ctrlPr>
@@ -15718,7 +15718,7 @@
                                   <a:solidFill>
                                     <a:srgbClr val="002060"/>
                                   </a:solidFill>
-                                  <a:latin typeface="Cambria Math" charset="0"/>
+                                  <a:latin typeface="Cambria Math" panose="02040503050406030204" pitchFamily="18" charset="0"/>
                                   <a:cs typeface="Times New Roman" panose="02020603050405020304" pitchFamily="18" charset="0"/>
                                 </a:rPr>
                               </m:ctrlPr>
@@ -15733,7 +15733,7 @@
                                       <a:solidFill>
                                         <a:srgbClr val="002060"/>
                                       </a:solidFill>
-                                      <a:latin typeface="Cambria Math" charset="0"/>
+                                      <a:latin typeface="Cambria Math" panose="02040503050406030204" pitchFamily="18" charset="0"/>
                                       <a:cs typeface="Times New Roman" panose="02020603050405020304" pitchFamily="18" charset="0"/>
                                     </a:rPr>
                                   </m:ctrlPr>
@@ -15756,7 +15756,7 @@
                                           <a:solidFill>
                                             <a:srgbClr val="002060"/>
                                           </a:solidFill>
-                                          <a:latin typeface="Cambria Math" charset="0"/>
+                                          <a:latin typeface="Cambria Math" panose="02040503050406030204" pitchFamily="18" charset="0"/>
                                           <a:cs typeface="Times New Roman" panose="02020603050405020304" pitchFamily="18" charset="0"/>
                                         </a:rPr>
                                       </m:ctrlPr>
@@ -15769,7 +15769,7 @@
                                               <a:solidFill>
                                                 <a:srgbClr val="002060"/>
                                               </a:solidFill>
-                                              <a:latin typeface="Cambria Math" charset="0"/>
+                                              <a:latin typeface="Cambria Math" panose="02040503050406030204" pitchFamily="18" charset="0"/>
                                               <a:cs typeface="Times New Roman" panose="02020603050405020304" pitchFamily="18" charset="0"/>
                                             </a:rPr>
                                           </m:ctrlPr>
@@ -15828,7 +15828,7 @@
                                           <a:solidFill>
                                             <a:srgbClr val="002060"/>
                                           </a:solidFill>
-                                          <a:latin typeface="Cambria Math" charset="0"/>
+                                          <a:latin typeface="Cambria Math" panose="02040503050406030204" pitchFamily="18" charset="0"/>
                                           <a:cs typeface="Times New Roman" panose="02020603050405020304" pitchFamily="18" charset="0"/>
                                         </a:rPr>
                                       </m:ctrlPr>
@@ -15841,7 +15841,7 @@
                                               <a:solidFill>
                                                 <a:srgbClr val="002060"/>
                                               </a:solidFill>
-                                              <a:latin typeface="Cambria Math" charset="0"/>
+                                              <a:latin typeface="Cambria Math" panose="02040503050406030204" pitchFamily="18" charset="0"/>
                                               <a:cs typeface="Times New Roman" panose="02020603050405020304" pitchFamily="18" charset="0"/>
                                             </a:rPr>
                                           </m:ctrlPr>
@@ -15908,7 +15908,7 @@
                               <a:solidFill>
                                 <a:srgbClr val="002060"/>
                               </a:solidFill>
-                              <a:latin typeface="Cambria Math" charset="0"/>
+                              <a:latin typeface="Cambria Math" panose="02040503050406030204" pitchFamily="18" charset="0"/>
                               <a:cs typeface="Times New Roman" panose="02020603050405020304" pitchFamily="18" charset="0"/>
                             </a:rPr>
                           </m:ctrlPr>
@@ -15921,7 +15921,7 @@
                                   <a:solidFill>
                                     <a:srgbClr val="002060"/>
                                   </a:solidFill>
-                                  <a:latin typeface="Cambria Math" charset="0"/>
+                                  <a:latin typeface="Cambria Math" panose="02040503050406030204" pitchFamily="18" charset="0"/>
                                   <a:cs typeface="Times New Roman" panose="02020603050405020304" pitchFamily="18" charset="0"/>
                                 </a:rPr>
                               </m:ctrlPr>
@@ -15936,7 +15936,7 @@
                                       <a:solidFill>
                                         <a:srgbClr val="002060"/>
                                       </a:solidFill>
-                                      <a:latin typeface="Cambria Math" charset="0"/>
+                                      <a:latin typeface="Cambria Math" panose="02040503050406030204" pitchFamily="18" charset="0"/>
                                       <a:cs typeface="Times New Roman" panose="02020603050405020304" pitchFamily="18" charset="0"/>
                                     </a:rPr>
                                   </m:ctrlPr>
@@ -15951,7 +15951,7 @@
                                           <a:solidFill>
                                             <a:srgbClr val="002060"/>
                                           </a:solidFill>
-                                          <a:latin typeface="Cambria Math" charset="0"/>
+                                          <a:latin typeface="Cambria Math" panose="02040503050406030204" pitchFamily="18" charset="0"/>
                                           <a:cs typeface="Times New Roman" panose="02020603050405020304" pitchFamily="18" charset="0"/>
                                         </a:rPr>
                                       </m:ctrlPr>
@@ -15964,7 +15964,7 @@
                                               <a:solidFill>
                                                 <a:srgbClr val="002060"/>
                                               </a:solidFill>
-                                              <a:latin typeface="Cambria Math" charset="0"/>
+                                              <a:latin typeface="Cambria Math" panose="02040503050406030204" pitchFamily="18" charset="0"/>
                                               <a:cs typeface="Times New Roman" panose="02020603050405020304" pitchFamily="18" charset="0"/>
                                             </a:rPr>
                                           </m:ctrlPr>
@@ -16029,7 +16029,7 @@
                                   <a:solidFill>
                                     <a:srgbClr val="002060"/>
                                   </a:solidFill>
-                                  <a:latin typeface="Cambria Math" charset="0"/>
+                                  <a:latin typeface="Cambria Math" panose="02040503050406030204" pitchFamily="18" charset="0"/>
                                   <a:cs typeface="Times New Roman" panose="02020603050405020304" pitchFamily="18" charset="0"/>
                                 </a:rPr>
                               </m:ctrlPr>
@@ -16078,7 +16078,7 @@
                               <a:solidFill>
                                 <a:srgbClr val="002060"/>
                               </a:solidFill>
-                              <a:latin typeface="Cambria Math" charset="0"/>
+                              <a:latin typeface="Cambria Math" panose="02040503050406030204" pitchFamily="18" charset="0"/>
                               <a:cs typeface="Times New Roman" panose="02020603050405020304" pitchFamily="18" charset="0"/>
                             </a:rPr>
                           </m:ctrlPr>
@@ -16127,7 +16127,7 @@
                               <a:solidFill>
                                 <a:srgbClr val="002060"/>
                               </a:solidFill>
-                              <a:latin typeface="Cambria Math" charset="0"/>
+                              <a:latin typeface="Cambria Math" panose="02040503050406030204" pitchFamily="18" charset="0"/>
                               <a:cs typeface="Times New Roman" panose="02020603050405020304" pitchFamily="18" charset="0"/>
                             </a:rPr>
                           </m:ctrlPr>
@@ -16174,7 +16174,7 @@
                               <a:solidFill>
                                 <a:srgbClr val="002060"/>
                               </a:solidFill>
-                              <a:latin typeface="Cambria Math" charset="0"/>
+                              <a:latin typeface="Cambria Math" panose="02040503050406030204" pitchFamily="18" charset="0"/>
                               <a:cs typeface="Times New Roman" panose="02020603050405020304" pitchFamily="18" charset="0"/>
                             </a:rPr>
                           </m:ctrlPr>
@@ -16189,7 +16189,7 @@
                                   <a:solidFill>
                                     <a:srgbClr val="002060"/>
                                   </a:solidFill>
-                                  <a:latin typeface="Cambria Math" charset="0"/>
+                                  <a:latin typeface="Cambria Math" panose="02040503050406030204" pitchFamily="18" charset="0"/>
                                   <a:cs typeface="Times New Roman" panose="02020603050405020304" pitchFamily="18" charset="0"/>
                                 </a:rPr>
                               </m:ctrlPr>
@@ -16204,7 +16204,7 @@
                                       <a:solidFill>
                                         <a:srgbClr val="002060"/>
                                       </a:solidFill>
-                                      <a:latin typeface="Cambria Math" charset="0"/>
+                                      <a:latin typeface="Cambria Math" panose="02040503050406030204" pitchFamily="18" charset="0"/>
                                       <a:cs typeface="Times New Roman" panose="02020603050405020304" pitchFamily="18" charset="0"/>
                                     </a:rPr>
                                   </m:ctrlPr>
@@ -16217,7 +16217,7 @@
                                           <a:solidFill>
                                             <a:srgbClr val="002060"/>
                                           </a:solidFill>
-                                          <a:latin typeface="Cambria Math" charset="0"/>
+                                          <a:latin typeface="Cambria Math" panose="02040503050406030204" pitchFamily="18" charset="0"/>
                                           <a:cs typeface="Times New Roman" panose="02020603050405020304" pitchFamily="18" charset="0"/>
                                         </a:rPr>
                                       </m:ctrlPr>
@@ -16260,7 +16260,7 @@
                                   <a:solidFill>
                                     <a:srgbClr val="002060"/>
                                   </a:solidFill>
-                                  <a:latin typeface="Cambria Math" charset="0"/>
+                                  <a:latin typeface="Cambria Math" panose="02040503050406030204" pitchFamily="18" charset="0"/>
                                   <a:cs typeface="Times New Roman" panose="02020603050405020304" pitchFamily="18" charset="0"/>
                                 </a:rPr>
                               </m:ctrlPr>
@@ -16610,7 +16610,7 @@
                               <a:solidFill>
                                 <a:srgbClr val="002060"/>
                               </a:solidFill>
-                              <a:latin typeface="Cambria Math" charset="0"/>
+                              <a:latin typeface="Cambria Math" panose="02040503050406030204" pitchFamily="18" charset="0"/>
                               <a:cs typeface="Times New Roman" panose="02020603050405020304" pitchFamily="18" charset="0"/>
                             </a:rPr>
                           </m:ctrlPr>
@@ -16638,7 +16638,7 @@
                                   <a:solidFill>
                                     <a:srgbClr val="002060"/>
                                   </a:solidFill>
-                                  <a:latin typeface="Cambria Math" charset="0"/>
+                                  <a:latin typeface="Cambria Math" panose="02040503050406030204" pitchFamily="18" charset="0"/>
                                   <a:cs typeface="Times New Roman" panose="02020603050405020304" pitchFamily="18" charset="0"/>
                                 </a:rPr>
                               </m:ctrlPr>
@@ -16651,7 +16651,7 @@
                                       <a:solidFill>
                                         <a:srgbClr val="002060"/>
                                       </a:solidFill>
-                                      <a:latin typeface="Cambria Math" charset="0"/>
+                                      <a:latin typeface="Cambria Math" panose="02040503050406030204" pitchFamily="18" charset="0"/>
                                       <a:cs typeface="Times New Roman" panose="02020603050405020304" pitchFamily="18" charset="0"/>
                                     </a:rPr>
                                   </m:ctrlPr>
@@ -16733,7 +16733,7 @@
                                       <a:solidFill>
                                         <a:srgbClr val="002060"/>
                                       </a:solidFill>
-                                      <a:latin typeface="Cambria Math" charset="0"/>
+                                      <a:latin typeface="Cambria Math" panose="02040503050406030204" pitchFamily="18" charset="0"/>
                                       <a:cs typeface="Times New Roman" panose="02020603050405020304" pitchFamily="18" charset="0"/>
                                     </a:rPr>
                                   </m:ctrlPr>
@@ -16782,7 +16782,7 @@
                                       <a:solidFill>
                                         <a:srgbClr val="002060"/>
                                       </a:solidFill>
-                                      <a:latin typeface="Cambria Math" charset="0"/>
+                                      <a:latin typeface="Cambria Math" panose="02040503050406030204" pitchFamily="18" charset="0"/>
                                       <a:cs typeface="Times New Roman" panose="02020603050405020304" pitchFamily="18" charset="0"/>
                                     </a:rPr>
                                   </m:ctrlPr>
@@ -16829,7 +16829,7 @@
                                       <a:solidFill>
                                         <a:srgbClr val="002060"/>
                                       </a:solidFill>
-                                      <a:latin typeface="Cambria Math" charset="0"/>
+                                      <a:latin typeface="Cambria Math" panose="02040503050406030204" pitchFamily="18" charset="0"/>
                                       <a:cs typeface="Times New Roman" panose="02020603050405020304" pitchFamily="18" charset="0"/>
                                     </a:rPr>
                                   </m:ctrlPr>
@@ -16857,7 +16857,7 @@
                                           <a:solidFill>
                                             <a:srgbClr val="002060"/>
                                           </a:solidFill>
-                                          <a:latin typeface="Cambria Math" charset="0"/>
+                                          <a:latin typeface="Cambria Math" panose="02040503050406030204" pitchFamily="18" charset="0"/>
                                           <a:cs typeface="Times New Roman" panose="02020603050405020304" pitchFamily="18" charset="0"/>
                                         </a:rPr>
                                       </m:ctrlPr>
@@ -16870,7 +16870,7 @@
                                               <a:solidFill>
                                                 <a:srgbClr val="002060"/>
                                               </a:solidFill>
-                                              <a:latin typeface="Cambria Math" charset="0"/>
+                                              <a:latin typeface="Cambria Math" panose="02040503050406030204" pitchFamily="18" charset="0"/>
                                               <a:cs typeface="Times New Roman" panose="02020603050405020304" pitchFamily="18" charset="0"/>
                                             </a:rPr>
                                           </m:ctrlPr>
@@ -16954,7 +16954,7 @@
                                               <a:solidFill>
                                                 <a:srgbClr val="002060"/>
                                               </a:solidFill>
-                                              <a:latin typeface="Cambria Math" charset="0"/>
+                                              <a:latin typeface="Cambria Math" panose="02040503050406030204" pitchFamily="18" charset="0"/>
                                               <a:cs typeface="Times New Roman" panose="02020603050405020304" pitchFamily="18" charset="0"/>
                                             </a:rPr>
                                           </m:ctrlPr>
@@ -16969,7 +16969,7 @@
                                                   <a:solidFill>
                                                     <a:srgbClr val="002060"/>
                                                   </a:solidFill>
-                                                  <a:latin typeface="Cambria Math" charset="0"/>
+                                                  <a:latin typeface="Cambria Math" panose="02040503050406030204" pitchFamily="18" charset="0"/>
                                                   <a:cs typeface="Times New Roman" panose="02020603050405020304" pitchFamily="18" charset="0"/>
                                                 </a:rPr>
                                               </m:ctrlPr>
@@ -16992,7 +16992,7 @@
                                                       <a:solidFill>
                                                         <a:srgbClr val="002060"/>
                                                       </a:solidFill>
-                                                      <a:latin typeface="Cambria Math" charset="0"/>
+                                                      <a:latin typeface="Cambria Math" panose="02040503050406030204" pitchFamily="18" charset="0"/>
                                                       <a:cs typeface="Times New Roman" panose="02020603050405020304" pitchFamily="18" charset="0"/>
                                                     </a:rPr>
                                                   </m:ctrlPr>
@@ -17005,7 +17005,7 @@
                                                           <a:solidFill>
                                                             <a:srgbClr val="002060"/>
                                                           </a:solidFill>
-                                                          <a:latin typeface="Cambria Math" charset="0"/>
+                                                          <a:latin typeface="Cambria Math" panose="02040503050406030204" pitchFamily="18" charset="0"/>
                                                           <a:cs typeface="Times New Roman" panose="02020603050405020304" pitchFamily="18" charset="0"/>
                                                         </a:rPr>
                                                       </m:ctrlPr>
@@ -17064,7 +17064,7 @@
                                                       <a:solidFill>
                                                         <a:srgbClr val="002060"/>
                                                       </a:solidFill>
-                                                      <a:latin typeface="Cambria Math" charset="0"/>
+                                                      <a:latin typeface="Cambria Math" panose="02040503050406030204" pitchFamily="18" charset="0"/>
                                                       <a:cs typeface="Times New Roman" panose="02020603050405020304" pitchFamily="18" charset="0"/>
                                                     </a:rPr>
                                                   </m:ctrlPr>
@@ -17077,7 +17077,7 @@
                                                           <a:solidFill>
                                                             <a:srgbClr val="002060"/>
                                                           </a:solidFill>
-                                                          <a:latin typeface="Cambria Math" charset="0"/>
+                                                          <a:latin typeface="Cambria Math" panose="02040503050406030204" pitchFamily="18" charset="0"/>
                                                           <a:cs typeface="Times New Roman" panose="02020603050405020304" pitchFamily="18" charset="0"/>
                                                         </a:rPr>
                                                       </m:ctrlPr>
@@ -17570,7 +17570,7 @@
                         <m:sSupPr>
                           <m:ctrlPr>
                             <a:rPr lang="en-US" b="0" i="1" dirty="0" smtClean="0">
-                              <a:latin typeface="Cambria Math" charset="0"/>
+                              <a:latin typeface="Cambria Math" panose="02040503050406030204" pitchFamily="18" charset="0"/>
                             </a:rPr>
                           </m:ctrlPr>
                         </m:sSupPr>
@@ -18913,7 +18913,7 @@
                               <a:solidFill>
                                 <a:srgbClr val="002060"/>
                               </a:solidFill>
-                              <a:latin typeface="Cambria Math" charset="0"/>
+                              <a:latin typeface="Cambria Math" panose="02040503050406030204" pitchFamily="18" charset="0"/>
                               <a:cs typeface="Times New Roman" panose="02020603050405020304" pitchFamily="18" charset="0"/>
                             </a:rPr>
                           </m:ctrlPr>
@@ -18928,7 +18928,7 @@
                                   <a:solidFill>
                                     <a:srgbClr val="002060"/>
                                   </a:solidFill>
-                                  <a:latin typeface="Cambria Math" charset="0"/>
+                                  <a:latin typeface="Cambria Math" panose="02040503050406030204" pitchFamily="18" charset="0"/>
                                   <a:cs typeface="Times New Roman" panose="02020603050405020304" pitchFamily="18" charset="0"/>
                                 </a:rPr>
                               </m:ctrlPr>
@@ -18941,7 +18941,7 @@
                                       <a:solidFill>
                                         <a:srgbClr val="002060"/>
                                       </a:solidFill>
-                                      <a:latin typeface="Cambria Math" charset="0"/>
+                                      <a:latin typeface="Cambria Math" panose="02040503050406030204" pitchFamily="18" charset="0"/>
                                       <a:cs typeface="Times New Roman" panose="02020603050405020304" pitchFamily="18" charset="0"/>
                                     </a:rPr>
                                   </m:ctrlPr>
@@ -18992,7 +18992,7 @@
                               <a:solidFill>
                                 <a:srgbClr val="002060"/>
                               </a:solidFill>
-                              <a:latin typeface="Cambria Math" charset="0"/>
+                              <a:latin typeface="Cambria Math" panose="02040503050406030204" pitchFamily="18" charset="0"/>
                               <a:cs typeface="Times New Roman" panose="02020603050405020304" pitchFamily="18" charset="0"/>
                             </a:rPr>
                           </m:ctrlPr>
@@ -19327,7 +19327,7 @@
                               <a:solidFill>
                                 <a:srgbClr val="002060"/>
                               </a:solidFill>
-                              <a:latin typeface="Cambria Math" charset="0"/>
+                              <a:latin typeface="Cambria Math" panose="02040503050406030204" pitchFamily="18" charset="0"/>
                               <a:cs typeface="Times New Roman" panose="02020603050405020304" pitchFamily="18" charset="0"/>
                             </a:rPr>
                           </m:ctrlPr>
@@ -19340,7 +19340,7 @@
                                   <a:solidFill>
                                     <a:srgbClr val="002060"/>
                                   </a:solidFill>
-                                  <a:latin typeface="Cambria Math" charset="0"/>
+                                  <a:latin typeface="Cambria Math" panose="02040503050406030204" pitchFamily="18" charset="0"/>
                                   <a:cs typeface="Times New Roman" panose="02020603050405020304" pitchFamily="18" charset="0"/>
                                 </a:rPr>
                               </m:ctrlPr>
@@ -19391,7 +19391,7 @@
                               <a:solidFill>
                                 <a:srgbClr val="002060"/>
                               </a:solidFill>
-                              <a:latin typeface="Cambria Math" charset="0"/>
+                              <a:latin typeface="Cambria Math" panose="02040503050406030204" pitchFamily="18" charset="0"/>
                               <a:cs typeface="Times New Roman" panose="02020603050405020304" pitchFamily="18" charset="0"/>
                             </a:rPr>
                           </m:ctrlPr>
@@ -19404,7 +19404,7 @@
                                   <a:solidFill>
                                     <a:srgbClr val="002060"/>
                                   </a:solidFill>
-                                  <a:latin typeface="Cambria Math" charset="0"/>
+                                  <a:latin typeface="Cambria Math" panose="02040503050406030204" pitchFamily="18" charset="0"/>
                                   <a:cs typeface="Times New Roman" panose="02020603050405020304" pitchFamily="18" charset="0"/>
                                 </a:rPr>
                               </m:ctrlPr>
@@ -19451,7 +19451,7 @@
                                   <a:solidFill>
                                     <a:srgbClr val="002060"/>
                                   </a:solidFill>
-                                  <a:latin typeface="Cambria Math" charset="0"/>
+                                  <a:latin typeface="Cambria Math" panose="02040503050406030204" pitchFamily="18" charset="0"/>
                                   <a:cs typeface="Times New Roman" panose="02020603050405020304" pitchFamily="18" charset="0"/>
                                 </a:rPr>
                               </m:ctrlPr>
@@ -19464,7 +19464,7 @@
                                       <a:solidFill>
                                         <a:srgbClr val="002060"/>
                                       </a:solidFill>
-                                      <a:latin typeface="Cambria Math" charset="0"/>
+                                      <a:latin typeface="Cambria Math" panose="02040503050406030204" pitchFamily="18" charset="0"/>
                                       <a:cs typeface="Times New Roman" panose="02020603050405020304" pitchFamily="18" charset="0"/>
                                     </a:rPr>
                                   </m:ctrlPr>
@@ -19513,7 +19513,7 @@
                                       <a:solidFill>
                                         <a:srgbClr val="002060"/>
                                       </a:solidFill>
-                                      <a:latin typeface="Cambria Math" charset="0"/>
+                                      <a:latin typeface="Cambria Math" panose="02040503050406030204" pitchFamily="18" charset="0"/>
                                       <a:cs typeface="Times New Roman" panose="02020603050405020304" pitchFamily="18" charset="0"/>
                                     </a:rPr>
                                   </m:ctrlPr>
@@ -19528,7 +19528,7 @@
                                           <a:solidFill>
                                             <a:srgbClr val="002060"/>
                                           </a:solidFill>
-                                          <a:latin typeface="Cambria Math" charset="0"/>
+                                          <a:latin typeface="Cambria Math" panose="02040503050406030204" pitchFamily="18" charset="0"/>
                                           <a:cs typeface="Times New Roman" panose="02020603050405020304" pitchFamily="18" charset="0"/>
                                         </a:rPr>
                                       </m:ctrlPr>
@@ -19541,7 +19541,7 @@
                                               <a:solidFill>
                                                 <a:srgbClr val="002060"/>
                                               </a:solidFill>
-                                              <a:latin typeface="Cambria Math" charset="0"/>
+                                              <a:latin typeface="Cambria Math" panose="02040503050406030204" pitchFamily="18" charset="0"/>
                                               <a:cs typeface="Times New Roman" panose="02020603050405020304" pitchFamily="18" charset="0"/>
                                             </a:rPr>
                                           </m:ctrlPr>
@@ -19606,7 +19606,7 @@
                                   <a:solidFill>
                                     <a:srgbClr val="002060"/>
                                   </a:solidFill>
-                                  <a:latin typeface="Cambria Math" charset="0"/>
+                                  <a:latin typeface="Cambria Math" panose="02040503050406030204" pitchFamily="18" charset="0"/>
                                   <a:cs typeface="Times New Roman" panose="02020603050405020304" pitchFamily="18" charset="0"/>
                                 </a:rPr>
                               </m:ctrlPr>
@@ -19653,7 +19653,7 @@
                                   <a:solidFill>
                                     <a:srgbClr val="002060"/>
                                   </a:solidFill>
-                                  <a:latin typeface="Cambria Math" charset="0"/>
+                                  <a:latin typeface="Cambria Math" panose="02040503050406030204" pitchFamily="18" charset="0"/>
                                   <a:cs typeface="Times New Roman" panose="02020603050405020304" pitchFamily="18" charset="0"/>
                                 </a:rPr>
                               </m:ctrlPr>
@@ -19668,7 +19668,7 @@
                                       <a:solidFill>
                                         <a:srgbClr val="002060"/>
                                       </a:solidFill>
-                                      <a:latin typeface="Cambria Math" charset="0"/>
+                                      <a:latin typeface="Cambria Math" panose="02040503050406030204" pitchFamily="18" charset="0"/>
                                       <a:cs typeface="Times New Roman" panose="02020603050405020304" pitchFamily="18" charset="0"/>
                                     </a:rPr>
                                   </m:ctrlPr>
@@ -19683,7 +19683,7 @@
                                           <a:solidFill>
                                             <a:srgbClr val="002060"/>
                                           </a:solidFill>
-                                          <a:latin typeface="Cambria Math" charset="0"/>
+                                          <a:latin typeface="Cambria Math" panose="02040503050406030204" pitchFamily="18" charset="0"/>
                                           <a:cs typeface="Times New Roman" panose="02020603050405020304" pitchFamily="18" charset="0"/>
                                         </a:rPr>
                                       </m:ctrlPr>
@@ -19696,7 +19696,7 @@
                                               <a:solidFill>
                                                 <a:srgbClr val="002060"/>
                                               </a:solidFill>
-                                              <a:latin typeface="Cambria Math" charset="0"/>
+                                              <a:latin typeface="Cambria Math" panose="02040503050406030204" pitchFamily="18" charset="0"/>
                                               <a:cs typeface="Times New Roman" panose="02020603050405020304" pitchFamily="18" charset="0"/>
                                             </a:rPr>
                                           </m:ctrlPr>
@@ -19761,7 +19761,7 @@
                                   <a:solidFill>
                                     <a:srgbClr val="002060"/>
                                   </a:solidFill>
-                                  <a:latin typeface="Cambria Math" charset="0"/>
+                                  <a:latin typeface="Cambria Math" panose="02040503050406030204" pitchFamily="18" charset="0"/>
                                   <a:cs typeface="Times New Roman" panose="02020603050405020304" pitchFamily="18" charset="0"/>
                                 </a:rPr>
                               </m:ctrlPr>
@@ -19774,7 +19774,7 @@
                                       <a:solidFill>
                                         <a:srgbClr val="002060"/>
                                       </a:solidFill>
-                                      <a:latin typeface="Cambria Math" charset="0"/>
+                                      <a:latin typeface="Cambria Math" panose="02040503050406030204" pitchFamily="18" charset="0"/>
                                       <a:cs typeface="Times New Roman" panose="02020603050405020304" pitchFamily="18" charset="0"/>
                                     </a:rPr>
                                   </m:ctrlPr>
@@ -19823,7 +19823,7 @@
                                       <a:solidFill>
                                         <a:srgbClr val="002060"/>
                                       </a:solidFill>
-                                      <a:latin typeface="Cambria Math" charset="0"/>
+                                      <a:latin typeface="Cambria Math" panose="02040503050406030204" pitchFamily="18" charset="0"/>
                                       <a:cs typeface="Times New Roman" panose="02020603050405020304" pitchFamily="18" charset="0"/>
                                     </a:rPr>
                                   </m:ctrlPr>
@@ -19838,7 +19838,7 @@
                                           <a:solidFill>
                                             <a:srgbClr val="002060"/>
                                           </a:solidFill>
-                                          <a:latin typeface="Cambria Math" charset="0"/>
+                                          <a:latin typeface="Cambria Math" panose="02040503050406030204" pitchFamily="18" charset="0"/>
                                           <a:cs typeface="Times New Roman" panose="02020603050405020304" pitchFamily="18" charset="0"/>
                                         </a:rPr>
                                       </m:ctrlPr>
@@ -19851,7 +19851,7 @@
                                               <a:solidFill>
                                                 <a:srgbClr val="002060"/>
                                               </a:solidFill>
-                                              <a:latin typeface="Cambria Math" charset="0"/>
+                                              <a:latin typeface="Cambria Math" panose="02040503050406030204" pitchFamily="18" charset="0"/>
                                               <a:cs typeface="Times New Roman" panose="02020603050405020304" pitchFamily="18" charset="0"/>
                                             </a:rPr>
                                           </m:ctrlPr>
@@ -19894,7 +19894,7 @@
                                       <a:solidFill>
                                         <a:srgbClr val="002060"/>
                                       </a:solidFill>
-                                      <a:latin typeface="Cambria Math" charset="0"/>
+                                      <a:latin typeface="Cambria Math" panose="02040503050406030204" pitchFamily="18" charset="0"/>
                                       <a:cs typeface="Times New Roman" panose="02020603050405020304" pitchFamily="18" charset="0"/>
                                     </a:rPr>
                                   </m:ctrlPr>
@@ -20246,7 +20246,7 @@
                               <a:solidFill>
                                 <a:srgbClr val="002060"/>
                               </a:solidFill>
-                              <a:latin typeface="Cambria Math" charset="0"/>
+                              <a:latin typeface="Cambria Math" panose="02040503050406030204" pitchFamily="18" charset="0"/>
                               <a:cs typeface="Times New Roman" panose="02020603050405020304" pitchFamily="18" charset="0"/>
                             </a:rPr>
                           </m:ctrlPr>
@@ -20259,7 +20259,7 @@
                                   <a:solidFill>
                                     <a:srgbClr val="002060"/>
                                   </a:solidFill>
-                                  <a:latin typeface="Cambria Math" charset="0"/>
+                                  <a:latin typeface="Cambria Math" panose="02040503050406030204" pitchFamily="18" charset="0"/>
                                   <a:cs typeface="Times New Roman" panose="02020603050405020304" pitchFamily="18" charset="0"/>
                                 </a:rPr>
                               </m:ctrlPr>
@@ -20310,7 +20310,7 @@
                               <a:solidFill>
                                 <a:srgbClr val="002060"/>
                               </a:solidFill>
-                              <a:latin typeface="Cambria Math" charset="0"/>
+                              <a:latin typeface="Cambria Math" panose="02040503050406030204" pitchFamily="18" charset="0"/>
                               <a:cs typeface="Times New Roman" panose="02020603050405020304" pitchFamily="18" charset="0"/>
                             </a:rPr>
                           </m:ctrlPr>
@@ -20323,7 +20323,7 @@
                                   <a:solidFill>
                                     <a:srgbClr val="002060"/>
                                   </a:solidFill>
-                                  <a:latin typeface="Cambria Math" charset="0"/>
+                                  <a:latin typeface="Cambria Math" panose="02040503050406030204" pitchFamily="18" charset="0"/>
                                   <a:cs typeface="Times New Roman" panose="02020603050405020304" pitchFamily="18" charset="0"/>
                                 </a:rPr>
                               </m:ctrlPr>
@@ -20773,7 +20773,7 @@
                               <a:solidFill>
                                 <a:srgbClr val="002060"/>
                               </a:solidFill>
-                              <a:latin typeface="Cambria Math" charset="0"/>
+                              <a:latin typeface="Cambria Math" panose="02040503050406030204" pitchFamily="18" charset="0"/>
                               <a:cs typeface="Times New Roman" panose="02020603050405020304" pitchFamily="18" charset="0"/>
                             </a:rPr>
                           </m:ctrlPr>
@@ -20801,7 +20801,7 @@
                                   <a:solidFill>
                                     <a:srgbClr val="002060"/>
                                   </a:solidFill>
-                                  <a:latin typeface="Cambria Math" charset="0"/>
+                                  <a:latin typeface="Cambria Math" panose="02040503050406030204" pitchFamily="18" charset="0"/>
                                   <a:cs typeface="Times New Roman" panose="02020603050405020304" pitchFamily="18" charset="0"/>
                                 </a:rPr>
                               </m:ctrlPr>
@@ -20814,7 +20814,7 @@
                                       <a:solidFill>
                                         <a:srgbClr val="002060"/>
                                       </a:solidFill>
-                                      <a:latin typeface="Cambria Math" charset="0"/>
+                                      <a:latin typeface="Cambria Math" panose="02040503050406030204" pitchFamily="18" charset="0"/>
                                       <a:cs typeface="Times New Roman" panose="02020603050405020304" pitchFamily="18" charset="0"/>
                                     </a:rPr>
                                   </m:ctrlPr>
@@ -20896,7 +20896,7 @@
                                       <a:solidFill>
                                         <a:srgbClr val="002060"/>
                                       </a:solidFill>
-                                      <a:latin typeface="Cambria Math" charset="0"/>
+                                      <a:latin typeface="Cambria Math" panose="02040503050406030204" pitchFamily="18" charset="0"/>
                                       <a:cs typeface="Times New Roman" panose="02020603050405020304" pitchFamily="18" charset="0"/>
                                     </a:rPr>
                                   </m:ctrlPr>
@@ -20945,7 +20945,7 @@
                                       <a:solidFill>
                                         <a:srgbClr val="002060"/>
                                       </a:solidFill>
-                                      <a:latin typeface="Cambria Math" charset="0"/>
+                                      <a:latin typeface="Cambria Math" panose="02040503050406030204" pitchFamily="18" charset="0"/>
                                       <a:cs typeface="Times New Roman" panose="02020603050405020304" pitchFamily="18" charset="0"/>
                                     </a:rPr>
                                   </m:ctrlPr>
@@ -20992,7 +20992,7 @@
                                       <a:solidFill>
                                         <a:srgbClr val="002060"/>
                                       </a:solidFill>
-                                      <a:latin typeface="Cambria Math" charset="0"/>
+                                      <a:latin typeface="Cambria Math" panose="02040503050406030204" pitchFamily="18" charset="0"/>
                                       <a:cs typeface="Times New Roman" panose="02020603050405020304" pitchFamily="18" charset="0"/>
                                     </a:rPr>
                                   </m:ctrlPr>
@@ -21020,7 +21020,7 @@
                                           <a:solidFill>
                                             <a:srgbClr val="002060"/>
                                           </a:solidFill>
-                                          <a:latin typeface="Cambria Math" charset="0"/>
+                                          <a:latin typeface="Cambria Math" panose="02040503050406030204" pitchFamily="18" charset="0"/>
                                           <a:cs typeface="Times New Roman" panose="02020603050405020304" pitchFamily="18" charset="0"/>
                                         </a:rPr>
                                       </m:ctrlPr>
@@ -21033,7 +21033,7 @@
                                               <a:solidFill>
                                                 <a:srgbClr val="002060"/>
                                               </a:solidFill>
-                                              <a:latin typeface="Cambria Math" charset="0"/>
+                                              <a:latin typeface="Cambria Math" panose="02040503050406030204" pitchFamily="18" charset="0"/>
                                               <a:cs typeface="Times New Roman" panose="02020603050405020304" pitchFamily="18" charset="0"/>
                                             </a:rPr>
                                           </m:ctrlPr>
@@ -21125,7 +21125,7 @@
                                               <a:solidFill>
                                                 <a:srgbClr val="002060"/>
                                               </a:solidFill>
-                                              <a:latin typeface="Cambria Math" charset="0"/>
+                                              <a:latin typeface="Cambria Math" panose="02040503050406030204" pitchFamily="18" charset="0"/>
                                               <a:cs typeface="Times New Roman" panose="02020603050405020304" pitchFamily="18" charset="0"/>
                                             </a:rPr>
                                           </m:ctrlPr>
@@ -21148,7 +21148,7 @@
                                                   <a:solidFill>
                                                     <a:srgbClr val="002060"/>
                                                   </a:solidFill>
-                                                  <a:latin typeface="Cambria Math" charset="0"/>
+                                                  <a:latin typeface="Cambria Math" panose="02040503050406030204" pitchFamily="18" charset="0"/>
                                                   <a:cs typeface="Times New Roman" panose="02020603050405020304" pitchFamily="18" charset="0"/>
                                                 </a:rPr>
                                               </m:ctrlPr>
@@ -21161,7 +21161,7 @@
                                                       <a:solidFill>
                                                         <a:srgbClr val="002060"/>
                                                       </a:solidFill>
-                                                      <a:latin typeface="Cambria Math" charset="0"/>
+                                                      <a:latin typeface="Cambria Math" panose="02040503050406030204" pitchFamily="18" charset="0"/>
                                                       <a:cs typeface="Times New Roman" panose="02020603050405020304" pitchFamily="18" charset="0"/>
                                                     </a:rPr>
                                                   </m:ctrlPr>
@@ -21174,7 +21174,7 @@
                                                           <a:solidFill>
                                                             <a:srgbClr val="002060"/>
                                                           </a:solidFill>
-                                                          <a:latin typeface="Cambria Math" charset="0"/>
+                                                          <a:latin typeface="Cambria Math" panose="02040503050406030204" pitchFamily="18" charset="0"/>
                                                           <a:cs typeface="Times New Roman" panose="02020603050405020304" pitchFamily="18" charset="0"/>
                                                         </a:rPr>
                                                       </m:ctrlPr>
@@ -21237,7 +21237,7 @@
                                                   <a:solidFill>
                                                     <a:srgbClr val="002060"/>
                                                   </a:solidFill>
-                                                  <a:latin typeface="Cambria Math" charset="0"/>
+                                                  <a:latin typeface="Cambria Math" panose="02040503050406030204" pitchFamily="18" charset="0"/>
                                                   <a:cs typeface="Times New Roman" panose="02020603050405020304" pitchFamily="18" charset="0"/>
                                                 </a:rPr>
                                               </m:ctrlPr>
@@ -21250,7 +21250,7 @@
                                                       <a:solidFill>
                                                         <a:srgbClr val="002060"/>
                                                       </a:solidFill>
-                                                      <a:latin typeface="Cambria Math" charset="0"/>
+                                                      <a:latin typeface="Cambria Math" panose="02040503050406030204" pitchFamily="18" charset="0"/>
                                                       <a:cs typeface="Times New Roman" panose="02020603050405020304" pitchFamily="18" charset="0"/>
                                                     </a:rPr>
                                                   </m:ctrlPr>
@@ -21293,7 +21293,7 @@
                                                   <a:solidFill>
                                                     <a:srgbClr val="002060"/>
                                                   </a:solidFill>
-                                                  <a:latin typeface="Cambria Math" charset="0"/>
+                                                  <a:latin typeface="Cambria Math" panose="02040503050406030204" pitchFamily="18" charset="0"/>
                                                   <a:cs typeface="Times New Roman" panose="02020603050405020304" pitchFamily="18" charset="0"/>
                                                 </a:rPr>
                                               </m:ctrlPr>
@@ -21308,7 +21308,7 @@
                                                       <a:solidFill>
                                                         <a:srgbClr val="002060"/>
                                                       </a:solidFill>
-                                                      <a:latin typeface="Cambria Math" charset="0"/>
+                                                      <a:latin typeface="Cambria Math" panose="02040503050406030204" pitchFamily="18" charset="0"/>
                                                       <a:cs typeface="Times New Roman" panose="02020603050405020304" pitchFamily="18" charset="0"/>
                                                     </a:rPr>
                                                   </m:ctrlPr>
@@ -21331,7 +21331,7 @@
                                                           <a:solidFill>
                                                             <a:srgbClr val="002060"/>
                                                           </a:solidFill>
-                                                          <a:latin typeface="Cambria Math" charset="0"/>
+                                                          <a:latin typeface="Cambria Math" panose="02040503050406030204" pitchFamily="18" charset="0"/>
                                                           <a:cs typeface="Times New Roman" panose="02020603050405020304" pitchFamily="18" charset="0"/>
                                                         </a:rPr>
                                                       </m:ctrlPr>
@@ -21344,7 +21344,7 @@
                                                               <a:solidFill>
                                                                 <a:srgbClr val="002060"/>
                                                               </a:solidFill>
-                                                              <a:latin typeface="Cambria Math" charset="0"/>
+                                                              <a:latin typeface="Cambria Math" panose="02040503050406030204" pitchFamily="18" charset="0"/>
                                                               <a:cs typeface="Times New Roman" panose="02020603050405020304" pitchFamily="18" charset="0"/>
                                                             </a:rPr>
                                                           </m:ctrlPr>
@@ -21399,7 +21399,7 @@
                                                   <a:solidFill>
                                                     <a:srgbClr val="002060"/>
                                                   </a:solidFill>
-                                                  <a:latin typeface="Cambria Math" charset="0"/>
+                                                  <a:latin typeface="Cambria Math" panose="02040503050406030204" pitchFamily="18" charset="0"/>
                                                   <a:cs typeface="Times New Roman" panose="02020603050405020304" pitchFamily="18" charset="0"/>
                                                 </a:rPr>
                                               </m:ctrlPr>
@@ -21414,7 +21414,7 @@
                                                       <a:solidFill>
                                                         <a:srgbClr val="002060"/>
                                                       </a:solidFill>
-                                                      <a:latin typeface="Cambria Math" charset="0"/>
+                                                      <a:latin typeface="Cambria Math" panose="02040503050406030204" pitchFamily="18" charset="0"/>
                                                       <a:cs typeface="Times New Roman" panose="02020603050405020304" pitchFamily="18" charset="0"/>
                                                     </a:rPr>
                                                   </m:ctrlPr>
@@ -21437,7 +21437,7 @@
                                                           <a:solidFill>
                                                             <a:srgbClr val="002060"/>
                                                           </a:solidFill>
-                                                          <a:latin typeface="Cambria Math" charset="0"/>
+                                                          <a:latin typeface="Cambria Math" panose="02040503050406030204" pitchFamily="18" charset="0"/>
                                                           <a:cs typeface="Times New Roman" panose="02020603050405020304" pitchFamily="18" charset="0"/>
                                                         </a:rPr>
                                                       </m:ctrlPr>
@@ -21450,7 +21450,7 @@
                                                               <a:solidFill>
                                                                 <a:srgbClr val="002060"/>
                                                               </a:solidFill>
-                                                              <a:latin typeface="Cambria Math" charset="0"/>
+                                                              <a:latin typeface="Cambria Math" panose="02040503050406030204" pitchFamily="18" charset="0"/>
                                                               <a:cs typeface="Times New Roman" panose="02020603050405020304" pitchFamily="18" charset="0"/>
                                                             </a:rPr>
                                                           </m:ctrlPr>
@@ -21908,7 +21908,7 @@
                         <m:sSupPr>
                           <m:ctrlPr>
                             <a:rPr lang="en-US" b="0" i="1" dirty="0" smtClean="0">
-                              <a:latin typeface="Cambria Math" charset="0"/>
+                              <a:latin typeface="Cambria Math" panose="02040503050406030204" pitchFamily="18" charset="0"/>
                             </a:rPr>
                           </m:ctrlPr>
                         </m:sSupPr>
@@ -23178,7 +23178,7 @@
                               <a:solidFill>
                                 <a:srgbClr val="002060"/>
                               </a:solidFill>
-                              <a:latin typeface="Cambria Math" charset="0"/>
+                              <a:latin typeface="Cambria Math" panose="02040503050406030204" pitchFamily="18" charset="0"/>
                               <a:cs typeface="Times New Roman" panose="02020603050405020304" pitchFamily="18" charset="0"/>
                             </a:rPr>
                           </m:ctrlPr>
@@ -23193,7 +23193,7 @@
                                   <a:solidFill>
                                     <a:srgbClr val="002060"/>
                                   </a:solidFill>
-                                  <a:latin typeface="Cambria Math" charset="0"/>
+                                  <a:latin typeface="Cambria Math" panose="02040503050406030204" pitchFamily="18" charset="0"/>
                                   <a:cs typeface="Times New Roman" panose="02020603050405020304" pitchFamily="18" charset="0"/>
                                 </a:rPr>
                               </m:ctrlPr>
@@ -23206,7 +23206,7 @@
                                       <a:solidFill>
                                         <a:srgbClr val="002060"/>
                                       </a:solidFill>
-                                      <a:latin typeface="Cambria Math" charset="0"/>
+                                      <a:latin typeface="Cambria Math" panose="02040503050406030204" pitchFamily="18" charset="0"/>
                                       <a:cs typeface="Times New Roman" panose="02020603050405020304" pitchFamily="18" charset="0"/>
                                     </a:rPr>
                                   </m:ctrlPr>
@@ -23277,7 +23277,7 @@
                               <a:solidFill>
                                 <a:srgbClr val="002060"/>
                               </a:solidFill>
-                              <a:latin typeface="Cambria Math" charset="0"/>
+                              <a:latin typeface="Cambria Math" panose="02040503050406030204" pitchFamily="18" charset="0"/>
                               <a:cs typeface="Times New Roman" panose="02020603050405020304" pitchFamily="18" charset="0"/>
                             </a:rPr>
                           </m:ctrlPr>
@@ -23612,7 +23612,7 @@
                               <a:solidFill>
                                 <a:srgbClr val="002060"/>
                               </a:solidFill>
-                              <a:latin typeface="Cambria Math" charset="0"/>
+                              <a:latin typeface="Cambria Math" panose="02040503050406030204" pitchFamily="18" charset="0"/>
                               <a:cs typeface="Times New Roman" panose="02020603050405020304" pitchFamily="18" charset="0"/>
                             </a:rPr>
                           </m:ctrlPr>
@@ -23625,7 +23625,7 @@
                                   <a:solidFill>
                                     <a:srgbClr val="002060"/>
                                   </a:solidFill>
-                                  <a:latin typeface="Cambria Math" charset="0"/>
+                                  <a:latin typeface="Cambria Math" panose="02040503050406030204" pitchFamily="18" charset="0"/>
                                   <a:cs typeface="Times New Roman" panose="02020603050405020304" pitchFamily="18" charset="0"/>
                                 </a:rPr>
                               </m:ctrlPr>
@@ -23676,7 +23676,7 @@
                               <a:solidFill>
                                 <a:srgbClr val="002060"/>
                               </a:solidFill>
-                              <a:latin typeface="Cambria Math" charset="0"/>
+                              <a:latin typeface="Cambria Math" panose="02040503050406030204" pitchFamily="18" charset="0"/>
                               <a:cs typeface="Times New Roman" panose="02020603050405020304" pitchFamily="18" charset="0"/>
                             </a:rPr>
                           </m:ctrlPr>
@@ -23689,7 +23689,7 @@
                                   <a:solidFill>
                                     <a:srgbClr val="002060"/>
                                   </a:solidFill>
-                                  <a:latin typeface="Cambria Math" charset="0"/>
+                                  <a:latin typeface="Cambria Math" panose="02040503050406030204" pitchFamily="18" charset="0"/>
                                   <a:cs typeface="Times New Roman" panose="02020603050405020304" pitchFamily="18" charset="0"/>
                                 </a:rPr>
                               </m:ctrlPr>
@@ -23737,7 +23737,7 @@
                                   <a:solidFill>
                                     <a:srgbClr val="002060"/>
                                   </a:solidFill>
-                                  <a:latin typeface="Cambria Math" charset="0"/>
+                                  <a:latin typeface="Cambria Math" panose="02040503050406030204" pitchFamily="18" charset="0"/>
                                   <a:cs typeface="Times New Roman" panose="02020603050405020304" pitchFamily="18" charset="0"/>
                                 </a:rPr>
                               </m:ctrlPr>
@@ -23751,7 +23751,7 @@
                                       <a:solidFill>
                                         <a:srgbClr val="002060"/>
                                       </a:solidFill>
-                                      <a:latin typeface="Cambria Math" charset="0"/>
+                                      <a:latin typeface="Cambria Math" panose="02040503050406030204" pitchFamily="18" charset="0"/>
                                       <a:cs typeface="Times New Roman" panose="02020603050405020304" pitchFamily="18" charset="0"/>
                                     </a:rPr>
                                   </m:ctrlPr>
@@ -23798,7 +23798,7 @@
                                       <a:solidFill>
                                         <a:srgbClr val="002060"/>
                                       </a:solidFill>
-                                      <a:latin typeface="Cambria Math" charset="0"/>
+                                      <a:latin typeface="Cambria Math" panose="02040503050406030204" pitchFamily="18" charset="0"/>
                                       <a:cs typeface="Times New Roman" panose="02020603050405020304" pitchFamily="18" charset="0"/>
                                     </a:rPr>
                                   </m:ctrlPr>
@@ -23813,7 +23813,7 @@
                                           <a:solidFill>
                                             <a:srgbClr val="002060"/>
                                           </a:solidFill>
-                                          <a:latin typeface="Cambria Math" charset="0"/>
+                                          <a:latin typeface="Cambria Math" panose="02040503050406030204" pitchFamily="18" charset="0"/>
                                           <a:cs typeface="Times New Roman" panose="02020603050405020304" pitchFamily="18" charset="0"/>
                                         </a:rPr>
                                       </m:ctrlPr>
@@ -23828,7 +23828,7 @@
                                               <a:solidFill>
                                                 <a:srgbClr val="002060"/>
                                               </a:solidFill>
-                                              <a:latin typeface="Cambria Math" charset="0"/>
+                                              <a:latin typeface="Cambria Math" panose="02040503050406030204" pitchFamily="18" charset="0"/>
                                               <a:cs typeface="Times New Roman" panose="02020603050405020304" pitchFamily="18" charset="0"/>
                                             </a:rPr>
                                           </m:ctrlPr>
@@ -23841,7 +23841,7 @@
                                                   <a:solidFill>
                                                     <a:srgbClr val="002060"/>
                                                   </a:solidFill>
-                                                  <a:latin typeface="Cambria Math" charset="0"/>
+                                                  <a:latin typeface="Cambria Math" panose="02040503050406030204" pitchFamily="18" charset="0"/>
                                                   <a:cs typeface="Times New Roman" panose="02020603050405020304" pitchFamily="18" charset="0"/>
                                                 </a:rPr>
                                               </m:ctrlPr>
@@ -24211,7 +24211,7 @@
                               <a:solidFill>
                                 <a:srgbClr val="002060"/>
                               </a:solidFill>
-                              <a:latin typeface="Cambria Math" charset="0"/>
+                              <a:latin typeface="Cambria Math" panose="02040503050406030204" pitchFamily="18" charset="0"/>
                               <a:cs typeface="Times New Roman" panose="02020603050405020304" pitchFamily="18" charset="0"/>
                             </a:rPr>
                           </m:ctrlPr>
@@ -24224,7 +24224,7 @@
                                   <a:solidFill>
                                     <a:srgbClr val="002060"/>
                                   </a:solidFill>
-                                  <a:latin typeface="Cambria Math" charset="0"/>
+                                  <a:latin typeface="Cambria Math" panose="02040503050406030204" pitchFamily="18" charset="0"/>
                                   <a:cs typeface="Times New Roman" panose="02020603050405020304" pitchFamily="18" charset="0"/>
                                 </a:rPr>
                               </m:ctrlPr>
@@ -24275,7 +24275,7 @@
                               <a:solidFill>
                                 <a:srgbClr val="002060"/>
                               </a:solidFill>
-                              <a:latin typeface="Cambria Math" charset="0"/>
+                              <a:latin typeface="Cambria Math" panose="02040503050406030204" pitchFamily="18" charset="0"/>
                               <a:cs typeface="Times New Roman" panose="02020603050405020304" pitchFamily="18" charset="0"/>
                             </a:rPr>
                           </m:ctrlPr>
@@ -24288,7 +24288,7 @@
                                   <a:solidFill>
                                     <a:srgbClr val="002060"/>
                                   </a:solidFill>
-                                  <a:latin typeface="Cambria Math" charset="0"/>
+                                  <a:latin typeface="Cambria Math" panose="02040503050406030204" pitchFamily="18" charset="0"/>
                                   <a:cs typeface="Times New Roman" panose="02020603050405020304" pitchFamily="18" charset="0"/>
                                 </a:rPr>
                               </m:ctrlPr>
@@ -24708,7 +24708,7 @@
                               <a:solidFill>
                                 <a:srgbClr val="002060"/>
                               </a:solidFill>
-                              <a:latin typeface="Cambria Math" charset="0"/>
+                              <a:latin typeface="Cambria Math" panose="02040503050406030204" pitchFamily="18" charset="0"/>
                               <a:cs typeface="Times New Roman" panose="02020603050405020304" pitchFamily="18" charset="0"/>
                             </a:rPr>
                           </m:ctrlPr>
@@ -24736,7 +24736,7 @@
                                   <a:solidFill>
                                     <a:srgbClr val="002060"/>
                                   </a:solidFill>
-                                  <a:latin typeface="Cambria Math" charset="0"/>
+                                  <a:latin typeface="Cambria Math" panose="02040503050406030204" pitchFamily="18" charset="0"/>
                                   <a:cs typeface="Times New Roman" panose="02020603050405020304" pitchFamily="18" charset="0"/>
                                 </a:rPr>
                               </m:ctrlPr>
@@ -24749,7 +24749,7 @@
                                       <a:solidFill>
                                         <a:srgbClr val="002060"/>
                                       </a:solidFill>
-                                      <a:latin typeface="Cambria Math" charset="0"/>
+                                      <a:latin typeface="Cambria Math" panose="02040503050406030204" pitchFamily="18" charset="0"/>
                                       <a:cs typeface="Times New Roman" panose="02020603050405020304" pitchFamily="18" charset="0"/>
                                     </a:rPr>
                                   </m:ctrlPr>
@@ -24831,7 +24831,7 @@
                                       <a:solidFill>
                                         <a:srgbClr val="002060"/>
                                       </a:solidFill>
-                                      <a:latin typeface="Cambria Math" charset="0"/>
+                                      <a:latin typeface="Cambria Math" panose="02040503050406030204" pitchFamily="18" charset="0"/>
                                       <a:cs typeface="Times New Roman" panose="02020603050405020304" pitchFamily="18" charset="0"/>
                                     </a:rPr>
                                   </m:ctrlPr>
@@ -24880,7 +24880,7 @@
                                       <a:solidFill>
                                         <a:srgbClr val="002060"/>
                                       </a:solidFill>
-                                      <a:latin typeface="Cambria Math" charset="0"/>
+                                      <a:latin typeface="Cambria Math" panose="02040503050406030204" pitchFamily="18" charset="0"/>
                                       <a:cs typeface="Times New Roman" panose="02020603050405020304" pitchFamily="18" charset="0"/>
                                     </a:rPr>
                                   </m:ctrlPr>
@@ -24927,7 +24927,7 @@
                                       <a:solidFill>
                                         <a:srgbClr val="002060"/>
                                       </a:solidFill>
-                                      <a:latin typeface="Cambria Math" charset="0"/>
+                                      <a:latin typeface="Cambria Math" panose="02040503050406030204" pitchFamily="18" charset="0"/>
                                       <a:cs typeface="Times New Roman" panose="02020603050405020304" pitchFamily="18" charset="0"/>
                                     </a:rPr>
                                   </m:ctrlPr>
@@ -24955,7 +24955,7 @@
                                           <a:solidFill>
                                             <a:srgbClr val="002060"/>
                                           </a:solidFill>
-                                          <a:latin typeface="Cambria Math" charset="0"/>
+                                          <a:latin typeface="Cambria Math" panose="02040503050406030204" pitchFamily="18" charset="0"/>
                                           <a:cs typeface="Times New Roman" panose="02020603050405020304" pitchFamily="18" charset="0"/>
                                         </a:rPr>
                                       </m:ctrlPr>
@@ -24968,7 +24968,7 @@
                                               <a:solidFill>
                                                 <a:srgbClr val="002060"/>
                                               </a:solidFill>
-                                              <a:latin typeface="Cambria Math" charset="0"/>
+                                              <a:latin typeface="Cambria Math" panose="02040503050406030204" pitchFamily="18" charset="0"/>
                                               <a:cs typeface="Times New Roman" panose="02020603050405020304" pitchFamily="18" charset="0"/>
                                             </a:rPr>
                                           </m:ctrlPr>
@@ -25052,7 +25052,7 @@
                                               <a:solidFill>
                                                 <a:srgbClr val="002060"/>
                                               </a:solidFill>
-                                              <a:latin typeface="Cambria Math" charset="0"/>
+                                              <a:latin typeface="Cambria Math" panose="02040503050406030204" pitchFamily="18" charset="0"/>
                                               <a:cs typeface="Times New Roman" panose="02020603050405020304" pitchFamily="18" charset="0"/>
                                             </a:rPr>
                                           </m:ctrlPr>
@@ -25067,7 +25067,7 @@
                                                   <a:solidFill>
                                                     <a:srgbClr val="002060"/>
                                                   </a:solidFill>
-                                                  <a:latin typeface="Cambria Math" charset="0"/>
+                                                  <a:latin typeface="Cambria Math" panose="02040503050406030204" pitchFamily="18" charset="0"/>
                                                   <a:cs typeface="Times New Roman" panose="02020603050405020304" pitchFamily="18" charset="0"/>
                                                 </a:rPr>
                                               </m:ctrlPr>
@@ -25090,7 +25090,7 @@
                                                       <a:solidFill>
                                                         <a:srgbClr val="002060"/>
                                                       </a:solidFill>
-                                                      <a:latin typeface="Cambria Math" charset="0"/>
+                                                      <a:latin typeface="Cambria Math" panose="02040503050406030204" pitchFamily="18" charset="0"/>
                                                       <a:cs typeface="Times New Roman" panose="02020603050405020304" pitchFamily="18" charset="0"/>
                                                     </a:rPr>
                                                   </m:ctrlPr>
@@ -25103,7 +25103,7 @@
                                                           <a:solidFill>
                                                             <a:srgbClr val="002060"/>
                                                           </a:solidFill>
-                                                          <a:latin typeface="Cambria Math" charset="0"/>
+                                                          <a:latin typeface="Cambria Math" panose="02040503050406030204" pitchFamily="18" charset="0"/>
                                                           <a:cs typeface="Times New Roman" panose="02020603050405020304" pitchFamily="18" charset="0"/>
                                                         </a:rPr>
                                                       </m:ctrlPr>
@@ -25162,7 +25162,7 @@
                                                       <a:solidFill>
                                                         <a:srgbClr val="002060"/>
                                                       </a:solidFill>
-                                                      <a:latin typeface="Cambria Math" charset="0"/>
+                                                      <a:latin typeface="Cambria Math" panose="02040503050406030204" pitchFamily="18" charset="0"/>
                                                       <a:cs typeface="Times New Roman" panose="02020603050405020304" pitchFamily="18" charset="0"/>
                                                     </a:rPr>
                                                   </m:ctrlPr>
@@ -25175,7 +25175,7 @@
                                                           <a:solidFill>
                                                             <a:srgbClr val="002060"/>
                                                           </a:solidFill>
-                                                          <a:latin typeface="Cambria Math" charset="0"/>
+                                                          <a:latin typeface="Cambria Math" panose="02040503050406030204" pitchFamily="18" charset="0"/>
                                                           <a:cs typeface="Times New Roman" panose="02020603050405020304" pitchFamily="18" charset="0"/>
                                                         </a:rPr>
                                                       </m:ctrlPr>
@@ -25230,7 +25230,7 @@
                                           <a:solidFill>
                                             <a:srgbClr val="002060"/>
                                           </a:solidFill>
-                                          <a:latin typeface="Cambria Math" charset="0"/>
+                                          <a:latin typeface="Cambria Math" panose="02040503050406030204" pitchFamily="18" charset="0"/>
                                           <a:cs typeface="Times New Roman" panose="02020603050405020304" pitchFamily="18" charset="0"/>
                                         </a:rPr>
                                       </m:ctrlPr>
@@ -25258,7 +25258,7 @@
                                               <a:solidFill>
                                                 <a:srgbClr val="002060"/>
                                               </a:solidFill>
-                                              <a:latin typeface="Cambria Math" charset="0"/>
+                                              <a:latin typeface="Cambria Math" panose="02040503050406030204" pitchFamily="18" charset="0"/>
                                               <a:cs typeface="Times New Roman" panose="02020603050405020304" pitchFamily="18" charset="0"/>
                                             </a:rPr>
                                           </m:ctrlPr>
@@ -25271,7 +25271,7 @@
                                                   <a:solidFill>
                                                     <a:srgbClr val="002060"/>
                                                   </a:solidFill>
-                                                  <a:latin typeface="Cambria Math" charset="0"/>
+                                                  <a:latin typeface="Cambria Math" panose="02040503050406030204" pitchFamily="18" charset="0"/>
                                                   <a:cs typeface="Times New Roman" panose="02020603050405020304" pitchFamily="18" charset="0"/>
                                                 </a:rPr>
                                               </m:ctrlPr>
@@ -25363,7 +25363,7 @@
                                                   <a:solidFill>
                                                     <a:srgbClr val="002060"/>
                                                   </a:solidFill>
-                                                  <a:latin typeface="Cambria Math" charset="0"/>
+                                                  <a:latin typeface="Cambria Math" panose="02040503050406030204" pitchFamily="18" charset="0"/>
                                                   <a:cs typeface="Times New Roman" panose="02020603050405020304" pitchFamily="18" charset="0"/>
                                                 </a:rPr>
                                               </m:ctrlPr>
@@ -25386,7 +25386,7 @@
                                                       <a:solidFill>
                                                         <a:srgbClr val="002060"/>
                                                       </a:solidFill>
-                                                      <a:latin typeface="Cambria Math" charset="0"/>
+                                                      <a:latin typeface="Cambria Math" panose="02040503050406030204" pitchFamily="18" charset="0"/>
                                                       <a:cs typeface="Times New Roman" panose="02020603050405020304" pitchFamily="18" charset="0"/>
                                                     </a:rPr>
                                                   </m:ctrlPr>
@@ -25399,7 +25399,7 @@
                                                           <a:solidFill>
                                                             <a:srgbClr val="002060"/>
                                                           </a:solidFill>
-                                                          <a:latin typeface="Cambria Math" charset="0"/>
+                                                          <a:latin typeface="Cambria Math" panose="02040503050406030204" pitchFamily="18" charset="0"/>
                                                           <a:cs typeface="Times New Roman" panose="02020603050405020304" pitchFamily="18" charset="0"/>
                                                         </a:rPr>
                                                       </m:ctrlPr>
@@ -25412,7 +25412,7 @@
                                                               <a:solidFill>
                                                                 <a:srgbClr val="002060"/>
                                                               </a:solidFill>
-                                                              <a:latin typeface="Cambria Math" charset="0"/>
+                                                              <a:latin typeface="Cambria Math" panose="02040503050406030204" pitchFamily="18" charset="0"/>
                                                               <a:cs typeface="Times New Roman" panose="02020603050405020304" pitchFamily="18" charset="0"/>
                                                             </a:rPr>
                                                           </m:ctrlPr>
@@ -25475,7 +25475,7 @@
                                                       <a:solidFill>
                                                         <a:srgbClr val="002060"/>
                                                       </a:solidFill>
-                                                      <a:latin typeface="Cambria Math" charset="0"/>
+                                                      <a:latin typeface="Cambria Math" panose="02040503050406030204" pitchFamily="18" charset="0"/>
                                                       <a:cs typeface="Times New Roman" panose="02020603050405020304" pitchFamily="18" charset="0"/>
                                                     </a:rPr>
                                                   </m:ctrlPr>
@@ -25488,7 +25488,7 @@
                                                           <a:solidFill>
                                                             <a:srgbClr val="002060"/>
                                                           </a:solidFill>
-                                                          <a:latin typeface="Cambria Math" charset="0"/>
+                                                          <a:latin typeface="Cambria Math" panose="02040503050406030204" pitchFamily="18" charset="0"/>
                                                           <a:cs typeface="Times New Roman" panose="02020603050405020304" pitchFamily="18" charset="0"/>
                                                         </a:rPr>
                                                       </m:ctrlPr>
@@ -25531,7 +25531,7 @@
                                                       <a:solidFill>
                                                         <a:srgbClr val="002060"/>
                                                       </a:solidFill>
-                                                      <a:latin typeface="Cambria Math" charset="0"/>
+                                                      <a:latin typeface="Cambria Math" panose="02040503050406030204" pitchFamily="18" charset="0"/>
                                                       <a:cs typeface="Times New Roman" panose="02020603050405020304" pitchFamily="18" charset="0"/>
                                                     </a:rPr>
                                                   </m:ctrlPr>
@@ -25546,7 +25546,7 @@
                                                           <a:solidFill>
                                                             <a:srgbClr val="002060"/>
                                                           </a:solidFill>
-                                                          <a:latin typeface="Cambria Math" charset="0"/>
+                                                          <a:latin typeface="Cambria Math" panose="02040503050406030204" pitchFamily="18" charset="0"/>
                                                           <a:cs typeface="Times New Roman" panose="02020603050405020304" pitchFamily="18" charset="0"/>
                                                         </a:rPr>
                                                       </m:ctrlPr>
@@ -25569,7 +25569,7 @@
                                                               <a:solidFill>
                                                                 <a:srgbClr val="002060"/>
                                                               </a:solidFill>
-                                                              <a:latin typeface="Cambria Math" charset="0"/>
+                                                              <a:latin typeface="Cambria Math" panose="02040503050406030204" pitchFamily="18" charset="0"/>
                                                               <a:cs typeface="Times New Roman" panose="02020603050405020304" pitchFamily="18" charset="0"/>
                                                             </a:rPr>
                                                           </m:ctrlPr>
@@ -25582,7 +25582,7 @@
                                                                   <a:solidFill>
                                                                     <a:srgbClr val="002060"/>
                                                                   </a:solidFill>
-                                                                  <a:latin typeface="Cambria Math" charset="0"/>
+                                                                  <a:latin typeface="Cambria Math" panose="02040503050406030204" pitchFamily="18" charset="0"/>
                                                                   <a:cs typeface="Times New Roman" panose="02020603050405020304" pitchFamily="18" charset="0"/>
                                                                 </a:rPr>
                                                               </m:ctrlPr>
@@ -25637,7 +25637,7 @@
                                                       <a:solidFill>
                                                         <a:srgbClr val="002060"/>
                                                       </a:solidFill>
-                                                      <a:latin typeface="Cambria Math" charset="0"/>
+                                                      <a:latin typeface="Cambria Math" panose="02040503050406030204" pitchFamily="18" charset="0"/>
                                                       <a:cs typeface="Times New Roman" panose="02020603050405020304" pitchFamily="18" charset="0"/>
                                                     </a:rPr>
                                                   </m:ctrlPr>
@@ -25652,7 +25652,7 @@
                                                           <a:solidFill>
                                                             <a:srgbClr val="002060"/>
                                                           </a:solidFill>
-                                                          <a:latin typeface="Cambria Math" charset="0"/>
+                                                          <a:latin typeface="Cambria Math" panose="02040503050406030204" pitchFamily="18" charset="0"/>
                                                           <a:cs typeface="Times New Roman" panose="02020603050405020304" pitchFamily="18" charset="0"/>
                                                         </a:rPr>
                                                       </m:ctrlPr>
@@ -25675,7 +25675,7 @@
                                                               <a:solidFill>
                                                                 <a:srgbClr val="002060"/>
                                                               </a:solidFill>
-                                                              <a:latin typeface="Cambria Math" charset="0"/>
+                                                              <a:latin typeface="Cambria Math" panose="02040503050406030204" pitchFamily="18" charset="0"/>
                                                               <a:cs typeface="Times New Roman" panose="02020603050405020304" pitchFamily="18" charset="0"/>
                                                             </a:rPr>
                                                           </m:ctrlPr>
@@ -25688,7 +25688,7 @@
                                                                   <a:solidFill>
                                                                     <a:srgbClr val="002060"/>
                                                                   </a:solidFill>
-                                                                  <a:latin typeface="Cambria Math" charset="0"/>
+                                                                  <a:latin typeface="Cambria Math" panose="02040503050406030204" pitchFamily="18" charset="0"/>
                                                                   <a:cs typeface="Times New Roman" panose="02020603050405020304" pitchFamily="18" charset="0"/>
                                                                 </a:rPr>
                                                               </m:ctrlPr>
@@ -26281,7 +26281,7 @@
                         <m:sSupPr>
                           <m:ctrlPr>
                             <a:rPr lang="en-US" b="0" i="1" dirty="0" smtClean="0">
-                              <a:latin typeface="Cambria Math" charset="0"/>
+                              <a:latin typeface="Cambria Math" panose="02040503050406030204" pitchFamily="18" charset="0"/>
                             </a:rPr>
                           </m:ctrlPr>
                         </m:sSupPr>
@@ -28422,7 +28422,7 @@
                                 <a:solidFill>
                                   <a:srgbClr val="FF0000"/>
                                 </a:solidFill>
-                                <a:latin typeface="Cambria Math" charset="0"/>
+                                <a:latin typeface="Cambria Math" panose="02040503050406030204" pitchFamily="18" charset="0"/>
                               </a:rPr>
                             </m:ctrlPr>
                           </m:sSubPr>
@@ -28535,7 +28535,7 @@
                           <m:sSubPr>
                             <m:ctrlPr>
                               <a:rPr lang="en-US" sz="1400" b="0" i="1" smtClean="0">
-                                <a:latin typeface="Cambria Math" charset="0"/>
+                                <a:latin typeface="Cambria Math" panose="02040503050406030204" pitchFamily="18" charset="0"/>
                               </a:rPr>
                             </m:ctrlPr>
                           </m:sSubPr>
@@ -28638,7 +28638,7 @@
                           <m:sSubPr>
                             <m:ctrlPr>
                               <a:rPr lang="en-US" sz="1400" b="0" i="1" smtClean="0">
-                                <a:latin typeface="Cambria Math" charset="0"/>
+                                <a:latin typeface="Cambria Math" panose="02040503050406030204" pitchFamily="18" charset="0"/>
                               </a:rPr>
                             </m:ctrlPr>
                           </m:sSubPr>
@@ -28741,7 +28741,7 @@
                           <m:sSubPr>
                             <m:ctrlPr>
                               <a:rPr lang="en-US" sz="1400" b="0" i="1" smtClean="0">
-                                <a:latin typeface="Cambria Math" charset="0"/>
+                                <a:latin typeface="Cambria Math" panose="02040503050406030204" pitchFamily="18" charset="0"/>
                               </a:rPr>
                             </m:ctrlPr>
                           </m:sSubPr>
@@ -28865,7 +28865,7 @@
                                 <a:solidFill>
                                   <a:srgbClr val="FF0000"/>
                                 </a:solidFill>
-                                <a:latin typeface="Cambria Math" charset="0"/>
+                                <a:latin typeface="Cambria Math" panose="02040503050406030204" pitchFamily="18" charset="0"/>
                               </a:rPr>
                             </m:ctrlPr>
                           </m:sSubPr>
@@ -28987,7 +28987,7 @@
                           <m:sSubPr>
                             <m:ctrlPr>
                               <a:rPr lang="en-US" sz="1400" b="1" i="1" smtClean="0">
-                                <a:latin typeface="Cambria Math" charset="0"/>
+                                <a:latin typeface="Cambria Math" panose="02040503050406030204" pitchFamily="18" charset="0"/>
                               </a:rPr>
                             </m:ctrlPr>
                           </m:sSubPr>
@@ -29107,7 +29107,7 @@
                           <m:sSubPr>
                             <m:ctrlPr>
                               <a:rPr lang="en-US" sz="1400" b="1" i="1" smtClean="0">
-                                <a:latin typeface="Cambria Math" charset="0"/>
+                                <a:latin typeface="Cambria Math" panose="02040503050406030204" pitchFamily="18" charset="0"/>
                               </a:rPr>
                             </m:ctrlPr>
                           </m:sSubPr>
@@ -29227,7 +29227,7 @@
                           <m:sSubPr>
                             <m:ctrlPr>
                               <a:rPr lang="en-US" sz="1400" b="1" i="1" smtClean="0">
-                                <a:latin typeface="Cambria Math" charset="0"/>
+                                <a:latin typeface="Cambria Math" panose="02040503050406030204" pitchFamily="18" charset="0"/>
                               </a:rPr>
                             </m:ctrlPr>
                           </m:sSubPr>
@@ -30639,7 +30639,7 @@
                               <a:solidFill>
                                 <a:srgbClr val="002060"/>
                               </a:solidFill>
-                              <a:latin typeface="Cambria Math" charset="0"/>
+                              <a:latin typeface="Cambria Math" panose="02040503050406030204" pitchFamily="18" charset="0"/>
                               <a:cs typeface="Times New Roman" panose="02020603050405020304" pitchFamily="18" charset="0"/>
                             </a:rPr>
                           </m:ctrlPr>
@@ -30652,7 +30652,7 @@
                                   <a:solidFill>
                                     <a:srgbClr val="002060"/>
                                   </a:solidFill>
-                                  <a:latin typeface="Cambria Math" charset="0"/>
+                                  <a:latin typeface="Cambria Math" panose="02040503050406030204" pitchFamily="18" charset="0"/>
                                   <a:cs typeface="Times New Roman" panose="02020603050405020304" pitchFamily="18" charset="0"/>
                                 </a:rPr>
                               </m:ctrlPr>
@@ -30703,7 +30703,7 @@
                               <a:solidFill>
                                 <a:srgbClr val="002060"/>
                               </a:solidFill>
-                              <a:latin typeface="Cambria Math" charset="0"/>
+                              <a:latin typeface="Cambria Math" panose="02040503050406030204" pitchFamily="18" charset="0"/>
                               <a:cs typeface="Times New Roman" panose="02020603050405020304" pitchFamily="18" charset="0"/>
                             </a:rPr>
                           </m:ctrlPr>
@@ -30716,7 +30716,7 @@
                                   <a:solidFill>
                                     <a:srgbClr val="002060"/>
                                   </a:solidFill>
-                                  <a:latin typeface="Cambria Math" charset="0"/>
+                                  <a:latin typeface="Cambria Math" panose="02040503050406030204" pitchFamily="18" charset="0"/>
                                   <a:cs typeface="Times New Roman" panose="02020603050405020304" pitchFamily="18" charset="0"/>
                                 </a:rPr>
                               </m:ctrlPr>
@@ -30764,7 +30764,7 @@
                                   <a:solidFill>
                                     <a:srgbClr val="002060"/>
                                   </a:solidFill>
-                                  <a:latin typeface="Cambria Math" charset="0"/>
+                                  <a:latin typeface="Cambria Math" panose="02040503050406030204" pitchFamily="18" charset="0"/>
                                   <a:cs typeface="Times New Roman" panose="02020603050405020304" pitchFamily="18" charset="0"/>
                                 </a:rPr>
                               </m:ctrlPr>
@@ -30778,7 +30778,7 @@
                                       <a:solidFill>
                                         <a:srgbClr val="002060"/>
                                       </a:solidFill>
-                                      <a:latin typeface="Cambria Math" charset="0"/>
+                                      <a:latin typeface="Cambria Math" panose="02040503050406030204" pitchFamily="18" charset="0"/>
                                       <a:cs typeface="Times New Roman" panose="02020603050405020304" pitchFamily="18" charset="0"/>
                                     </a:rPr>
                                   </m:ctrlPr>
@@ -30825,7 +30825,7 @@
                                       <a:solidFill>
                                         <a:srgbClr val="002060"/>
                                       </a:solidFill>
-                                      <a:latin typeface="Cambria Math" charset="0"/>
+                                      <a:latin typeface="Cambria Math" panose="02040503050406030204" pitchFamily="18" charset="0"/>
                                       <a:cs typeface="Times New Roman" panose="02020603050405020304" pitchFamily="18" charset="0"/>
                                     </a:rPr>
                                   </m:ctrlPr>
@@ -30840,7 +30840,7 @@
                                           <a:solidFill>
                                             <a:srgbClr val="002060"/>
                                           </a:solidFill>
-                                          <a:latin typeface="Cambria Math" charset="0"/>
+                                          <a:latin typeface="Cambria Math" panose="02040503050406030204" pitchFamily="18" charset="0"/>
                                           <a:cs typeface="Times New Roman" panose="02020603050405020304" pitchFamily="18" charset="0"/>
                                         </a:rPr>
                                       </m:ctrlPr>
@@ -30855,7 +30855,7 @@
                                               <a:solidFill>
                                                 <a:srgbClr val="002060"/>
                                               </a:solidFill>
-                                              <a:latin typeface="Cambria Math" charset="0"/>
+                                              <a:latin typeface="Cambria Math" panose="02040503050406030204" pitchFamily="18" charset="0"/>
                                               <a:cs typeface="Times New Roman" panose="02020603050405020304" pitchFamily="18" charset="0"/>
                                             </a:rPr>
                                           </m:ctrlPr>
@@ -30868,7 +30868,7 @@
                                                   <a:solidFill>
                                                     <a:srgbClr val="002060"/>
                                                   </a:solidFill>
-                                                  <a:latin typeface="Cambria Math" charset="0"/>
+                                                  <a:latin typeface="Cambria Math" panose="02040503050406030204" pitchFamily="18" charset="0"/>
                                                   <a:cs typeface="Times New Roman" panose="02020603050405020304" pitchFamily="18" charset="0"/>
                                                 </a:rPr>
                                               </m:ctrlPr>
@@ -31238,7 +31238,7 @@
                               <a:solidFill>
                                 <a:srgbClr val="002060"/>
                               </a:solidFill>
-                              <a:latin typeface="Cambria Math" charset="0"/>
+                              <a:latin typeface="Cambria Math" panose="02040503050406030204" pitchFamily="18" charset="0"/>
                               <a:cs typeface="Times New Roman" panose="02020603050405020304" pitchFamily="18" charset="0"/>
                             </a:rPr>
                           </m:ctrlPr>
@@ -31251,7 +31251,7 @@
                                   <a:solidFill>
                                     <a:srgbClr val="002060"/>
                                   </a:solidFill>
-                                  <a:latin typeface="Cambria Math" charset="0"/>
+                                  <a:latin typeface="Cambria Math" panose="02040503050406030204" pitchFamily="18" charset="0"/>
                                   <a:cs typeface="Times New Roman" panose="02020603050405020304" pitchFamily="18" charset="0"/>
                                 </a:rPr>
                               </m:ctrlPr>
@@ -31302,7 +31302,7 @@
                               <a:solidFill>
                                 <a:srgbClr val="002060"/>
                               </a:solidFill>
-                              <a:latin typeface="Cambria Math" charset="0"/>
+                              <a:latin typeface="Cambria Math" panose="02040503050406030204" pitchFamily="18" charset="0"/>
                               <a:cs typeface="Times New Roman" panose="02020603050405020304" pitchFamily="18" charset="0"/>
                             </a:rPr>
                           </m:ctrlPr>
@@ -31315,7 +31315,7 @@
                                   <a:solidFill>
                                     <a:srgbClr val="002060"/>
                                   </a:solidFill>
-                                  <a:latin typeface="Cambria Math" charset="0"/>
+                                  <a:latin typeface="Cambria Math" panose="02040503050406030204" pitchFamily="18" charset="0"/>
                                   <a:cs typeface="Times New Roman" panose="02020603050405020304" pitchFamily="18" charset="0"/>
                                 </a:rPr>
                               </m:ctrlPr>
@@ -31675,7 +31675,7 @@
                               <a:solidFill>
                                 <a:srgbClr val="002060"/>
                               </a:solidFill>
-                              <a:latin typeface="Cambria Math" charset="0"/>
+                              <a:latin typeface="Cambria Math" panose="02040503050406030204" pitchFamily="18" charset="0"/>
                               <a:cs typeface="Times New Roman" panose="02020603050405020304" pitchFamily="18" charset="0"/>
                             </a:rPr>
                           </m:ctrlPr>
@@ -31688,7 +31688,7 @@
                                   <a:solidFill>
                                     <a:srgbClr val="002060"/>
                                   </a:solidFill>
-                                  <a:latin typeface="Cambria Math" charset="0"/>
+                                  <a:latin typeface="Cambria Math" panose="02040503050406030204" pitchFamily="18" charset="0"/>
                                   <a:cs typeface="Times New Roman" panose="02020603050405020304" pitchFamily="18" charset="0"/>
                                 </a:rPr>
                               </m:ctrlPr>
@@ -31739,7 +31739,7 @@
                               <a:solidFill>
                                 <a:srgbClr val="002060"/>
                               </a:solidFill>
-                              <a:latin typeface="Cambria Math" charset="0"/>
+                              <a:latin typeface="Cambria Math" panose="02040503050406030204" pitchFamily="18" charset="0"/>
                               <a:cs typeface="Times New Roman" panose="02020603050405020304" pitchFamily="18" charset="0"/>
                             </a:rPr>
                           </m:ctrlPr>
@@ -31752,7 +31752,7 @@
                                   <a:solidFill>
                                     <a:srgbClr val="002060"/>
                                   </a:solidFill>
-                                  <a:latin typeface="Cambria Math" charset="0"/>
+                                  <a:latin typeface="Cambria Math" panose="02040503050406030204" pitchFamily="18" charset="0"/>
                                   <a:cs typeface="Times New Roman" panose="02020603050405020304" pitchFamily="18" charset="0"/>
                                 </a:rPr>
                               </m:ctrlPr>
@@ -31800,7 +31800,7 @@
                                   <a:solidFill>
                                     <a:srgbClr val="002060"/>
                                   </a:solidFill>
-                                  <a:latin typeface="Cambria Math" charset="0"/>
+                                  <a:latin typeface="Cambria Math" panose="02040503050406030204" pitchFamily="18" charset="0"/>
                                   <a:cs typeface="Times New Roman" panose="02020603050405020304" pitchFamily="18" charset="0"/>
                                 </a:rPr>
                               </m:ctrlPr>
@@ -31814,7 +31814,7 @@
                                       <a:solidFill>
                                         <a:srgbClr val="002060"/>
                                       </a:solidFill>
-                                      <a:latin typeface="Cambria Math" charset="0"/>
+                                      <a:latin typeface="Cambria Math" panose="02040503050406030204" pitchFamily="18" charset="0"/>
                                       <a:cs typeface="Times New Roman" panose="02020603050405020304" pitchFamily="18" charset="0"/>
                                     </a:rPr>
                                   </m:ctrlPr>
@@ -31861,7 +31861,7 @@
                                       <a:solidFill>
                                         <a:srgbClr val="002060"/>
                                       </a:solidFill>
-                                      <a:latin typeface="Cambria Math" charset="0"/>
+                                      <a:latin typeface="Cambria Math" panose="02040503050406030204" pitchFamily="18" charset="0"/>
                                       <a:cs typeface="Times New Roman" panose="02020603050405020304" pitchFamily="18" charset="0"/>
                                     </a:rPr>
                                   </m:ctrlPr>
@@ -31876,7 +31876,7 @@
                                           <a:solidFill>
                                             <a:srgbClr val="002060"/>
                                           </a:solidFill>
-                                          <a:latin typeface="Cambria Math" charset="0"/>
+                                          <a:latin typeface="Cambria Math" panose="02040503050406030204" pitchFamily="18" charset="0"/>
                                           <a:cs typeface="Times New Roman" panose="02020603050405020304" pitchFamily="18" charset="0"/>
                                         </a:rPr>
                                       </m:ctrlPr>
@@ -31891,7 +31891,7 @@
                                               <a:solidFill>
                                                 <a:srgbClr val="002060"/>
                                               </a:solidFill>
-                                              <a:latin typeface="Cambria Math" charset="0"/>
+                                              <a:latin typeface="Cambria Math" panose="02040503050406030204" pitchFamily="18" charset="0"/>
                                               <a:cs typeface="Times New Roman" panose="02020603050405020304" pitchFamily="18" charset="0"/>
                                             </a:rPr>
                                           </m:ctrlPr>
@@ -31904,7 +31904,7 @@
                                                   <a:solidFill>
                                                     <a:srgbClr val="002060"/>
                                                   </a:solidFill>
-                                                  <a:latin typeface="Cambria Math" charset="0"/>
+                                                  <a:latin typeface="Cambria Math" panose="02040503050406030204" pitchFamily="18" charset="0"/>
                                                   <a:cs typeface="Times New Roman" panose="02020603050405020304" pitchFamily="18" charset="0"/>
                                                 </a:rPr>
                                               </m:ctrlPr>
@@ -32274,7 +32274,7 @@
                               <a:solidFill>
                                 <a:srgbClr val="002060"/>
                               </a:solidFill>
-                              <a:latin typeface="Cambria Math" charset="0"/>
+                              <a:latin typeface="Cambria Math" panose="02040503050406030204" pitchFamily="18" charset="0"/>
                               <a:cs typeface="Times New Roman" panose="02020603050405020304" pitchFamily="18" charset="0"/>
                             </a:rPr>
                           </m:ctrlPr>
@@ -32287,7 +32287,7 @@
                                   <a:solidFill>
                                     <a:srgbClr val="002060"/>
                                   </a:solidFill>
-                                  <a:latin typeface="Cambria Math" charset="0"/>
+                                  <a:latin typeface="Cambria Math" panose="02040503050406030204" pitchFamily="18" charset="0"/>
                                   <a:cs typeface="Times New Roman" panose="02020603050405020304" pitchFamily="18" charset="0"/>
                                 </a:rPr>
                               </m:ctrlPr>
@@ -32338,7 +32338,7 @@
                               <a:solidFill>
                                 <a:srgbClr val="002060"/>
                               </a:solidFill>
-                              <a:latin typeface="Cambria Math" charset="0"/>
+                              <a:latin typeface="Cambria Math" panose="02040503050406030204" pitchFamily="18" charset="0"/>
                               <a:cs typeface="Times New Roman" panose="02020603050405020304" pitchFamily="18" charset="0"/>
                             </a:rPr>
                           </m:ctrlPr>
@@ -32351,7 +32351,7 @@
                                   <a:solidFill>
                                     <a:srgbClr val="002060"/>
                                   </a:solidFill>
-                                  <a:latin typeface="Cambria Math" charset="0"/>
+                                  <a:latin typeface="Cambria Math" panose="02040503050406030204" pitchFamily="18" charset="0"/>
                                   <a:cs typeface="Times New Roman" panose="02020603050405020304" pitchFamily="18" charset="0"/>
                                 </a:rPr>
                               </m:ctrlPr>
@@ -32440,7 +32440,7 @@
                               <a:solidFill>
                                 <a:srgbClr val="002060"/>
                               </a:solidFill>
-                              <a:latin typeface="Cambria Math" charset="0"/>
+                              <a:latin typeface="Cambria Math" panose="02040503050406030204" pitchFamily="18" charset="0"/>
                               <a:cs typeface="Times New Roman" panose="02020603050405020304" pitchFamily="18" charset="0"/>
                             </a:rPr>
                           </m:ctrlPr>
@@ -32467,7 +32467,7 @@
                                   <a:solidFill>
                                     <a:srgbClr val="002060"/>
                                   </a:solidFill>
-                                  <a:latin typeface="Cambria Math" charset="0"/>
+                                  <a:latin typeface="Cambria Math" panose="02040503050406030204" pitchFamily="18" charset="0"/>
                                   <a:cs typeface="Times New Roman" panose="02020603050405020304" pitchFamily="18" charset="0"/>
                                 </a:rPr>
                               </m:ctrlPr>
@@ -32482,7 +32482,7 @@
                                       <a:solidFill>
                                         <a:srgbClr val="002060"/>
                                       </a:solidFill>
-                                      <a:latin typeface="Cambria Math" charset="0"/>
+                                      <a:latin typeface="Cambria Math" panose="02040503050406030204" pitchFamily="18" charset="0"/>
                                       <a:cs typeface="Times New Roman" panose="02020603050405020304" pitchFamily="18" charset="0"/>
                                     </a:rPr>
                                   </m:ctrlPr>
@@ -32495,7 +32495,7 @@
                                           <a:solidFill>
                                             <a:srgbClr val="002060"/>
                                           </a:solidFill>
-                                          <a:latin typeface="Cambria Math" charset="0"/>
+                                          <a:latin typeface="Cambria Math" panose="02040503050406030204" pitchFamily="18" charset="0"/>
                                           <a:cs typeface="Times New Roman" panose="02020603050405020304" pitchFamily="18" charset="0"/>
                                         </a:rPr>
                                       </m:ctrlPr>
@@ -32665,7 +32665,7 @@
         </p:nvSpPr>
         <p:spPr>
           <a:xfrm>
-            <a:off x="381000" y="287978"/>
+            <a:off x="76200" y="287978"/>
             <a:ext cx="6553200" cy="523220"/>
           </a:xfrm>
         </p:spPr>
@@ -32678,51 +32678,6 @@
               <a:t>Idea: Quantization-based</a:t>
             </a:r>
             <a:endParaRPr lang="en-US" sz="2800" dirty="0"/>
-          </a:p>
-        </p:txBody>
-      </p:sp>
-      <p:sp>
-        <p:nvSpPr>
-          <p:cNvPr id="3" name="Content Placeholder 2"/>
-          <p:cNvSpPr>
-            <a:spLocks noGrp="1"/>
-          </p:cNvSpPr>
-          <p:nvPr>
-            <p:ph idx="1"/>
-          </p:nvPr>
-        </p:nvSpPr>
-        <p:spPr/>
-        <p:txBody>
-          <a:bodyPr/>
-          <a:lstStyle/>
-          <a:p>
-            <a:endParaRPr lang="en-US"/>
-          </a:p>
-        </p:txBody>
-      </p:sp>
-      <p:sp>
-        <p:nvSpPr>
-          <p:cNvPr id="4" name="Footer Placeholder 3"/>
-          <p:cNvSpPr>
-            <a:spLocks noGrp="1"/>
-          </p:cNvSpPr>
-          <p:nvPr>
-            <p:ph type="ftr" sz="quarter" idx="11"/>
-          </p:nvPr>
-        </p:nvSpPr>
-        <p:spPr/>
-        <p:txBody>
-          <a:bodyPr/>
-          <a:lstStyle/>
-          <a:p>
-            <a:pPr>
-              <a:defRPr/>
-            </a:pPr>
-            <a:r>
-              <a:rPr lang="en-US" altLang="en-US" smtClean="0"/>
-              <a:t>Dung &amp; Hady: Scalable Recommendation Retrieval</a:t>
-            </a:r>
-            <a:endParaRPr lang="en-US" altLang="en-US"/>
           </a:p>
         </p:txBody>
       </p:sp>
@@ -32755,6 +32710,1676 @@
           </a:p>
         </p:txBody>
       </p:sp>
+      <mc:AlternateContent xmlns:mc="http://schemas.openxmlformats.org/markup-compatibility/2006">
+        <mc:Choice xmlns:a14="http://schemas.microsoft.com/office/drawing/2010/main" Requires="a14">
+          <p:sp>
+            <p:nvSpPr>
+              <p:cNvPr id="6" name="TextBox 5"/>
+              <p:cNvSpPr txBox="1"/>
+              <p:nvPr/>
+            </p:nvSpPr>
+            <p:spPr>
+              <a:xfrm>
+                <a:off x="228600" y="1295400"/>
+                <a:ext cx="7226658" cy="1323439"/>
+              </a:xfrm>
+              <a:prstGeom prst="rect">
+                <a:avLst/>
+              </a:prstGeom>
+              <a:noFill/>
+            </p:spPr>
+            <p:txBody>
+              <a:bodyPr wrap="none" rtlCol="0">
+                <a:spAutoFit/>
+              </a:bodyPr>
+              <a:lstStyle/>
+              <a:p>
+                <a:pPr marL="285750" indent="-285750">
+                  <a:buFont typeface="Arial" panose="020B0604020202020204" pitchFamily="34" charset="0"/>
+                  <a:buChar char="•"/>
+                </a:pPr>
+                <a:r>
+                  <a:rPr lang="en-US" sz="2000" dirty="0" smtClean="0"/>
+                  <a:t>Mapping each vector to a set of </a:t>
+                </a:r>
+                <a14:m>
+                  <m:oMath xmlns:m="http://schemas.openxmlformats.org/officeDocument/2006/math">
+                    <m:r>
+                      <a:rPr lang="en-US" sz="2000" b="0" i="1" smtClean="0">
+                        <a:latin typeface="Cambria Math" panose="02040503050406030204" pitchFamily="18" charset="0"/>
+                      </a:rPr>
+                      <m:t>𝐾</m:t>
+                    </m:r>
+                  </m:oMath>
+                </a14:m>
+                <a:r>
+                  <a:rPr lang="en-US" sz="2000" dirty="0" smtClean="0"/>
+                  <a:t> subspaces.</a:t>
+                </a:r>
+              </a:p>
+              <a:p>
+                <a:pPr marL="285750" indent="-285750">
+                  <a:buFont typeface="Arial" panose="020B0604020202020204" pitchFamily="34" charset="0"/>
+                  <a:buChar char="•"/>
+                </a:pPr>
+                <a:r>
+                  <a:rPr lang="en-US" sz="2000" dirty="0" smtClean="0"/>
+                  <a:t>Followed by independent quantization of data base vectors </a:t>
+                </a:r>
+              </a:p>
+              <a:p>
+                <a:r>
+                  <a:rPr lang="en-US" sz="2000" dirty="0"/>
+                  <a:t> </a:t>
+                </a:r>
+                <a:r>
+                  <a:rPr lang="en-US" sz="2000" dirty="0" smtClean="0"/>
+                  <a:t>   in each subspace.</a:t>
+                </a:r>
+              </a:p>
+              <a:p>
+                <a:pPr marL="285750" indent="-285750">
+                  <a:buFont typeface="Arial" panose="020B0604020202020204" pitchFamily="34" charset="0"/>
+                  <a:buChar char="•"/>
+                </a:pPr>
+                <a:endParaRPr lang="en-SG" sz="2000" dirty="0"/>
+              </a:p>
+            </p:txBody>
+          </p:sp>
+        </mc:Choice>
+        <mc:Fallback>
+          <p:sp>
+            <p:nvSpPr>
+              <p:cNvPr id="6" name="TextBox 5"/>
+              <p:cNvSpPr txBox="1">
+                <a:spLocks noRot="1" noChangeAspect="1" noMove="1" noResize="1" noEditPoints="1" noAdjustHandles="1" noChangeArrowheads="1" noChangeShapeType="1" noTextEdit="1"/>
+              </p:cNvSpPr>
+              <p:nvPr/>
+            </p:nvSpPr>
+            <p:spPr>
+              <a:xfrm>
+                <a:off x="228600" y="1295400"/>
+                <a:ext cx="7226658" cy="1323439"/>
+              </a:xfrm>
+              <a:prstGeom prst="rect">
+                <a:avLst/>
+              </a:prstGeom>
+              <a:blipFill rotWithShape="0">
+                <a:blip r:embed="rId2"/>
+                <a:stretch>
+                  <a:fillRect l="-759" t="-2304"/>
+                </a:stretch>
+              </a:blipFill>
+            </p:spPr>
+            <p:txBody>
+              <a:bodyPr/>
+              <a:lstStyle/>
+              <a:p>
+                <a:r>
+                  <a:rPr lang="en-SG">
+                    <a:noFill/>
+                  </a:rPr>
+                  <a:t> </a:t>
+                </a:r>
+              </a:p>
+            </p:txBody>
+          </p:sp>
+        </mc:Fallback>
+      </mc:AlternateContent>
+      <mc:AlternateContent xmlns:mc="http://schemas.openxmlformats.org/markup-compatibility/2006">
+        <mc:Choice xmlns:a14="http://schemas.microsoft.com/office/drawing/2010/main" Requires="a14">
+          <p:sp>
+            <p:nvSpPr>
+              <p:cNvPr id="7" name="Content Placeholder 2"/>
+              <p:cNvSpPr txBox="1">
+                <a:spLocks/>
+              </p:cNvSpPr>
+              <p:nvPr/>
+            </p:nvSpPr>
+            <p:spPr bwMode="auto">
+              <a:xfrm>
+                <a:off x="1295400" y="2618839"/>
+                <a:ext cx="5943600" cy="2827249"/>
+              </a:xfrm>
+              <a:prstGeom prst="rect">
+                <a:avLst/>
+              </a:prstGeom>
+              <a:noFill/>
+              <a:ln>
+                <a:noFill/>
+              </a:ln>
+              <a:effectLst/>
+              <a:extLst>
+                <a:ext uri="{909E8E84-426E-40DD-AFC4-6F175D3DCCD1}">
+                  <a14:hiddenFill>
+                    <a:solidFill>
+                      <a:schemeClr val="accent1"/>
+                    </a:solidFill>
+                  </a14:hiddenFill>
+                </a:ext>
+                <a:ext uri="{91240B29-F687-4F45-9708-019B960494DF}">
+                  <a14:hiddenLine w="9525">
+                    <a:solidFill>
+                      <a:schemeClr val="tx1"/>
+                    </a:solidFill>
+                    <a:miter lim="800000"/>
+                    <a:headEnd/>
+                    <a:tailEnd/>
+                  </a14:hiddenLine>
+                </a:ext>
+                <a:ext uri="{AF507438-7753-43E0-B8FC-AC1667EBCBE1}">
+                  <a14:hiddenEffects>
+                    <a:effectLst>
+                      <a:outerShdw dist="35921" dir="2700000" algn="ctr" rotWithShape="0">
+                        <a:schemeClr val="bg2"/>
+                      </a:outerShdw>
+                    </a:effectLst>
+                  </a14:hiddenEffects>
+                </a:ext>
+              </a:extLst>
+            </p:spPr>
+            <p:txBody>
+              <a:bodyPr vert="horz" wrap="square" lIns="91440" tIns="45720" rIns="91440" bIns="45720" numCol="1" anchor="t" anchorCtr="0" compatLnSpc="1">
+                <a:prstTxWarp prst="textNoShape">
+                  <a:avLst/>
+                </a:prstTxWarp>
+                <a:spAutoFit/>
+              </a:bodyPr>
+              <a:lstStyle>
+                <a:lvl1pPr marL="342900" indent="-342900" algn="l" rtl="0" eaLnBrk="0" fontAlgn="base" hangingPunct="0">
+                  <a:spcBef>
+                    <a:spcPct val="20000"/>
+                  </a:spcBef>
+                  <a:spcAft>
+                    <a:spcPct val="0"/>
+                  </a:spcAft>
+                  <a:buChar char="•"/>
+                  <a:defRPr sz="2000">
+                    <a:solidFill>
+                      <a:schemeClr val="tx1"/>
+                    </a:solidFill>
+                    <a:latin typeface="+mn-lt"/>
+                    <a:ea typeface="+mn-ea"/>
+                    <a:cs typeface="+mn-cs"/>
+                  </a:defRPr>
+                </a:lvl1pPr>
+                <a:lvl2pPr marL="742950" indent="-285750" algn="l" rtl="0" eaLnBrk="0" fontAlgn="base" hangingPunct="0">
+                  <a:spcBef>
+                    <a:spcPct val="20000"/>
+                  </a:spcBef>
+                  <a:spcAft>
+                    <a:spcPct val="0"/>
+                  </a:spcAft>
+                  <a:buChar char="–"/>
+                  <a:defRPr sz="1800">
+                    <a:solidFill>
+                      <a:schemeClr val="tx1"/>
+                    </a:solidFill>
+                    <a:latin typeface="+mn-lt"/>
+                  </a:defRPr>
+                </a:lvl2pPr>
+                <a:lvl3pPr marL="1143000" indent="-228600" algn="l" rtl="0" eaLnBrk="0" fontAlgn="base" hangingPunct="0">
+                  <a:spcBef>
+                    <a:spcPct val="20000"/>
+                  </a:spcBef>
+                  <a:spcAft>
+                    <a:spcPct val="0"/>
+                  </a:spcAft>
+                  <a:buChar char="•"/>
+                  <a:defRPr sz="1600">
+                    <a:solidFill>
+                      <a:schemeClr val="tx1"/>
+                    </a:solidFill>
+                    <a:latin typeface="+mn-lt"/>
+                  </a:defRPr>
+                </a:lvl3pPr>
+                <a:lvl4pPr marL="1600200" indent="-228600" algn="l" rtl="0" eaLnBrk="0" fontAlgn="base" hangingPunct="0">
+                  <a:spcBef>
+                    <a:spcPct val="20000"/>
+                  </a:spcBef>
+                  <a:spcAft>
+                    <a:spcPct val="0"/>
+                  </a:spcAft>
+                  <a:buChar char="–"/>
+                  <a:defRPr sz="1400">
+                    <a:solidFill>
+                      <a:schemeClr val="tx1"/>
+                    </a:solidFill>
+                    <a:latin typeface="+mn-lt"/>
+                  </a:defRPr>
+                </a:lvl4pPr>
+                <a:lvl5pPr marL="2057400" indent="-228600" algn="l" rtl="0" eaLnBrk="0" fontAlgn="base" hangingPunct="0">
+                  <a:spcBef>
+                    <a:spcPct val="20000"/>
+                  </a:spcBef>
+                  <a:spcAft>
+                    <a:spcPct val="0"/>
+                  </a:spcAft>
+                  <a:buChar char="»"/>
+                  <a:defRPr sz="1400">
+                    <a:solidFill>
+                      <a:schemeClr val="tx1"/>
+                    </a:solidFill>
+                    <a:latin typeface="+mn-lt"/>
+                  </a:defRPr>
+                </a:lvl5pPr>
+                <a:lvl6pPr marL="2514600" indent="-228600" algn="l" rtl="0" fontAlgn="base">
+                  <a:spcBef>
+                    <a:spcPct val="20000"/>
+                  </a:spcBef>
+                  <a:spcAft>
+                    <a:spcPct val="0"/>
+                  </a:spcAft>
+                  <a:buChar char="»"/>
+                  <a:defRPr sz="2000">
+                    <a:solidFill>
+                      <a:schemeClr val="tx1"/>
+                    </a:solidFill>
+                    <a:latin typeface="+mn-lt"/>
+                  </a:defRPr>
+                </a:lvl6pPr>
+                <a:lvl7pPr marL="2971800" indent="-228600" algn="l" rtl="0" fontAlgn="base">
+                  <a:spcBef>
+                    <a:spcPct val="20000"/>
+                  </a:spcBef>
+                  <a:spcAft>
+                    <a:spcPct val="0"/>
+                  </a:spcAft>
+                  <a:buChar char="»"/>
+                  <a:defRPr sz="2000">
+                    <a:solidFill>
+                      <a:schemeClr val="tx1"/>
+                    </a:solidFill>
+                    <a:latin typeface="+mn-lt"/>
+                  </a:defRPr>
+                </a:lvl7pPr>
+                <a:lvl8pPr marL="3429000" indent="-228600" algn="l" rtl="0" fontAlgn="base">
+                  <a:spcBef>
+                    <a:spcPct val="20000"/>
+                  </a:spcBef>
+                  <a:spcAft>
+                    <a:spcPct val="0"/>
+                  </a:spcAft>
+                  <a:buChar char="»"/>
+                  <a:defRPr sz="2000">
+                    <a:solidFill>
+                      <a:schemeClr val="tx1"/>
+                    </a:solidFill>
+                    <a:latin typeface="+mn-lt"/>
+                  </a:defRPr>
+                </a:lvl8pPr>
+                <a:lvl9pPr marL="3886200" indent="-228600" algn="l" rtl="0" fontAlgn="base">
+                  <a:spcBef>
+                    <a:spcPct val="20000"/>
+                  </a:spcBef>
+                  <a:spcAft>
+                    <a:spcPct val="0"/>
+                  </a:spcAft>
+                  <a:buChar char="»"/>
+                  <a:defRPr sz="2000">
+                    <a:solidFill>
+                      <a:schemeClr val="tx1"/>
+                    </a:solidFill>
+                    <a:latin typeface="+mn-lt"/>
+                  </a:defRPr>
+                </a:lvl9pPr>
+              </a:lstStyle>
+              <a:p>
+                <a:pPr marL="457200" indent="-457200" eaLnBrk="1" fontAlgn="auto" hangingPunct="1">
+                  <a:spcBef>
+                    <a:spcPts val="0"/>
+                  </a:spcBef>
+                  <a:spcAft>
+                    <a:spcPts val="0"/>
+                  </a:spcAft>
+                  <a:buFont typeface="+mj-lt"/>
+                  <a:buNone/>
+                  <a:defRPr/>
+                </a:pPr>
+                <a14:m>
+                  <m:oMathPara xmlns:m="http://schemas.openxmlformats.org/officeDocument/2006/math">
+                    <m:oMathParaPr>
+                      <m:jc m:val="centerGroup"/>
+                    </m:oMathParaPr>
+                    <m:oMath xmlns:m="http://schemas.openxmlformats.org/officeDocument/2006/math">
+                      <m:sSub>
+                        <m:sSubPr>
+                          <m:ctrlPr>
+                            <a:rPr lang="en-US" sz="2400" b="0" i="1" kern="0" smtClean="0">
+                              <a:solidFill>
+                                <a:srgbClr val="002060"/>
+                              </a:solidFill>
+                              <a:latin typeface="Cambria Math" panose="02040503050406030204" pitchFamily="18" charset="0"/>
+                              <a:cs typeface="Times New Roman" panose="02020603050405020304" pitchFamily="18" charset="0"/>
+                            </a:rPr>
+                          </m:ctrlPr>
+                        </m:sSubPr>
+                        <m:e>
+                          <m:r>
+                            <a:rPr lang="en-US" sz="2400" b="0" i="1" kern="0" smtClean="0">
+                              <a:solidFill>
+                                <a:srgbClr val="002060"/>
+                              </a:solidFill>
+                              <a:latin typeface="Cambria Math" panose="02040503050406030204" pitchFamily="18" charset="0"/>
+                              <a:cs typeface="Times New Roman" panose="02020603050405020304" pitchFamily="18" charset="0"/>
+                            </a:rPr>
+                            <m:t>𝑥</m:t>
+                          </m:r>
+                        </m:e>
+                        <m:sub>
+                          <m:r>
+                            <a:rPr lang="en-US" sz="2400" b="0" i="1" kern="0" smtClean="0">
+                              <a:solidFill>
+                                <a:srgbClr val="002060"/>
+                              </a:solidFill>
+                              <a:latin typeface="Cambria Math" panose="02040503050406030204" pitchFamily="18" charset="0"/>
+                              <a:cs typeface="Times New Roman" panose="02020603050405020304" pitchFamily="18" charset="0"/>
+                            </a:rPr>
+                            <m:t>𝑢</m:t>
+                          </m:r>
+                        </m:sub>
+                      </m:sSub>
+                      <m:r>
+                        <a:rPr lang="en-US" sz="2400" b="0" i="1" kern="0" smtClean="0">
+                          <a:solidFill>
+                            <a:srgbClr val="002060"/>
+                          </a:solidFill>
+                          <a:latin typeface="Cambria Math" panose="02040503050406030204" pitchFamily="18" charset="0"/>
+                          <a:cs typeface="Times New Roman" panose="02020603050405020304" pitchFamily="18" charset="0"/>
+                        </a:rPr>
+                        <m:t>=</m:t>
+                      </m:r>
+                      <m:d>
+                        <m:dPr>
+                          <m:begChr m:val="["/>
+                          <m:endChr m:val="]"/>
+                          <m:ctrlPr>
+                            <a:rPr lang="en-US" sz="2400" b="0" i="1" kern="0" smtClean="0">
+                              <a:solidFill>
+                                <a:srgbClr val="002060"/>
+                              </a:solidFill>
+                              <a:latin typeface="Cambria Math" panose="02040503050406030204" pitchFamily="18" charset="0"/>
+                              <a:cs typeface="Times New Roman" panose="02020603050405020304" pitchFamily="18" charset="0"/>
+                            </a:rPr>
+                          </m:ctrlPr>
+                        </m:dPr>
+                        <m:e>
+                          <m:sSubSup>
+                            <m:sSubSupPr>
+                              <m:ctrlPr>
+                                <a:rPr lang="en-US" sz="2400" b="0" i="1" kern="0" smtClean="0">
+                                  <a:solidFill>
+                                    <a:srgbClr val="002060"/>
+                                  </a:solidFill>
+                                  <a:latin typeface="Cambria Math" panose="02040503050406030204" pitchFamily="18" charset="0"/>
+                                  <a:cs typeface="Times New Roman" panose="02020603050405020304" pitchFamily="18" charset="0"/>
+                                </a:rPr>
+                              </m:ctrlPr>
+                            </m:sSubSupPr>
+                            <m:e>
+                              <m:r>
+                                <a:rPr lang="en-US" sz="2400" b="0" i="1" kern="0" smtClean="0">
+                                  <a:solidFill>
+                                    <a:srgbClr val="002060"/>
+                                  </a:solidFill>
+                                  <a:latin typeface="Cambria Math" panose="02040503050406030204" pitchFamily="18" charset="0"/>
+                                  <a:cs typeface="Times New Roman" panose="02020603050405020304" pitchFamily="18" charset="0"/>
+                                </a:rPr>
+                                <m:t>𝑥</m:t>
+                              </m:r>
+                            </m:e>
+                            <m:sub>
+                              <m:r>
+                                <a:rPr lang="en-US" sz="2400" b="0" i="1" kern="0" smtClean="0">
+                                  <a:solidFill>
+                                    <a:srgbClr val="002060"/>
+                                  </a:solidFill>
+                                  <a:latin typeface="Cambria Math" panose="02040503050406030204" pitchFamily="18" charset="0"/>
+                                  <a:cs typeface="Times New Roman" panose="02020603050405020304" pitchFamily="18" charset="0"/>
+                                </a:rPr>
+                                <m:t>𝑢</m:t>
+                              </m:r>
+                            </m:sub>
+                            <m:sup>
+                              <m:r>
+                                <a:rPr lang="en-US" sz="2400" b="0" i="1" kern="0" smtClean="0">
+                                  <a:solidFill>
+                                    <a:srgbClr val="002060"/>
+                                  </a:solidFill>
+                                  <a:latin typeface="Cambria Math" panose="02040503050406030204" pitchFamily="18" charset="0"/>
+                                  <a:cs typeface="Times New Roman" panose="02020603050405020304" pitchFamily="18" charset="0"/>
+                                </a:rPr>
+                                <m:t>(1)</m:t>
+                              </m:r>
+                            </m:sup>
+                          </m:sSubSup>
+                          <m:r>
+                            <a:rPr lang="en-US" sz="2400" b="0" i="1" kern="0" smtClean="0">
+                              <a:solidFill>
+                                <a:srgbClr val="002060"/>
+                              </a:solidFill>
+                              <a:latin typeface="Cambria Math" panose="02040503050406030204" pitchFamily="18" charset="0"/>
+                              <a:cs typeface="Times New Roman" panose="02020603050405020304" pitchFamily="18" charset="0"/>
+                            </a:rPr>
+                            <m:t>,</m:t>
+                          </m:r>
+                          <m:sSubSup>
+                            <m:sSubSupPr>
+                              <m:ctrlPr>
+                                <a:rPr lang="en-US" sz="2400" i="1" kern="0">
+                                  <a:solidFill>
+                                    <a:srgbClr val="002060"/>
+                                  </a:solidFill>
+                                  <a:latin typeface="Cambria Math" panose="02040503050406030204" pitchFamily="18" charset="0"/>
+                                  <a:cs typeface="Times New Roman" panose="02020603050405020304" pitchFamily="18" charset="0"/>
+                                </a:rPr>
+                              </m:ctrlPr>
+                            </m:sSubSupPr>
+                            <m:e>
+                              <m:r>
+                                <a:rPr lang="en-US" sz="2400" i="1" kern="0">
+                                  <a:solidFill>
+                                    <a:srgbClr val="002060"/>
+                                  </a:solidFill>
+                                  <a:latin typeface="Cambria Math" panose="02040503050406030204" pitchFamily="18" charset="0"/>
+                                  <a:cs typeface="Times New Roman" panose="02020603050405020304" pitchFamily="18" charset="0"/>
+                                </a:rPr>
+                                <m:t>𝑥</m:t>
+                              </m:r>
+                            </m:e>
+                            <m:sub>
+                              <m:r>
+                                <a:rPr lang="en-US" sz="2400" i="1" kern="0">
+                                  <a:solidFill>
+                                    <a:srgbClr val="002060"/>
+                                  </a:solidFill>
+                                  <a:latin typeface="Cambria Math" panose="02040503050406030204" pitchFamily="18" charset="0"/>
+                                  <a:cs typeface="Times New Roman" panose="02020603050405020304" pitchFamily="18" charset="0"/>
+                                </a:rPr>
+                                <m:t>𝑢</m:t>
+                              </m:r>
+                            </m:sub>
+                            <m:sup>
+                              <m:r>
+                                <a:rPr lang="en-US" sz="2400" i="1" kern="0">
+                                  <a:solidFill>
+                                    <a:srgbClr val="002060"/>
+                                  </a:solidFill>
+                                  <a:latin typeface="Cambria Math" panose="02040503050406030204" pitchFamily="18" charset="0"/>
+                                  <a:cs typeface="Times New Roman" panose="02020603050405020304" pitchFamily="18" charset="0"/>
+                                </a:rPr>
+                                <m:t>(</m:t>
+                              </m:r>
+                              <m:r>
+                                <a:rPr lang="en-US" sz="2400" b="0" i="1" kern="0" smtClean="0">
+                                  <a:solidFill>
+                                    <a:srgbClr val="002060"/>
+                                  </a:solidFill>
+                                  <a:latin typeface="Cambria Math" panose="02040503050406030204" pitchFamily="18" charset="0"/>
+                                  <a:cs typeface="Times New Roman" panose="02020603050405020304" pitchFamily="18" charset="0"/>
+                                </a:rPr>
+                                <m:t>2</m:t>
+                              </m:r>
+                              <m:r>
+                                <a:rPr lang="en-US" sz="2400" i="1" kern="0">
+                                  <a:solidFill>
+                                    <a:srgbClr val="002060"/>
+                                  </a:solidFill>
+                                  <a:latin typeface="Cambria Math" panose="02040503050406030204" pitchFamily="18" charset="0"/>
+                                  <a:cs typeface="Times New Roman" panose="02020603050405020304" pitchFamily="18" charset="0"/>
+                                </a:rPr>
+                                <m:t>)</m:t>
+                              </m:r>
+                            </m:sup>
+                          </m:sSubSup>
+                          <m:r>
+                            <a:rPr lang="en-US" sz="2400" b="0" i="1" kern="0" smtClean="0">
+                              <a:solidFill>
+                                <a:srgbClr val="002060"/>
+                              </a:solidFill>
+                              <a:latin typeface="Cambria Math" panose="02040503050406030204" pitchFamily="18" charset="0"/>
+                              <a:cs typeface="Times New Roman" panose="02020603050405020304" pitchFamily="18" charset="0"/>
+                            </a:rPr>
+                            <m:t>, …,</m:t>
+                          </m:r>
+                          <m:sSubSup>
+                            <m:sSubSupPr>
+                              <m:ctrlPr>
+                                <a:rPr lang="en-US" sz="2400" i="1" kern="0">
+                                  <a:solidFill>
+                                    <a:srgbClr val="002060"/>
+                                  </a:solidFill>
+                                  <a:latin typeface="Cambria Math" panose="02040503050406030204" pitchFamily="18" charset="0"/>
+                                  <a:cs typeface="Times New Roman" panose="02020603050405020304" pitchFamily="18" charset="0"/>
+                                </a:rPr>
+                              </m:ctrlPr>
+                            </m:sSubSupPr>
+                            <m:e>
+                              <m:r>
+                                <a:rPr lang="en-US" sz="2400" i="1" kern="0">
+                                  <a:solidFill>
+                                    <a:srgbClr val="002060"/>
+                                  </a:solidFill>
+                                  <a:latin typeface="Cambria Math" panose="02040503050406030204" pitchFamily="18" charset="0"/>
+                                  <a:cs typeface="Times New Roman" panose="02020603050405020304" pitchFamily="18" charset="0"/>
+                                </a:rPr>
+                                <m:t>𝑥</m:t>
+                              </m:r>
+                            </m:e>
+                            <m:sub>
+                              <m:r>
+                                <a:rPr lang="en-US" sz="2400" i="1" kern="0">
+                                  <a:solidFill>
+                                    <a:srgbClr val="002060"/>
+                                  </a:solidFill>
+                                  <a:latin typeface="Cambria Math" panose="02040503050406030204" pitchFamily="18" charset="0"/>
+                                  <a:cs typeface="Times New Roman" panose="02020603050405020304" pitchFamily="18" charset="0"/>
+                                </a:rPr>
+                                <m:t>𝑢</m:t>
+                              </m:r>
+                            </m:sub>
+                            <m:sup>
+                              <m:r>
+                                <a:rPr lang="en-US" sz="2400" i="1" kern="0">
+                                  <a:solidFill>
+                                    <a:srgbClr val="002060"/>
+                                  </a:solidFill>
+                                  <a:latin typeface="Cambria Math" panose="02040503050406030204" pitchFamily="18" charset="0"/>
+                                  <a:cs typeface="Times New Roman" panose="02020603050405020304" pitchFamily="18" charset="0"/>
+                                </a:rPr>
+                                <m:t>(</m:t>
+                              </m:r>
+                              <m:r>
+                                <a:rPr lang="en-US" sz="2400" b="0" i="1" kern="0" smtClean="0">
+                                  <a:solidFill>
+                                    <a:srgbClr val="002060"/>
+                                  </a:solidFill>
+                                  <a:latin typeface="Cambria Math" panose="02040503050406030204" pitchFamily="18" charset="0"/>
+                                  <a:cs typeface="Times New Roman" panose="02020603050405020304" pitchFamily="18" charset="0"/>
+                                </a:rPr>
+                                <m:t>𝐾</m:t>
+                              </m:r>
+                              <m:r>
+                                <a:rPr lang="en-US" sz="2400" i="1" kern="0">
+                                  <a:solidFill>
+                                    <a:srgbClr val="002060"/>
+                                  </a:solidFill>
+                                  <a:latin typeface="Cambria Math" panose="02040503050406030204" pitchFamily="18" charset="0"/>
+                                  <a:cs typeface="Times New Roman" panose="02020603050405020304" pitchFamily="18" charset="0"/>
+                                </a:rPr>
+                                <m:t>)</m:t>
+                              </m:r>
+                            </m:sup>
+                          </m:sSubSup>
+                        </m:e>
+                      </m:d>
+                      <m:r>
+                        <a:rPr lang="en-US" sz="2400" b="0" i="1" kern="0" smtClean="0">
+                          <a:solidFill>
+                            <a:srgbClr val="002060"/>
+                          </a:solidFill>
+                          <a:latin typeface="Cambria Math" panose="02040503050406030204" pitchFamily="18" charset="0"/>
+                          <a:cs typeface="Times New Roman" panose="02020603050405020304" pitchFamily="18" charset="0"/>
+                        </a:rPr>
+                        <m:t> ∀ </m:t>
+                      </m:r>
+                      <m:r>
+                        <a:rPr lang="en-US" sz="2400" b="0" i="1" kern="0" smtClean="0">
+                          <a:solidFill>
+                            <a:srgbClr val="002060"/>
+                          </a:solidFill>
+                          <a:latin typeface="Cambria Math" panose="02040503050406030204" pitchFamily="18" charset="0"/>
+                          <a:cs typeface="Times New Roman" panose="02020603050405020304" pitchFamily="18" charset="0"/>
+                        </a:rPr>
+                        <m:t>𝑢</m:t>
+                      </m:r>
+                      <m:r>
+                        <a:rPr lang="en-US" sz="2400" b="0" i="1" kern="0" smtClean="0">
+                          <a:solidFill>
+                            <a:srgbClr val="002060"/>
+                          </a:solidFill>
+                          <a:latin typeface="Cambria Math" panose="02040503050406030204" pitchFamily="18" charset="0"/>
+                          <a:cs typeface="Times New Roman" panose="02020603050405020304" pitchFamily="18" charset="0"/>
+                        </a:rPr>
+                        <m:t>∈</m:t>
+                      </m:r>
+                      <m:r>
+                        <a:rPr lang="en-US" sz="2400" b="0" i="1" kern="0" smtClean="0">
+                          <a:solidFill>
+                            <a:srgbClr val="002060"/>
+                          </a:solidFill>
+                          <a:latin typeface="Cambria Math" panose="02040503050406030204" pitchFamily="18" charset="0"/>
+                          <a:cs typeface="Times New Roman" panose="02020603050405020304" pitchFamily="18" charset="0"/>
+                        </a:rPr>
+                        <m:t>𝑈</m:t>
+                      </m:r>
+                    </m:oMath>
+                  </m:oMathPara>
+                </a14:m>
+                <a:endParaRPr lang="en-US" sz="2400" b="0" kern="0" dirty="0" smtClean="0">
+                  <a:solidFill>
+                    <a:srgbClr val="002060"/>
+                  </a:solidFill>
+                  <a:latin typeface="Times New Roman" panose="02020603050405020304" pitchFamily="18" charset="0"/>
+                  <a:cs typeface="Times New Roman" panose="02020603050405020304" pitchFamily="18" charset="0"/>
+                </a:endParaRPr>
+              </a:p>
+              <a:p>
+                <a:pPr marL="457200" indent="-457200" eaLnBrk="1" fontAlgn="auto" hangingPunct="1">
+                  <a:spcBef>
+                    <a:spcPts val="0"/>
+                  </a:spcBef>
+                  <a:spcAft>
+                    <a:spcPts val="0"/>
+                  </a:spcAft>
+                  <a:buFont typeface="+mj-lt"/>
+                  <a:buNone/>
+                  <a:defRPr/>
+                </a:pPr>
+                <a:endParaRPr lang="en-US" sz="2400" kern="0" dirty="0" smtClean="0">
+                  <a:solidFill>
+                    <a:srgbClr val="002060"/>
+                  </a:solidFill>
+                  <a:latin typeface="Times New Roman" panose="02020603050405020304" pitchFamily="18" charset="0"/>
+                  <a:cs typeface="Times New Roman" panose="02020603050405020304" pitchFamily="18" charset="0"/>
+                </a:endParaRPr>
+              </a:p>
+              <a:p>
+                <a:pPr marL="457200" indent="-457200" eaLnBrk="1" fontAlgn="auto" hangingPunct="1">
+                  <a:spcBef>
+                    <a:spcPts val="0"/>
+                  </a:spcBef>
+                  <a:spcAft>
+                    <a:spcPts val="0"/>
+                  </a:spcAft>
+                  <a:buFont typeface="+mj-lt"/>
+                  <a:buNone/>
+                  <a:defRPr/>
+                </a:pPr>
+                <a14:m>
+                  <m:oMathPara xmlns:m="http://schemas.openxmlformats.org/officeDocument/2006/math">
+                    <m:oMathParaPr>
+                      <m:jc m:val="centerGroup"/>
+                    </m:oMathParaPr>
+                    <m:oMath xmlns:m="http://schemas.openxmlformats.org/officeDocument/2006/math">
+                      <m:sSub>
+                        <m:sSubPr>
+                          <m:ctrlPr>
+                            <a:rPr lang="en-US" sz="2400" i="1" kern="0">
+                              <a:solidFill>
+                                <a:srgbClr val="002060"/>
+                              </a:solidFill>
+                              <a:latin typeface="Cambria Math" panose="02040503050406030204" pitchFamily="18" charset="0"/>
+                              <a:cs typeface="Times New Roman" panose="02020603050405020304" pitchFamily="18" charset="0"/>
+                            </a:rPr>
+                          </m:ctrlPr>
+                        </m:sSubPr>
+                        <m:e>
+                          <m:r>
+                            <a:rPr lang="en-US" sz="2400" b="0" i="1" kern="0" smtClean="0">
+                              <a:solidFill>
+                                <a:srgbClr val="002060"/>
+                              </a:solidFill>
+                              <a:latin typeface="Cambria Math" panose="02040503050406030204" pitchFamily="18" charset="0"/>
+                              <a:cs typeface="Times New Roman" panose="02020603050405020304" pitchFamily="18" charset="0"/>
+                            </a:rPr>
+                            <m:t>𝑦</m:t>
+                          </m:r>
+                        </m:e>
+                        <m:sub>
+                          <m:r>
+                            <a:rPr lang="en-US" sz="2400" b="0" i="1" kern="0" smtClean="0">
+                              <a:solidFill>
+                                <a:srgbClr val="002060"/>
+                              </a:solidFill>
+                              <a:latin typeface="Cambria Math" panose="02040503050406030204" pitchFamily="18" charset="0"/>
+                              <a:cs typeface="Times New Roman" panose="02020603050405020304" pitchFamily="18" charset="0"/>
+                            </a:rPr>
+                            <m:t>𝑖</m:t>
+                          </m:r>
+                        </m:sub>
+                      </m:sSub>
+                      <m:r>
+                        <a:rPr lang="en-US" sz="2400" i="1" kern="0">
+                          <a:solidFill>
+                            <a:srgbClr val="002060"/>
+                          </a:solidFill>
+                          <a:latin typeface="Cambria Math" panose="02040503050406030204" pitchFamily="18" charset="0"/>
+                          <a:cs typeface="Times New Roman" panose="02020603050405020304" pitchFamily="18" charset="0"/>
+                        </a:rPr>
+                        <m:t>=</m:t>
+                      </m:r>
+                      <m:d>
+                        <m:dPr>
+                          <m:begChr m:val="["/>
+                          <m:endChr m:val="]"/>
+                          <m:ctrlPr>
+                            <a:rPr lang="en-US" sz="2400" i="1" kern="0">
+                              <a:solidFill>
+                                <a:srgbClr val="002060"/>
+                              </a:solidFill>
+                              <a:latin typeface="Cambria Math" panose="02040503050406030204" pitchFamily="18" charset="0"/>
+                              <a:cs typeface="Times New Roman" panose="02020603050405020304" pitchFamily="18" charset="0"/>
+                            </a:rPr>
+                          </m:ctrlPr>
+                        </m:dPr>
+                        <m:e>
+                          <m:sSubSup>
+                            <m:sSubSupPr>
+                              <m:ctrlPr>
+                                <a:rPr lang="en-US" sz="2400" i="1" kern="0">
+                                  <a:solidFill>
+                                    <a:srgbClr val="002060"/>
+                                  </a:solidFill>
+                                  <a:latin typeface="Cambria Math" panose="02040503050406030204" pitchFamily="18" charset="0"/>
+                                  <a:cs typeface="Times New Roman" panose="02020603050405020304" pitchFamily="18" charset="0"/>
+                                </a:rPr>
+                              </m:ctrlPr>
+                            </m:sSubSupPr>
+                            <m:e>
+                              <m:r>
+                                <a:rPr lang="en-US" sz="2400" b="0" i="1" kern="0" smtClean="0">
+                                  <a:solidFill>
+                                    <a:srgbClr val="002060"/>
+                                  </a:solidFill>
+                                  <a:latin typeface="Cambria Math" panose="02040503050406030204" pitchFamily="18" charset="0"/>
+                                  <a:cs typeface="Times New Roman" panose="02020603050405020304" pitchFamily="18" charset="0"/>
+                                </a:rPr>
+                                <m:t>𝑦</m:t>
+                              </m:r>
+                            </m:e>
+                            <m:sub>
+                              <m:r>
+                                <a:rPr lang="en-US" sz="2400" b="0" i="1" kern="0" smtClean="0">
+                                  <a:solidFill>
+                                    <a:srgbClr val="002060"/>
+                                  </a:solidFill>
+                                  <a:latin typeface="Cambria Math" panose="02040503050406030204" pitchFamily="18" charset="0"/>
+                                  <a:cs typeface="Times New Roman" panose="02020603050405020304" pitchFamily="18" charset="0"/>
+                                </a:rPr>
+                                <m:t>𝑖</m:t>
+                              </m:r>
+                            </m:sub>
+                            <m:sup>
+                              <m:r>
+                                <a:rPr lang="en-US" sz="2400" i="1" kern="0">
+                                  <a:solidFill>
+                                    <a:srgbClr val="002060"/>
+                                  </a:solidFill>
+                                  <a:latin typeface="Cambria Math" panose="02040503050406030204" pitchFamily="18" charset="0"/>
+                                  <a:cs typeface="Times New Roman" panose="02020603050405020304" pitchFamily="18" charset="0"/>
+                                </a:rPr>
+                                <m:t>(1)</m:t>
+                              </m:r>
+                            </m:sup>
+                          </m:sSubSup>
+                          <m:r>
+                            <a:rPr lang="en-US" sz="2400" i="1" kern="0">
+                              <a:solidFill>
+                                <a:srgbClr val="002060"/>
+                              </a:solidFill>
+                              <a:latin typeface="Cambria Math" panose="02040503050406030204" pitchFamily="18" charset="0"/>
+                              <a:cs typeface="Times New Roman" panose="02020603050405020304" pitchFamily="18" charset="0"/>
+                            </a:rPr>
+                            <m:t>,</m:t>
+                          </m:r>
+                          <m:sSubSup>
+                            <m:sSubSupPr>
+                              <m:ctrlPr>
+                                <a:rPr lang="en-US" sz="2400" i="1" kern="0">
+                                  <a:solidFill>
+                                    <a:srgbClr val="002060"/>
+                                  </a:solidFill>
+                                  <a:latin typeface="Cambria Math" panose="02040503050406030204" pitchFamily="18" charset="0"/>
+                                  <a:cs typeface="Times New Roman" panose="02020603050405020304" pitchFamily="18" charset="0"/>
+                                </a:rPr>
+                              </m:ctrlPr>
+                            </m:sSubSupPr>
+                            <m:e>
+                              <m:r>
+                                <a:rPr lang="en-US" sz="2400" b="0" i="1" kern="0" smtClean="0">
+                                  <a:solidFill>
+                                    <a:srgbClr val="002060"/>
+                                  </a:solidFill>
+                                  <a:latin typeface="Cambria Math" panose="02040503050406030204" pitchFamily="18" charset="0"/>
+                                  <a:cs typeface="Times New Roman" panose="02020603050405020304" pitchFamily="18" charset="0"/>
+                                </a:rPr>
+                                <m:t>𝑦</m:t>
+                              </m:r>
+                            </m:e>
+                            <m:sub>
+                              <m:r>
+                                <a:rPr lang="en-US" sz="2400" b="0" i="1" kern="0" smtClean="0">
+                                  <a:solidFill>
+                                    <a:srgbClr val="002060"/>
+                                  </a:solidFill>
+                                  <a:latin typeface="Cambria Math" panose="02040503050406030204" pitchFamily="18" charset="0"/>
+                                  <a:cs typeface="Times New Roman" panose="02020603050405020304" pitchFamily="18" charset="0"/>
+                                </a:rPr>
+                                <m:t>𝑖</m:t>
+                              </m:r>
+                            </m:sub>
+                            <m:sup>
+                              <m:r>
+                                <a:rPr lang="en-US" sz="2400" i="1" kern="0">
+                                  <a:solidFill>
+                                    <a:srgbClr val="002060"/>
+                                  </a:solidFill>
+                                  <a:latin typeface="Cambria Math" panose="02040503050406030204" pitchFamily="18" charset="0"/>
+                                  <a:cs typeface="Times New Roman" panose="02020603050405020304" pitchFamily="18" charset="0"/>
+                                </a:rPr>
+                                <m:t>(</m:t>
+                              </m:r>
+                              <m:r>
+                                <a:rPr lang="en-US" sz="2400" i="1" kern="0">
+                                  <a:solidFill>
+                                    <a:srgbClr val="002060"/>
+                                  </a:solidFill>
+                                  <a:latin typeface="Cambria Math" panose="02040503050406030204" pitchFamily="18" charset="0"/>
+                                  <a:cs typeface="Times New Roman" panose="02020603050405020304" pitchFamily="18" charset="0"/>
+                                </a:rPr>
+                                <m:t>2</m:t>
+                              </m:r>
+                              <m:r>
+                                <a:rPr lang="en-US" sz="2400" i="1" kern="0">
+                                  <a:solidFill>
+                                    <a:srgbClr val="002060"/>
+                                  </a:solidFill>
+                                  <a:latin typeface="Cambria Math" panose="02040503050406030204" pitchFamily="18" charset="0"/>
+                                  <a:cs typeface="Times New Roman" panose="02020603050405020304" pitchFamily="18" charset="0"/>
+                                </a:rPr>
+                                <m:t>)</m:t>
+                              </m:r>
+                            </m:sup>
+                          </m:sSubSup>
+                          <m:r>
+                            <a:rPr lang="en-US" sz="2400" i="1" kern="0">
+                              <a:solidFill>
+                                <a:srgbClr val="002060"/>
+                              </a:solidFill>
+                              <a:latin typeface="Cambria Math" panose="02040503050406030204" pitchFamily="18" charset="0"/>
+                              <a:cs typeface="Times New Roman" panose="02020603050405020304" pitchFamily="18" charset="0"/>
+                            </a:rPr>
+                            <m:t>, …,</m:t>
+                          </m:r>
+                          <m:sSubSup>
+                            <m:sSubSupPr>
+                              <m:ctrlPr>
+                                <a:rPr lang="en-US" sz="2400" i="1" kern="0">
+                                  <a:solidFill>
+                                    <a:srgbClr val="002060"/>
+                                  </a:solidFill>
+                                  <a:latin typeface="Cambria Math" panose="02040503050406030204" pitchFamily="18" charset="0"/>
+                                  <a:cs typeface="Times New Roman" panose="02020603050405020304" pitchFamily="18" charset="0"/>
+                                </a:rPr>
+                              </m:ctrlPr>
+                            </m:sSubSupPr>
+                            <m:e>
+                              <m:r>
+                                <a:rPr lang="en-US" sz="2400" b="0" i="1" kern="0" smtClean="0">
+                                  <a:solidFill>
+                                    <a:srgbClr val="002060"/>
+                                  </a:solidFill>
+                                  <a:latin typeface="Cambria Math" panose="02040503050406030204" pitchFamily="18" charset="0"/>
+                                  <a:cs typeface="Times New Roman" panose="02020603050405020304" pitchFamily="18" charset="0"/>
+                                </a:rPr>
+                                <m:t>𝑦</m:t>
+                              </m:r>
+                            </m:e>
+                            <m:sub>
+                              <m:r>
+                                <a:rPr lang="en-US" sz="2400" b="0" i="1" kern="0" smtClean="0">
+                                  <a:solidFill>
+                                    <a:srgbClr val="002060"/>
+                                  </a:solidFill>
+                                  <a:latin typeface="Cambria Math" panose="02040503050406030204" pitchFamily="18" charset="0"/>
+                                  <a:cs typeface="Times New Roman" panose="02020603050405020304" pitchFamily="18" charset="0"/>
+                                </a:rPr>
+                                <m:t>𝑖</m:t>
+                              </m:r>
+                            </m:sub>
+                            <m:sup>
+                              <m:r>
+                                <a:rPr lang="en-US" sz="2400" i="1" kern="0">
+                                  <a:solidFill>
+                                    <a:srgbClr val="002060"/>
+                                  </a:solidFill>
+                                  <a:latin typeface="Cambria Math" panose="02040503050406030204" pitchFamily="18" charset="0"/>
+                                  <a:cs typeface="Times New Roman" panose="02020603050405020304" pitchFamily="18" charset="0"/>
+                                </a:rPr>
+                                <m:t>(</m:t>
+                              </m:r>
+                              <m:r>
+                                <a:rPr lang="en-US" sz="2400" i="1" kern="0">
+                                  <a:solidFill>
+                                    <a:srgbClr val="002060"/>
+                                  </a:solidFill>
+                                  <a:latin typeface="Cambria Math" panose="02040503050406030204" pitchFamily="18" charset="0"/>
+                                  <a:cs typeface="Times New Roman" panose="02020603050405020304" pitchFamily="18" charset="0"/>
+                                </a:rPr>
+                                <m:t>𝐾</m:t>
+                              </m:r>
+                              <m:r>
+                                <a:rPr lang="en-US" sz="2400" i="1" kern="0">
+                                  <a:solidFill>
+                                    <a:srgbClr val="002060"/>
+                                  </a:solidFill>
+                                  <a:latin typeface="Cambria Math" panose="02040503050406030204" pitchFamily="18" charset="0"/>
+                                  <a:cs typeface="Times New Roman" panose="02020603050405020304" pitchFamily="18" charset="0"/>
+                                </a:rPr>
+                                <m:t>)</m:t>
+                              </m:r>
+                            </m:sup>
+                          </m:sSubSup>
+                        </m:e>
+                      </m:d>
+                      <m:r>
+                        <a:rPr lang="en-US" sz="2400" b="0" i="1" kern="0" smtClean="0">
+                          <a:solidFill>
+                            <a:srgbClr val="002060"/>
+                          </a:solidFill>
+                          <a:latin typeface="Cambria Math" panose="02040503050406030204" pitchFamily="18" charset="0"/>
+                          <a:cs typeface="Times New Roman" panose="02020603050405020304" pitchFamily="18" charset="0"/>
+                        </a:rPr>
+                        <m:t> ∀</m:t>
+                      </m:r>
+                      <m:r>
+                        <a:rPr lang="en-US" sz="2400" b="0" i="1" kern="0" smtClean="0">
+                          <a:solidFill>
+                            <a:srgbClr val="002060"/>
+                          </a:solidFill>
+                          <a:latin typeface="Cambria Math" panose="02040503050406030204" pitchFamily="18" charset="0"/>
+                          <a:cs typeface="Times New Roman" panose="02020603050405020304" pitchFamily="18" charset="0"/>
+                        </a:rPr>
+                        <m:t>𝑖</m:t>
+                      </m:r>
+                      <m:r>
+                        <a:rPr lang="en-US" sz="2400" b="0" i="1" kern="0" smtClean="0">
+                          <a:solidFill>
+                            <a:srgbClr val="002060"/>
+                          </a:solidFill>
+                          <a:latin typeface="Cambria Math" panose="02040503050406030204" pitchFamily="18" charset="0"/>
+                          <a:cs typeface="Times New Roman" panose="02020603050405020304" pitchFamily="18" charset="0"/>
+                        </a:rPr>
+                        <m:t>∈</m:t>
+                      </m:r>
+                      <m:r>
+                        <a:rPr lang="en-US" sz="2400" b="0" i="1" kern="0" smtClean="0">
+                          <a:solidFill>
+                            <a:srgbClr val="002060"/>
+                          </a:solidFill>
+                          <a:latin typeface="Cambria Math" panose="02040503050406030204" pitchFamily="18" charset="0"/>
+                          <a:cs typeface="Times New Roman" panose="02020603050405020304" pitchFamily="18" charset="0"/>
+                        </a:rPr>
+                        <m:t>𝐼</m:t>
+                      </m:r>
+                    </m:oMath>
+                  </m:oMathPara>
+                </a14:m>
+                <a:endParaRPr lang="en-US" sz="2400" kern="0" dirty="0" smtClean="0">
+                  <a:solidFill>
+                    <a:srgbClr val="002060"/>
+                  </a:solidFill>
+                  <a:latin typeface="Times New Roman" panose="02020603050405020304" pitchFamily="18" charset="0"/>
+                  <a:cs typeface="Times New Roman" panose="02020603050405020304" pitchFamily="18" charset="0"/>
+                </a:endParaRPr>
+              </a:p>
+              <a:p>
+                <a:pPr marL="457200" indent="-457200" eaLnBrk="1" fontAlgn="auto" hangingPunct="1">
+                  <a:spcBef>
+                    <a:spcPts val="0"/>
+                  </a:spcBef>
+                  <a:spcAft>
+                    <a:spcPts val="0"/>
+                  </a:spcAft>
+                  <a:buFont typeface="+mj-lt"/>
+                  <a:buNone/>
+                  <a:defRPr/>
+                </a:pPr>
+                <a:endParaRPr lang="en-US" sz="2400" kern="0" dirty="0">
+                  <a:solidFill>
+                    <a:srgbClr val="002060"/>
+                  </a:solidFill>
+                  <a:latin typeface="Times New Roman" panose="02020603050405020304" pitchFamily="18" charset="0"/>
+                  <a:cs typeface="Times New Roman" panose="02020603050405020304" pitchFamily="18" charset="0"/>
+                </a:endParaRPr>
+              </a:p>
+              <a:p>
+                <a:pPr marL="457200" indent="-457200" eaLnBrk="1" fontAlgn="auto" hangingPunct="1">
+                  <a:spcBef>
+                    <a:spcPts val="0"/>
+                  </a:spcBef>
+                  <a:spcAft>
+                    <a:spcPts val="0"/>
+                  </a:spcAft>
+                  <a:buFont typeface="+mj-lt"/>
+                  <a:buNone/>
+                  <a:defRPr/>
+                </a:pPr>
+                <a14:m>
+                  <m:oMathPara xmlns:m="http://schemas.openxmlformats.org/officeDocument/2006/math">
+                    <m:oMathParaPr>
+                      <m:jc m:val="centerGroup"/>
+                    </m:oMathParaPr>
+                    <m:oMath xmlns:m="http://schemas.openxmlformats.org/officeDocument/2006/math">
+                      <m:sSubSup>
+                        <m:sSubSupPr>
+                          <m:ctrlPr>
+                            <a:rPr lang="en-US" sz="2400" b="0" i="1" kern="0" smtClean="0">
+                              <a:solidFill>
+                                <a:srgbClr val="002060"/>
+                              </a:solidFill>
+                              <a:latin typeface="Cambria Math" panose="02040503050406030204" pitchFamily="18" charset="0"/>
+                              <a:cs typeface="Times New Roman" panose="02020603050405020304" pitchFamily="18" charset="0"/>
+                            </a:rPr>
+                          </m:ctrlPr>
+                        </m:sSubSupPr>
+                        <m:e>
+                          <m:r>
+                            <a:rPr lang="en-US" sz="2400" b="0" i="1" kern="0" smtClean="0">
+                              <a:solidFill>
+                                <a:srgbClr val="002060"/>
+                              </a:solidFill>
+                              <a:latin typeface="Cambria Math" panose="02040503050406030204" pitchFamily="18" charset="0"/>
+                              <a:cs typeface="Times New Roman" panose="02020603050405020304" pitchFamily="18" charset="0"/>
+                            </a:rPr>
+                            <m:t>𝑥</m:t>
+                          </m:r>
+                        </m:e>
+                        <m:sub>
+                          <m:r>
+                            <a:rPr lang="en-US" sz="2400" b="0" i="1" kern="0" smtClean="0">
+                              <a:solidFill>
+                                <a:srgbClr val="002060"/>
+                              </a:solidFill>
+                              <a:latin typeface="Cambria Math" panose="02040503050406030204" pitchFamily="18" charset="0"/>
+                              <a:cs typeface="Times New Roman" panose="02020603050405020304" pitchFamily="18" charset="0"/>
+                            </a:rPr>
+                            <m:t>𝑢</m:t>
+                          </m:r>
+                        </m:sub>
+                        <m:sup>
+                          <m:r>
+                            <a:rPr lang="en-US" sz="2400" b="0" i="1" kern="0" smtClean="0">
+                              <a:solidFill>
+                                <a:srgbClr val="002060"/>
+                              </a:solidFill>
+                              <a:latin typeface="Cambria Math" panose="02040503050406030204" pitchFamily="18" charset="0"/>
+                              <a:cs typeface="Times New Roman" panose="02020603050405020304" pitchFamily="18" charset="0"/>
+                            </a:rPr>
+                            <m:t>𝑇</m:t>
+                          </m:r>
+                        </m:sup>
+                      </m:sSubSup>
+                      <m:sSub>
+                        <m:sSubPr>
+                          <m:ctrlPr>
+                            <a:rPr lang="en-US" sz="2400" b="0" i="1" kern="0" smtClean="0">
+                              <a:solidFill>
+                                <a:srgbClr val="002060"/>
+                              </a:solidFill>
+                              <a:latin typeface="Cambria Math" panose="02040503050406030204" pitchFamily="18" charset="0"/>
+                              <a:cs typeface="Times New Roman" panose="02020603050405020304" pitchFamily="18" charset="0"/>
+                            </a:rPr>
+                          </m:ctrlPr>
+                        </m:sSubPr>
+                        <m:e>
+                          <m:r>
+                            <a:rPr lang="en-US" sz="2400" b="0" i="1" kern="0" smtClean="0">
+                              <a:solidFill>
+                                <a:srgbClr val="002060"/>
+                              </a:solidFill>
+                              <a:latin typeface="Cambria Math" panose="02040503050406030204" pitchFamily="18" charset="0"/>
+                              <a:cs typeface="Times New Roman" panose="02020603050405020304" pitchFamily="18" charset="0"/>
+                            </a:rPr>
+                            <m:t>𝑦</m:t>
+                          </m:r>
+                        </m:e>
+                        <m:sub>
+                          <m:r>
+                            <a:rPr lang="en-US" sz="2400" b="0" i="1" kern="0" smtClean="0">
+                              <a:solidFill>
+                                <a:srgbClr val="002060"/>
+                              </a:solidFill>
+                              <a:latin typeface="Cambria Math" panose="02040503050406030204" pitchFamily="18" charset="0"/>
+                              <a:cs typeface="Times New Roman" panose="02020603050405020304" pitchFamily="18" charset="0"/>
+                            </a:rPr>
+                            <m:t>𝑖</m:t>
+                          </m:r>
+                        </m:sub>
+                      </m:sSub>
+                      <m:r>
+                        <a:rPr lang="en-US" sz="2400" b="0" i="1" kern="0" smtClean="0">
+                          <a:solidFill>
+                            <a:srgbClr val="002060"/>
+                          </a:solidFill>
+                          <a:latin typeface="Cambria Math" panose="02040503050406030204" pitchFamily="18" charset="0"/>
+                          <a:cs typeface="Times New Roman" panose="02020603050405020304" pitchFamily="18" charset="0"/>
+                        </a:rPr>
+                        <m:t>=</m:t>
+                      </m:r>
+                      <m:nary>
+                        <m:naryPr>
+                          <m:chr m:val="∑"/>
+                          <m:supHide m:val="on"/>
+                          <m:ctrlPr>
+                            <a:rPr lang="en-US" sz="2400" i="1" kern="0">
+                              <a:solidFill>
+                                <a:srgbClr val="002060"/>
+                              </a:solidFill>
+                              <a:latin typeface="Cambria Math" panose="02040503050406030204" pitchFamily="18" charset="0"/>
+                              <a:cs typeface="Times New Roman" panose="02020603050405020304" pitchFamily="18" charset="0"/>
+                            </a:rPr>
+                          </m:ctrlPr>
+                        </m:naryPr>
+                        <m:sub>
+                          <m:r>
+                            <m:rPr>
+                              <m:brk m:alnAt="7"/>
+                            </m:rPr>
+                            <a:rPr lang="en-US" sz="2400" i="1" kern="0">
+                              <a:solidFill>
+                                <a:srgbClr val="002060"/>
+                              </a:solidFill>
+                              <a:latin typeface="Cambria Math" panose="02040503050406030204" pitchFamily="18" charset="0"/>
+                              <a:cs typeface="Times New Roman" panose="02020603050405020304" pitchFamily="18" charset="0"/>
+                            </a:rPr>
+                            <m:t>𝑘</m:t>
+                          </m:r>
+                        </m:sub>
+                        <m:sup/>
+                        <m:e>
+                          <m:sSubSup>
+                            <m:sSubSupPr>
+                              <m:ctrlPr>
+                                <a:rPr lang="en-US" sz="2400" i="1" kern="0">
+                                  <a:solidFill>
+                                    <a:srgbClr val="002060"/>
+                                  </a:solidFill>
+                                  <a:latin typeface="Cambria Math" panose="02040503050406030204" pitchFamily="18" charset="0"/>
+                                  <a:cs typeface="Times New Roman" panose="02020603050405020304" pitchFamily="18" charset="0"/>
+                                </a:rPr>
+                              </m:ctrlPr>
+                            </m:sSubSupPr>
+                            <m:e>
+                              <m:r>
+                                <a:rPr lang="en-US" sz="2400" i="1" kern="0">
+                                  <a:solidFill>
+                                    <a:srgbClr val="002060"/>
+                                  </a:solidFill>
+                                  <a:latin typeface="Cambria Math" panose="02040503050406030204" pitchFamily="18" charset="0"/>
+                                  <a:cs typeface="Times New Roman" panose="02020603050405020304" pitchFamily="18" charset="0"/>
+                                </a:rPr>
+                                <m:t>𝑥</m:t>
+                              </m:r>
+                            </m:e>
+                            <m:sub>
+                              <m:r>
+                                <a:rPr lang="en-US" sz="2400" i="1" kern="0">
+                                  <a:solidFill>
+                                    <a:srgbClr val="002060"/>
+                                  </a:solidFill>
+                                  <a:latin typeface="Cambria Math" panose="02040503050406030204" pitchFamily="18" charset="0"/>
+                                  <a:cs typeface="Times New Roman" panose="02020603050405020304" pitchFamily="18" charset="0"/>
+                                </a:rPr>
+                                <m:t>𝑢</m:t>
+                              </m:r>
+                            </m:sub>
+                            <m:sup>
+                              <m:d>
+                                <m:dPr>
+                                  <m:ctrlPr>
+                                    <a:rPr lang="en-US" sz="2400" i="1" kern="0">
+                                      <a:solidFill>
+                                        <a:srgbClr val="002060"/>
+                                      </a:solidFill>
+                                      <a:latin typeface="Cambria Math" panose="02040503050406030204" pitchFamily="18" charset="0"/>
+                                      <a:cs typeface="Times New Roman" panose="02020603050405020304" pitchFamily="18" charset="0"/>
+                                    </a:rPr>
+                                  </m:ctrlPr>
+                                </m:dPr>
+                                <m:e>
+                                  <m:r>
+                                    <a:rPr lang="en-US" sz="2400" i="1" kern="0">
+                                      <a:solidFill>
+                                        <a:srgbClr val="002060"/>
+                                      </a:solidFill>
+                                      <a:latin typeface="Cambria Math" panose="02040503050406030204" pitchFamily="18" charset="0"/>
+                                      <a:cs typeface="Times New Roman" panose="02020603050405020304" pitchFamily="18" charset="0"/>
+                                    </a:rPr>
+                                    <m:t>𝑘</m:t>
+                                  </m:r>
+                                </m:e>
+                              </m:d>
+                              <m:r>
+                                <a:rPr lang="en-US" sz="2400" i="1" kern="0">
+                                  <a:solidFill>
+                                    <a:srgbClr val="002060"/>
+                                  </a:solidFill>
+                                  <a:latin typeface="Cambria Math" panose="02040503050406030204" pitchFamily="18" charset="0"/>
+                                  <a:cs typeface="Times New Roman" panose="02020603050405020304" pitchFamily="18" charset="0"/>
+                                </a:rPr>
+                                <m:t>𝑇</m:t>
+                              </m:r>
+                            </m:sup>
+                          </m:sSubSup>
+                          <m:sSubSup>
+                            <m:sSubSupPr>
+                              <m:ctrlPr>
+                                <a:rPr lang="en-US" sz="2400" i="1" kern="0">
+                                  <a:solidFill>
+                                    <a:srgbClr val="002060"/>
+                                  </a:solidFill>
+                                  <a:latin typeface="Cambria Math" panose="02040503050406030204" pitchFamily="18" charset="0"/>
+                                  <a:cs typeface="Times New Roman" panose="02020603050405020304" pitchFamily="18" charset="0"/>
+                                </a:rPr>
+                              </m:ctrlPr>
+                            </m:sSubSupPr>
+                            <m:e>
+                              <m:r>
+                                <a:rPr lang="en-US" sz="2400" i="1" kern="0">
+                                  <a:solidFill>
+                                    <a:srgbClr val="002060"/>
+                                  </a:solidFill>
+                                  <a:latin typeface="Cambria Math" panose="02040503050406030204" pitchFamily="18" charset="0"/>
+                                  <a:cs typeface="Times New Roman" panose="02020603050405020304" pitchFamily="18" charset="0"/>
+                                </a:rPr>
+                                <m:t>𝑦</m:t>
+                              </m:r>
+                            </m:e>
+                            <m:sub>
+                              <m:r>
+                                <a:rPr lang="en-US" sz="2400" i="1" kern="0">
+                                  <a:solidFill>
+                                    <a:srgbClr val="002060"/>
+                                  </a:solidFill>
+                                  <a:latin typeface="Cambria Math" panose="02040503050406030204" pitchFamily="18" charset="0"/>
+                                  <a:cs typeface="Times New Roman" panose="02020603050405020304" pitchFamily="18" charset="0"/>
+                                </a:rPr>
+                                <m:t>𝑖</m:t>
+                              </m:r>
+                            </m:sub>
+                            <m:sup>
+                              <m:r>
+                                <a:rPr lang="en-US" sz="2400" i="1" kern="0">
+                                  <a:solidFill>
+                                    <a:srgbClr val="002060"/>
+                                  </a:solidFill>
+                                  <a:latin typeface="Cambria Math" panose="02040503050406030204" pitchFamily="18" charset="0"/>
+                                  <a:cs typeface="Times New Roman" panose="02020603050405020304" pitchFamily="18" charset="0"/>
+                                </a:rPr>
+                                <m:t>(</m:t>
+                              </m:r>
+                              <m:r>
+                                <a:rPr lang="en-US" sz="2400" i="1" kern="0">
+                                  <a:solidFill>
+                                    <a:srgbClr val="002060"/>
+                                  </a:solidFill>
+                                  <a:latin typeface="Cambria Math" panose="02040503050406030204" pitchFamily="18" charset="0"/>
+                                  <a:cs typeface="Times New Roman" panose="02020603050405020304" pitchFamily="18" charset="0"/>
+                                </a:rPr>
+                                <m:t>𝑘</m:t>
+                              </m:r>
+                              <m:r>
+                                <a:rPr lang="en-US" sz="2400" i="1" kern="0">
+                                  <a:solidFill>
+                                    <a:srgbClr val="002060"/>
+                                  </a:solidFill>
+                                  <a:latin typeface="Cambria Math" panose="02040503050406030204" pitchFamily="18" charset="0"/>
+                                  <a:cs typeface="Times New Roman" panose="02020603050405020304" pitchFamily="18" charset="0"/>
+                                </a:rPr>
+                                <m:t>)</m:t>
+                              </m:r>
+                            </m:sup>
+                          </m:sSubSup>
+                        </m:e>
+                      </m:nary>
+                      <m:r>
+                        <a:rPr lang="en-US" sz="2400" i="1" kern="0" smtClean="0">
+                          <a:solidFill>
+                            <a:srgbClr val="002060"/>
+                          </a:solidFill>
+                          <a:latin typeface="Cambria Math" panose="02040503050406030204" pitchFamily="18" charset="0"/>
+                          <a:ea typeface="Cambria Math" panose="02040503050406030204" pitchFamily="18" charset="0"/>
+                          <a:cs typeface="Times New Roman" panose="02020603050405020304" pitchFamily="18" charset="0"/>
+                        </a:rPr>
+                        <m:t>≈</m:t>
+                      </m:r>
+                      <m:nary>
+                        <m:naryPr>
+                          <m:chr m:val="∑"/>
+                          <m:supHide m:val="on"/>
+                          <m:ctrlPr>
+                            <a:rPr lang="en-US" sz="2400" i="1" kern="0">
+                              <a:solidFill>
+                                <a:srgbClr val="002060"/>
+                              </a:solidFill>
+                              <a:latin typeface="Cambria Math" panose="02040503050406030204" pitchFamily="18" charset="0"/>
+                              <a:cs typeface="Times New Roman" panose="02020603050405020304" pitchFamily="18" charset="0"/>
+                            </a:rPr>
+                          </m:ctrlPr>
+                        </m:naryPr>
+                        <m:sub>
+                          <m:r>
+                            <m:rPr>
+                              <m:brk m:alnAt="7"/>
+                            </m:rPr>
+                            <a:rPr lang="en-US" sz="2400" i="1" kern="0">
+                              <a:solidFill>
+                                <a:srgbClr val="002060"/>
+                              </a:solidFill>
+                              <a:latin typeface="Cambria Math" panose="02040503050406030204" pitchFamily="18" charset="0"/>
+                              <a:cs typeface="Times New Roman" panose="02020603050405020304" pitchFamily="18" charset="0"/>
+                            </a:rPr>
+                            <m:t>𝑘</m:t>
+                          </m:r>
+                        </m:sub>
+                        <m:sup/>
+                        <m:e>
+                          <m:sSubSup>
+                            <m:sSubSupPr>
+                              <m:ctrlPr>
+                                <a:rPr lang="en-US" sz="2400" i="1" kern="0">
+                                  <a:solidFill>
+                                    <a:srgbClr val="002060"/>
+                                  </a:solidFill>
+                                  <a:latin typeface="Cambria Math" panose="02040503050406030204" pitchFamily="18" charset="0"/>
+                                  <a:cs typeface="Times New Roman" panose="02020603050405020304" pitchFamily="18" charset="0"/>
+                                </a:rPr>
+                              </m:ctrlPr>
+                            </m:sSubSupPr>
+                            <m:e>
+                              <m:r>
+                                <a:rPr lang="en-US" sz="2400" i="1" kern="0">
+                                  <a:solidFill>
+                                    <a:srgbClr val="002060"/>
+                                  </a:solidFill>
+                                  <a:latin typeface="Cambria Math" panose="02040503050406030204" pitchFamily="18" charset="0"/>
+                                  <a:cs typeface="Times New Roman" panose="02020603050405020304" pitchFamily="18" charset="0"/>
+                                </a:rPr>
+                                <m:t>𝑥</m:t>
+                              </m:r>
+                            </m:e>
+                            <m:sub>
+                              <m:r>
+                                <a:rPr lang="en-US" sz="2400" i="1" kern="0">
+                                  <a:solidFill>
+                                    <a:srgbClr val="002060"/>
+                                  </a:solidFill>
+                                  <a:latin typeface="Cambria Math" panose="02040503050406030204" pitchFamily="18" charset="0"/>
+                                  <a:cs typeface="Times New Roman" panose="02020603050405020304" pitchFamily="18" charset="0"/>
+                                </a:rPr>
+                                <m:t>𝑢</m:t>
+                              </m:r>
+                            </m:sub>
+                            <m:sup>
+                              <m:d>
+                                <m:dPr>
+                                  <m:ctrlPr>
+                                    <a:rPr lang="en-US" sz="2400" i="1" kern="0">
+                                      <a:solidFill>
+                                        <a:srgbClr val="002060"/>
+                                      </a:solidFill>
+                                      <a:latin typeface="Cambria Math" panose="02040503050406030204" pitchFamily="18" charset="0"/>
+                                      <a:cs typeface="Times New Roman" panose="02020603050405020304" pitchFamily="18" charset="0"/>
+                                    </a:rPr>
+                                  </m:ctrlPr>
+                                </m:dPr>
+                                <m:e>
+                                  <m:r>
+                                    <a:rPr lang="en-US" sz="2400" i="1" kern="0">
+                                      <a:solidFill>
+                                        <a:srgbClr val="002060"/>
+                                      </a:solidFill>
+                                      <a:latin typeface="Cambria Math" panose="02040503050406030204" pitchFamily="18" charset="0"/>
+                                      <a:cs typeface="Times New Roman" panose="02020603050405020304" pitchFamily="18" charset="0"/>
+                                    </a:rPr>
+                                    <m:t>𝑘</m:t>
+                                  </m:r>
+                                </m:e>
+                              </m:d>
+                              <m:r>
+                                <a:rPr lang="en-US" sz="2400" i="1" kern="0">
+                                  <a:solidFill>
+                                    <a:srgbClr val="002060"/>
+                                  </a:solidFill>
+                                  <a:latin typeface="Cambria Math" panose="02040503050406030204" pitchFamily="18" charset="0"/>
+                                  <a:cs typeface="Times New Roman" panose="02020603050405020304" pitchFamily="18" charset="0"/>
+                                </a:rPr>
+                                <m:t>𝑇</m:t>
+                              </m:r>
+                            </m:sup>
+                          </m:sSubSup>
+                          <m:sSup>
+                            <m:sSupPr>
+                              <m:ctrlPr>
+                                <a:rPr lang="en-US" sz="2400" b="0" i="1" kern="0" smtClean="0">
+                                  <a:solidFill>
+                                    <a:srgbClr val="002060"/>
+                                  </a:solidFill>
+                                  <a:latin typeface="Cambria Math" panose="02040503050406030204" pitchFamily="18" charset="0"/>
+                                  <a:cs typeface="Times New Roman" panose="02020603050405020304" pitchFamily="18" charset="0"/>
+                                </a:rPr>
+                              </m:ctrlPr>
+                            </m:sSupPr>
+                            <m:e>
+                              <m:r>
+                                <a:rPr lang="en-US" sz="2400" i="1" kern="0" smtClean="0">
+                                  <a:solidFill>
+                                    <a:srgbClr val="002060"/>
+                                  </a:solidFill>
+                                  <a:latin typeface="Cambria Math" panose="02040503050406030204" pitchFamily="18" charset="0"/>
+                                  <a:cs typeface="Times New Roman" panose="02020603050405020304" pitchFamily="18" charset="0"/>
+                                </a:rPr>
+                                <m:t>𝑈</m:t>
+                              </m:r>
+                            </m:e>
+                            <m:sup>
+                              <m:d>
+                                <m:dPr>
+                                  <m:ctrlPr>
+                                    <a:rPr lang="en-US" sz="2400" b="0" i="1" kern="0" smtClean="0">
+                                      <a:solidFill>
+                                        <a:srgbClr val="002060"/>
+                                      </a:solidFill>
+                                      <a:latin typeface="Cambria Math" panose="02040503050406030204" pitchFamily="18" charset="0"/>
+                                      <a:cs typeface="Times New Roman" panose="02020603050405020304" pitchFamily="18" charset="0"/>
+                                    </a:rPr>
+                                  </m:ctrlPr>
+                                </m:dPr>
+                                <m:e>
+                                  <m:r>
+                                    <a:rPr lang="en-US" sz="2400" b="0" i="1" kern="0" smtClean="0">
+                                      <a:solidFill>
+                                        <a:srgbClr val="002060"/>
+                                      </a:solidFill>
+                                      <a:latin typeface="Cambria Math" panose="02040503050406030204" pitchFamily="18" charset="0"/>
+                                      <a:cs typeface="Times New Roman" panose="02020603050405020304" pitchFamily="18" charset="0"/>
+                                    </a:rPr>
+                                    <m:t>𝑘</m:t>
+                                  </m:r>
+                                </m:e>
+                              </m:d>
+                            </m:sup>
+                          </m:sSup>
+                          <m:sSubSup>
+                            <m:sSubSupPr>
+                              <m:ctrlPr>
+                                <a:rPr lang="en-US" sz="2400" b="0" i="1" kern="0" smtClean="0">
+                                  <a:solidFill>
+                                    <a:srgbClr val="002060"/>
+                                  </a:solidFill>
+                                  <a:latin typeface="Cambria Math" panose="02040503050406030204" pitchFamily="18" charset="0"/>
+                                  <a:cs typeface="Times New Roman" panose="02020603050405020304" pitchFamily="18" charset="0"/>
+                                </a:rPr>
+                              </m:ctrlPr>
+                            </m:sSubSupPr>
+                            <m:e>
+                              <m:r>
+                                <a:rPr lang="en-US" sz="2400" b="0" i="1" kern="0" smtClean="0">
+                                  <a:solidFill>
+                                    <a:srgbClr val="002060"/>
+                                  </a:solidFill>
+                                  <a:latin typeface="Cambria Math" panose="02040503050406030204" pitchFamily="18" charset="0"/>
+                                  <a:cs typeface="Times New Roman" panose="02020603050405020304" pitchFamily="18" charset="0"/>
+                                </a:rPr>
+                                <m:t>𝛼</m:t>
+                              </m:r>
+                            </m:e>
+                            <m:sub>
+                              <m:sSub>
+                                <m:sSubPr>
+                                  <m:ctrlPr>
+                                    <a:rPr lang="en-US" sz="2400" b="0" i="1" kern="0" smtClean="0">
+                                      <a:solidFill>
+                                        <a:srgbClr val="002060"/>
+                                      </a:solidFill>
+                                      <a:latin typeface="Cambria Math" panose="02040503050406030204" pitchFamily="18" charset="0"/>
+                                      <a:cs typeface="Times New Roman" panose="02020603050405020304" pitchFamily="18" charset="0"/>
+                                    </a:rPr>
+                                  </m:ctrlPr>
+                                </m:sSubPr>
+                                <m:e>
+                                  <m:r>
+                                    <a:rPr lang="en-US" sz="2400" b="0" i="1" kern="0" smtClean="0">
+                                      <a:solidFill>
+                                        <a:srgbClr val="002060"/>
+                                      </a:solidFill>
+                                      <a:latin typeface="Cambria Math" panose="02040503050406030204" pitchFamily="18" charset="0"/>
+                                      <a:cs typeface="Times New Roman" panose="02020603050405020304" pitchFamily="18" charset="0"/>
+                                    </a:rPr>
+                                    <m:t>𝑥</m:t>
+                                  </m:r>
+                                </m:e>
+                                <m:sub>
+                                  <m:r>
+                                    <a:rPr lang="en-US" sz="2400" b="0" i="1" kern="0" smtClean="0">
+                                      <a:solidFill>
+                                        <a:srgbClr val="002060"/>
+                                      </a:solidFill>
+                                      <a:latin typeface="Cambria Math" panose="02040503050406030204" pitchFamily="18" charset="0"/>
+                                      <a:cs typeface="Times New Roman" panose="02020603050405020304" pitchFamily="18" charset="0"/>
+                                    </a:rPr>
+                                    <m:t>𝑢</m:t>
+                                  </m:r>
+                                </m:sub>
+                              </m:sSub>
+                            </m:sub>
+                            <m:sup>
+                              <m:d>
+                                <m:dPr>
+                                  <m:ctrlPr>
+                                    <a:rPr lang="en-US" sz="2400" b="0" i="1" kern="0" smtClean="0">
+                                      <a:solidFill>
+                                        <a:srgbClr val="002060"/>
+                                      </a:solidFill>
+                                      <a:latin typeface="Cambria Math" panose="02040503050406030204" pitchFamily="18" charset="0"/>
+                                      <a:cs typeface="Times New Roman" panose="02020603050405020304" pitchFamily="18" charset="0"/>
+                                    </a:rPr>
+                                  </m:ctrlPr>
+                                </m:dPr>
+                                <m:e>
+                                  <m:r>
+                                    <a:rPr lang="en-US" sz="2400" b="0" i="1" kern="0" smtClean="0">
+                                      <a:solidFill>
+                                        <a:srgbClr val="002060"/>
+                                      </a:solidFill>
+                                      <a:latin typeface="Cambria Math" panose="02040503050406030204" pitchFamily="18" charset="0"/>
+                                      <a:cs typeface="Times New Roman" panose="02020603050405020304" pitchFamily="18" charset="0"/>
+                                    </a:rPr>
+                                    <m:t>𝑘</m:t>
+                                  </m:r>
+                                </m:e>
+                              </m:d>
+                            </m:sup>
+                          </m:sSubSup>
+                        </m:e>
+                      </m:nary>
+                    </m:oMath>
+                  </m:oMathPara>
+                </a14:m>
+                <a:endParaRPr lang="en-US" sz="2400" kern="0" dirty="0">
+                  <a:solidFill>
+                    <a:srgbClr val="002060"/>
+                  </a:solidFill>
+                  <a:latin typeface="Times New Roman" panose="02020603050405020304" pitchFamily="18" charset="0"/>
+                  <a:cs typeface="Times New Roman" panose="02020603050405020304" pitchFamily="18" charset="0"/>
+                </a:endParaRPr>
+              </a:p>
+            </p:txBody>
+          </p:sp>
+        </mc:Choice>
+        <mc:Fallback>
+          <p:sp>
+            <p:nvSpPr>
+              <p:cNvPr id="7" name="Content Placeholder 2"/>
+              <p:cNvSpPr txBox="1">
+                <a:spLocks noRot="1" noChangeAspect="1" noMove="1" noResize="1" noEditPoints="1" noAdjustHandles="1" noChangeArrowheads="1" noChangeShapeType="1" noTextEdit="1"/>
+              </p:cNvSpPr>
+              <p:nvPr/>
+            </p:nvSpPr>
+            <p:spPr bwMode="auto">
+              <a:xfrm>
+                <a:off x="1295400" y="2618839"/>
+                <a:ext cx="5943600" cy="2827249"/>
+              </a:xfrm>
+              <a:prstGeom prst="rect">
+                <a:avLst/>
+              </a:prstGeom>
+              <a:blipFill rotWithShape="0">
+                <a:blip r:embed="rId3"/>
+                <a:stretch>
+                  <a:fillRect/>
+                </a:stretch>
+              </a:blipFill>
+              <a:ln>
+                <a:noFill/>
+              </a:ln>
+              <a:effectLst/>
+              <a:extLst>
+                <a:ext uri="{909E8E84-426E-40DD-AFC4-6F175D3DCCD1}">
+                  <a14:hiddenFill xmlns:a14="http://schemas.microsoft.com/office/drawing/2010/main">
+                    <a:solidFill>
+                      <a:schemeClr val="accent1"/>
+                    </a:solidFill>
+                  </a14:hiddenFill>
+                </a:ext>
+                <a:ext uri="{91240B29-F687-4F45-9708-019B960494DF}">
+                  <a14:hiddenLine xmlns:a14="http://schemas.microsoft.com/office/drawing/2010/main" w="9525">
+                    <a:solidFill>
+                      <a:schemeClr val="tx1"/>
+                    </a:solidFill>
+                    <a:miter lim="800000"/>
+                    <a:headEnd/>
+                    <a:tailEnd/>
+                  </a14:hiddenLine>
+                </a:ext>
+                <a:ext uri="{AF507438-7753-43E0-B8FC-AC1667EBCBE1}">
+                  <a14:hiddenEffects xmlns:a14="http://schemas.microsoft.com/office/drawing/2010/main">
+                    <a:effectLst>
+                      <a:outerShdw dist="35921" dir="2700000" algn="ctr" rotWithShape="0">
+                        <a:schemeClr val="bg2"/>
+                      </a:outerShdw>
+                    </a:effectLst>
+                  </a14:hiddenEffects>
+                </a:ext>
+              </a:extLst>
+            </p:spPr>
+            <p:txBody>
+              <a:bodyPr/>
+              <a:lstStyle/>
+              <a:p>
+                <a:r>
+                  <a:rPr lang="en-SG">
+                    <a:noFill/>
+                  </a:rPr>
+                  <a:t> </a:t>
+                </a:r>
+              </a:p>
+            </p:txBody>
+          </p:sp>
+        </mc:Fallback>
+      </mc:AlternateContent>
     </p:spTree>
     <p:extLst>
       <p:ext uri="{BB962C8B-B14F-4D97-AF65-F5344CB8AC3E}">
@@ -32765,6 +34390,13 @@
   <p:clrMapOvr>
     <a:masterClrMapping/>
   </p:clrMapOvr>
+  <p:timing>
+    <p:tnLst>
+      <p:par>
+        <p:cTn id="1" dur="indefinite" restart="never" nodeType="tmRoot"/>
+      </p:par>
+    </p:tnLst>
+  </p:timing>
 </p:sld>
 </file>
 
@@ -32797,7 +34429,7 @@
         </p:nvSpPr>
         <p:spPr>
           <a:xfrm>
-            <a:off x="381000" y="287978"/>
+            <a:off x="76200" y="287978"/>
             <a:ext cx="6553200" cy="523220"/>
           </a:xfrm>
         </p:spPr>
@@ -32897,6 +34529,13 @@
   <p:clrMapOvr>
     <a:masterClrMapping/>
   </p:clrMapOvr>
+  <p:timing>
+    <p:tnLst>
+      <p:par>
+        <p:cTn id="1" dur="indefinite" restart="never" nodeType="tmRoot"/>
+      </p:par>
+    </p:tnLst>
+  </p:timing>
 </p:sld>
 </file>
 
@@ -32938,18 +34577,32 @@
           <a:lstStyle/>
           <a:p>
             <a:r>
+              <a:rPr lang="en-US" sz="2800" dirty="0" smtClean="0">
+                <a:latin typeface="Times New Roman" panose="02020603050405020304" pitchFamily="18" charset="0"/>
+                <a:cs typeface="Times New Roman" panose="02020603050405020304" pitchFamily="18" charset="0"/>
+              </a:rPr>
+              <a:t>A Framework </a:t>
+            </a:r>
+            <a:r>
               <a:rPr lang="en-US" sz="2800" dirty="0">
                 <a:latin typeface="Times New Roman" panose="02020603050405020304" pitchFamily="18" charset="0"/>
                 <a:cs typeface="Times New Roman" panose="02020603050405020304" pitchFamily="18" charset="0"/>
               </a:rPr>
-              <a:t>Essential Components for a </a:t>
+              <a:t>for </a:t>
             </a:r>
             <a:r>
               <a:rPr lang="en-US" sz="2800" dirty="0" smtClean="0">
                 <a:latin typeface="Times New Roman" panose="02020603050405020304" pitchFamily="18" charset="0"/>
                 <a:cs typeface="Times New Roman" panose="02020603050405020304" pitchFamily="18" charset="0"/>
               </a:rPr>
-              <a:t>Fast MIPS</a:t>
+              <a:t>an Efficient </a:t>
+            </a:r>
+            <a:r>
+              <a:rPr lang="en-US" sz="2800" dirty="0" smtClean="0">
+                <a:latin typeface="Times New Roman" panose="02020603050405020304" pitchFamily="18" charset="0"/>
+                <a:cs typeface="Times New Roman" panose="02020603050405020304" pitchFamily="18" charset="0"/>
+              </a:rPr>
+              <a:t>MIPS</a:t>
             </a:r>
             <a:endParaRPr lang="en-SG" sz="2800" dirty="0">
               <a:latin typeface="Times New Roman" panose="02020603050405020304" pitchFamily="18" charset="0"/>
@@ -32986,8 +34639,8 @@
           </a:p>
         </p:txBody>
       </p:sp>
-      <mc:AlternateContent xmlns:mc="http://schemas.openxmlformats.org/markup-compatibility/2006">
-        <mc:Choice xmlns:a14="http://schemas.microsoft.com/office/drawing/2010/main" Requires="a14">
+      <mc:AlternateContent xmlns:mc="http://schemas.openxmlformats.org/markup-compatibility/2006" xmlns:a14="http://schemas.microsoft.com/office/drawing/2010/main">
+        <mc:Choice Requires="a14">
           <p:sp>
             <p:nvSpPr>
               <p:cNvPr id="18" name="Content Placeholder 2"/>
@@ -33160,7 +34813,7 @@
                       <m:sSubPr>
                         <m:ctrlPr>
                           <a:rPr lang="en-US" sz="2800" i="1">
-                            <a:latin typeface="Cambria Math" charset="0"/>
+                            <a:latin typeface="Cambria Math" panose="02040503050406030204" pitchFamily="18" charset="0"/>
                             <a:cs typeface="Times New Roman" panose="02020603050405020304" pitchFamily="18" charset="0"/>
                           </a:rPr>
                         </m:ctrlPr>
@@ -33277,7 +34930,7 @@
             </p:txBody>
           </p:sp>
         </mc:Choice>
-        <mc:Fallback>
+        <mc:Fallback xmlns="">
           <p:sp>
             <p:nvSpPr>
               <p:cNvPr id="18" name="Content Placeholder 2"/>
@@ -33450,8 +35103,8 @@
           </a:p>
         </p:txBody>
       </p:sp>
-      <mc:AlternateContent xmlns:mc="http://schemas.openxmlformats.org/markup-compatibility/2006">
-        <mc:Choice xmlns:a14="http://schemas.microsoft.com/office/drawing/2010/main" Requires="a14">
+      <mc:AlternateContent xmlns:mc="http://schemas.openxmlformats.org/markup-compatibility/2006" xmlns:a14="http://schemas.microsoft.com/office/drawing/2010/main">
+        <mc:Choice Requires="a14">
           <p:sp>
             <p:nvSpPr>
               <p:cNvPr id="18" name="Content Placeholder 2"/>
@@ -33506,7 +35159,7 @@
                       <m:sSubPr>
                         <m:ctrlPr>
                           <a:rPr lang="en-US" sz="2800" b="0" i="1" smtClean="0">
-                            <a:latin typeface="Cambria Math" charset="0"/>
+                            <a:latin typeface="Cambria Math" panose="02040503050406030204" pitchFamily="18" charset="0"/>
                             <a:cs typeface="Times New Roman" panose="02020603050405020304" pitchFamily="18" charset="0"/>
                           </a:rPr>
                         </m:ctrlPr>
@@ -33550,7 +35203,7 @@
                         <m:endChr m:val="|"/>
                         <m:ctrlPr>
                           <a:rPr lang="en-US" sz="2800" b="0" i="1" smtClean="0">
-                            <a:latin typeface="Cambria Math" charset="0"/>
+                            <a:latin typeface="Cambria Math" panose="02040503050406030204" pitchFamily="18" charset="0"/>
                             <a:cs typeface="Times New Roman" panose="02020603050405020304" pitchFamily="18" charset="0"/>
                           </a:rPr>
                         </m:ctrlPr>
@@ -33560,7 +35213,7 @@
                           <m:sSubPr>
                             <m:ctrlPr>
                               <a:rPr lang="en-US" sz="2800" b="0" i="1" smtClean="0">
-                                <a:latin typeface="Cambria Math" charset="0"/>
+                                <a:latin typeface="Cambria Math" panose="02040503050406030204" pitchFamily="18" charset="0"/>
                                 <a:cs typeface="Times New Roman" panose="02020603050405020304" pitchFamily="18" charset="0"/>
                               </a:rPr>
                             </m:ctrlPr>
@@ -33651,7 +35304,7 @@
                       <m:sSubPr>
                         <m:ctrlPr>
                           <a:rPr lang="en-US" sz="2800" b="0" i="1" smtClean="0">
-                            <a:latin typeface="Cambria Math" charset="0"/>
+                            <a:latin typeface="Cambria Math" panose="02040503050406030204" pitchFamily="18" charset="0"/>
                             <a:cs typeface="Times New Roman" panose="02020603050405020304" pitchFamily="18" charset="0"/>
                           </a:rPr>
                         </m:ctrlPr>
@@ -33706,7 +35359,7 @@
                       <m:dPr>
                         <m:ctrlPr>
                           <a:rPr lang="en-US" sz="2800" i="1">
-                            <a:latin typeface="Cambria Math" charset="0"/>
+                            <a:latin typeface="Cambria Math" panose="02040503050406030204" pitchFamily="18" charset="0"/>
                           </a:rPr>
                         </m:ctrlPr>
                       </m:dPr>
@@ -33717,7 +35370,7 @@
                             <m:endChr m:val="|"/>
                             <m:ctrlPr>
                               <a:rPr lang="en-US" sz="2800" b="0" i="1" smtClean="0">
-                                <a:latin typeface="Cambria Math" charset="0"/>
+                                <a:latin typeface="Cambria Math" panose="02040503050406030204" pitchFamily="18" charset="0"/>
                               </a:rPr>
                             </m:ctrlPr>
                           </m:dPr>
@@ -33726,7 +35379,7 @@
                               <m:sSubPr>
                                 <m:ctrlPr>
                                   <a:rPr lang="en-US" sz="2800" b="0" i="1" smtClean="0">
-                                    <a:latin typeface="Cambria Math" charset="0"/>
+                                    <a:latin typeface="Cambria Math" panose="02040503050406030204" pitchFamily="18" charset="0"/>
                                   </a:rPr>
                                 </m:ctrlPr>
                               </m:sSubPr>
@@ -33773,7 +35426,7 @@
                             <m:endChr m:val="|"/>
                             <m:ctrlPr>
                               <a:rPr lang="en-US" sz="2800" b="0" i="1" smtClean="0">
-                                <a:latin typeface="Cambria Math" charset="0"/>
+                                <a:latin typeface="Cambria Math" panose="02040503050406030204" pitchFamily="18" charset="0"/>
                               </a:rPr>
                             </m:ctrlPr>
                           </m:dPr>
@@ -33782,7 +35435,7 @@
                               <m:sSubPr>
                                 <m:ctrlPr>
                                   <a:rPr lang="en-US" sz="2800" b="0" i="1" smtClean="0">
-                                    <a:latin typeface="Cambria Math" charset="0"/>
+                                    <a:latin typeface="Cambria Math" panose="02040503050406030204" pitchFamily="18" charset="0"/>
                                   </a:rPr>
                                 </m:ctrlPr>
                               </m:sSubPr>
@@ -33815,7 +35468,7 @@
                           <m:funcPr>
                             <m:ctrlPr>
                               <a:rPr lang="en-US" sz="2800" i="1">
-                                <a:latin typeface="Cambria Math" charset="0"/>
+                                <a:latin typeface="Cambria Math" panose="02040503050406030204" pitchFamily="18" charset="0"/>
                               </a:rPr>
                             </m:ctrlPr>
                           </m:funcPr>
@@ -33835,7 +35488,7 @@
                               <m:dPr>
                                 <m:ctrlPr>
                                   <a:rPr lang="en-US" sz="2800" b="0" i="1" smtClean="0">
-                                    <a:latin typeface="Cambria Math" charset="0"/>
+                                    <a:latin typeface="Cambria Math" panose="02040503050406030204" pitchFamily="18" charset="0"/>
                                   </a:rPr>
                                 </m:ctrlPr>
                               </m:dPr>
@@ -33846,7 +35499,7 @@
                                     <m:endChr m:val="|"/>
                                     <m:ctrlPr>
                                       <a:rPr lang="en-US" sz="2800" b="0" i="1" smtClean="0">
-                                        <a:latin typeface="Cambria Math" charset="0"/>
+                                        <a:latin typeface="Cambria Math" panose="02040503050406030204" pitchFamily="18" charset="0"/>
                                       </a:rPr>
                                     </m:ctrlPr>
                                   </m:dPr>
@@ -33855,7 +35508,7 @@
                                       <m:sSubPr>
                                         <m:ctrlPr>
                                           <a:rPr lang="en-US" sz="2800" b="0" i="1" smtClean="0">
-                                            <a:latin typeface="Cambria Math" charset="0"/>
+                                            <a:latin typeface="Cambria Math" panose="02040503050406030204" pitchFamily="18" charset="0"/>
                                           </a:rPr>
                                         </m:ctrlPr>
                                       </m:sSubPr>
@@ -33919,7 +35572,7 @@
             </p:txBody>
           </p:sp>
         </mc:Choice>
-        <mc:Fallback>
+        <mc:Fallback xmlns="">
           <p:sp>
             <p:nvSpPr>
               <p:cNvPr id="18" name="Content Placeholder 2"/>
@@ -34045,11 +35698,7 @@
           <a:p>
             <a:r>
               <a:rPr lang="en-US" sz="2800" dirty="0" smtClean="0"/>
-              <a:t>Idea: </a:t>
-            </a:r>
-            <a:r>
-              <a:rPr lang="en-US" sz="2800" dirty="0" smtClean="0"/>
-              <a:t>Sequential Scanning with Upper-Bound</a:t>
+              <a:t>Idea: Sequential Scanning with Upper-Bound</a:t>
             </a:r>
             <a:endParaRPr lang="en-US" sz="2800" dirty="0"/>
           </a:p>
@@ -34209,7 +35858,7 @@
                         <m:sSupPr>
                           <m:ctrlPr>
                             <a:rPr lang="en-US" b="0" i="1" smtClean="0">
-                              <a:latin typeface="Cambria Math" charset="0"/>
+                              <a:latin typeface="Cambria Math" panose="02040503050406030204" pitchFamily="18" charset="0"/>
                             </a:rPr>
                           </m:ctrlPr>
                         </m:sSupPr>
@@ -34248,7 +35897,7 @@
                           <m:endChr m:val="|"/>
                           <m:ctrlPr>
                             <a:rPr lang="en-US" b="0" i="1" smtClean="0">
-                              <a:latin typeface="Cambria Math" charset="0"/>
+                              <a:latin typeface="Cambria Math" panose="02040503050406030204" pitchFamily="18" charset="0"/>
                             </a:rPr>
                           </m:ctrlPr>
                         </m:dPr>
@@ -34259,7 +35908,7 @@
                               <m:endChr m:val="|"/>
                               <m:ctrlPr>
                                 <a:rPr lang="en-US" b="0" i="1" smtClean="0">
-                                  <a:latin typeface="Cambria Math" charset="0"/>
+                                  <a:latin typeface="Cambria Math" panose="02040503050406030204" pitchFamily="18" charset="0"/>
                                 </a:rPr>
                               </m:ctrlPr>
                             </m:dPr>
@@ -34286,7 +35935,7 @@
                           <m:endChr m:val="|"/>
                           <m:ctrlPr>
                             <a:rPr lang="en-US" b="0" i="1" smtClean="0">
-                              <a:latin typeface="Cambria Math" charset="0"/>
+                              <a:latin typeface="Cambria Math" panose="02040503050406030204" pitchFamily="18" charset="0"/>
                             </a:rPr>
                           </m:ctrlPr>
                         </m:dPr>
@@ -34297,7 +35946,7 @@
                               <m:endChr m:val="|"/>
                               <m:ctrlPr>
                                 <a:rPr lang="en-US" b="0" i="1" smtClean="0">
-                                  <a:latin typeface="Cambria Math" charset="0"/>
+                                  <a:latin typeface="Cambria Math" panose="02040503050406030204" pitchFamily="18" charset="0"/>
                                 </a:rPr>
                               </m:ctrlPr>
                             </m:dPr>
@@ -34511,11 +36160,11 @@
   <p:clrMapOvr>
     <a:masterClrMapping/>
   </p:clrMapOvr>
-  <mc:AlternateContent xmlns:mc="http://schemas.openxmlformats.org/markup-compatibility/2006">
-    <mc:Choice xmlns:p14="http://schemas.microsoft.com/office/powerpoint/2010/main" Requires="p14">
+  <mc:AlternateContent xmlns:mc="http://schemas.openxmlformats.org/markup-compatibility/2006" xmlns:p14="http://schemas.microsoft.com/office/powerpoint/2010/main">
+    <mc:Choice Requires="p14">
       <p:transition spd="slow" p14:dur="2000"/>
     </mc:Choice>
-    <mc:Fallback>
+    <mc:Fallback xmlns="">
       <p:transition spd="slow"/>
     </mc:Fallback>
   </mc:AlternateContent>
@@ -34568,11 +36217,7 @@
           <a:p>
             <a:r>
               <a:rPr lang="en-US" sz="2800" dirty="0" smtClean="0"/>
-              <a:t>Idea: </a:t>
-            </a:r>
-            <a:r>
-              <a:rPr lang="en-US" sz="2800" dirty="0" smtClean="0"/>
-              <a:t>Sampling</a:t>
+              <a:t>Idea: Sampling</a:t>
             </a:r>
             <a:endParaRPr lang="en-US" sz="2800" dirty="0"/>
           </a:p>
@@ -34673,11 +36318,11 @@
   <p:clrMapOvr>
     <a:masterClrMapping/>
   </p:clrMapOvr>
-  <mc:AlternateContent xmlns:mc="http://schemas.openxmlformats.org/markup-compatibility/2006">
-    <mc:Choice xmlns:p14="http://schemas.microsoft.com/office/powerpoint/2010/main" Requires="p14">
+  <mc:AlternateContent xmlns:mc="http://schemas.openxmlformats.org/markup-compatibility/2006" xmlns:p14="http://schemas.microsoft.com/office/powerpoint/2010/main">
+    <mc:Choice Requires="p14">
       <p:transition spd="slow" p14:dur="2000"/>
     </mc:Choice>
-    <mc:Fallback>
+    <mc:Fallback xmlns="">
       <p:transition spd="slow"/>
     </mc:Fallback>
   </mc:AlternateContent>
@@ -34953,11 +36598,7 @@
           <a:p>
             <a:r>
               <a:rPr lang="en-US" sz="2800" kern="0" dirty="0" smtClean="0"/>
-              <a:t>Idea: </a:t>
-            </a:r>
-            <a:r>
-              <a:rPr lang="en-US" sz="2800" kern="0" dirty="0" smtClean="0"/>
-              <a:t>Sampling</a:t>
+              <a:t>Idea: Sampling</a:t>
             </a:r>
             <a:endParaRPr lang="en-US" sz="2800" kern="0" dirty="0"/>
           </a:p>
@@ -35003,11 +36644,11 @@
   <p:clrMapOvr>
     <a:masterClrMapping/>
   </p:clrMapOvr>
-  <mc:AlternateContent xmlns:mc="http://schemas.openxmlformats.org/markup-compatibility/2006">
-    <mc:Choice xmlns:p14="http://schemas.microsoft.com/office/powerpoint/2010/main" Requires="p14">
+  <mc:AlternateContent xmlns:mc="http://schemas.openxmlformats.org/markup-compatibility/2006" xmlns:p14="http://schemas.microsoft.com/office/powerpoint/2010/main">
+    <mc:Choice Requires="p14">
       <p:transition spd="slow" p14:dur="2000"/>
     </mc:Choice>
-    <mc:Fallback>
+    <mc:Fallback xmlns="">
       <p:transition spd="slow"/>
     </mc:Fallback>
   </mc:AlternateContent>
@@ -35283,11 +36924,7 @@
           <a:p>
             <a:r>
               <a:rPr lang="en-US" sz="2800" kern="0" dirty="0" smtClean="0"/>
-              <a:t>Idea: </a:t>
-            </a:r>
-            <a:r>
-              <a:rPr lang="en-US" sz="2800" kern="0" dirty="0" smtClean="0"/>
-              <a:t>Sampling</a:t>
+              <a:t>Idea: Sampling</a:t>
             </a:r>
             <a:endParaRPr lang="en-US" sz="2800" kern="0" dirty="0"/>
           </a:p>
@@ -35333,11 +36970,11 @@
   <p:clrMapOvr>
     <a:masterClrMapping/>
   </p:clrMapOvr>
-  <mc:AlternateContent xmlns:mc="http://schemas.openxmlformats.org/markup-compatibility/2006">
-    <mc:Choice xmlns:p14="http://schemas.microsoft.com/office/powerpoint/2010/main" Requires="p14">
+  <mc:AlternateContent xmlns:mc="http://schemas.openxmlformats.org/markup-compatibility/2006" xmlns:p14="http://schemas.microsoft.com/office/powerpoint/2010/main">
+    <mc:Choice Requires="p14">
       <p:transition spd="slow" p14:dur="2000"/>
     </mc:Choice>
-    <mc:Fallback>
+    <mc:Fallback xmlns="">
       <p:transition spd="slow"/>
     </mc:Fallback>
   </mc:AlternateContent>
@@ -35870,11 +37507,7 @@
           <a:p>
             <a:r>
               <a:rPr lang="en-US" sz="2800" kern="0" dirty="0" smtClean="0"/>
-              <a:t>Idea: </a:t>
-            </a:r>
-            <a:r>
-              <a:rPr lang="en-US" sz="2800" kern="0" dirty="0" smtClean="0"/>
-              <a:t>Sampling</a:t>
+              <a:t>Idea: Sampling</a:t>
             </a:r>
             <a:endParaRPr lang="en-US" sz="2800" kern="0" dirty="0"/>
           </a:p>
@@ -35920,11 +37553,11 @@
   <p:clrMapOvr>
     <a:masterClrMapping/>
   </p:clrMapOvr>
-  <mc:AlternateContent xmlns:mc="http://schemas.openxmlformats.org/markup-compatibility/2006">
-    <mc:Choice xmlns:p14="http://schemas.microsoft.com/office/powerpoint/2010/main" Requires="p14">
+  <mc:AlternateContent xmlns:mc="http://schemas.openxmlformats.org/markup-compatibility/2006" xmlns:p14="http://schemas.microsoft.com/office/powerpoint/2010/main">
+    <mc:Choice Requires="p14">
       <p:transition spd="slow" p14:dur="2000"/>
     </mc:Choice>
-    <mc:Fallback>
+    <mc:Fallback xmlns="">
       <p:transition spd="slow"/>
     </mc:Fallback>
   </mc:AlternateContent>
@@ -37159,11 +38792,7 @@
             </a:r>
             <a:r>
               <a:rPr lang="en-US" sz="2800" kern="0" dirty="0" smtClean="0"/>
-              <a:t> </a:t>
-            </a:r>
-            <a:r>
-              <a:rPr lang="en-US" sz="2800" kern="0" dirty="0" smtClean="0"/>
-              <a:t>Representation</a:t>
+              <a:t> Representation</a:t>
             </a:r>
             <a:endParaRPr lang="en-US" sz="2800" kern="0" dirty="0"/>
           </a:p>
@@ -38688,7 +40317,7 @@
                         <m:sSupPr>
                           <m:ctrlPr>
                             <a:rPr lang="en-US" b="0" i="1" dirty="0" smtClean="0">
-                              <a:latin typeface="Cambria Math" charset="0"/>
+                              <a:latin typeface="Cambria Math" panose="02040503050406030204" pitchFamily="18" charset="0"/>
                             </a:rPr>
                           </m:ctrlPr>
                         </m:sSupPr>
@@ -39021,7 +40650,7 @@
                         <m:sSubPr>
                           <m:ctrlPr>
                             <a:rPr lang="en-US" b="0" i="1" dirty="0" smtClean="0">
-                              <a:latin typeface="Cambria Math" charset="0"/>
+                              <a:latin typeface="Cambria Math" panose="02040503050406030204" pitchFamily="18" charset="0"/>
                             </a:rPr>
                           </m:ctrlPr>
                         </m:sSubPr>
@@ -39490,7 +41119,7 @@
                         <m:sSubPr>
                           <m:ctrlPr>
                             <a:rPr lang="en-US" b="0" i="1" dirty="0" smtClean="0">
-                              <a:latin typeface="Cambria Math" charset="0"/>
+                              <a:latin typeface="Cambria Math" panose="02040503050406030204" pitchFamily="18" charset="0"/>
                             </a:rPr>
                           </m:ctrlPr>
                         </m:sSubPr>
@@ -39647,7 +41276,7 @@
                       <m:sSubPr>
                         <m:ctrlPr>
                           <a:rPr lang="en-US" b="0" i="1" dirty="0" smtClean="0">
-                            <a:latin typeface="Cambria Math" charset="0"/>
+                            <a:latin typeface="Cambria Math" panose="02040503050406030204" pitchFamily="18" charset="0"/>
                           </a:rPr>
                         </m:ctrlPr>
                       </m:sSubPr>
@@ -40078,7 +41707,7 @@
                               <a:solidFill>
                                 <a:srgbClr val="002060"/>
                               </a:solidFill>
-                              <a:latin typeface="Cambria Math" charset="0"/>
+                              <a:latin typeface="Cambria Math" panose="02040503050406030204" pitchFamily="18" charset="0"/>
                             </a:rPr>
                           </m:ctrlPr>
                         </m:sSubPr>
@@ -40118,7 +41747,7 @@
                               <a:solidFill>
                                 <a:srgbClr val="002060"/>
                               </a:solidFill>
-                              <a:latin typeface="Cambria Math" charset="0"/>
+                              <a:latin typeface="Cambria Math" panose="02040503050406030204" pitchFamily="18" charset="0"/>
                             </a:rPr>
                           </m:ctrlPr>
                         </m:dPr>
@@ -40150,7 +41779,7 @@
                               <a:solidFill>
                                 <a:srgbClr val="002060"/>
                               </a:solidFill>
-                              <a:latin typeface="Cambria Math" charset="0"/>
+                              <a:latin typeface="Cambria Math" panose="02040503050406030204" pitchFamily="18" charset="0"/>
                             </a:rPr>
                           </m:ctrlPr>
                         </m:sSubSupPr>
@@ -40195,7 +41824,7 @@
                               <a:solidFill>
                                 <a:srgbClr val="002060"/>
                               </a:solidFill>
-                              <a:latin typeface="Cambria Math" charset="0"/>
+                              <a:latin typeface="Cambria Math" panose="02040503050406030204" pitchFamily="18" charset="0"/>
                             </a:rPr>
                           </m:ctrlPr>
                         </m:sSubPr>
@@ -42196,7 +43825,7 @@
                       <m:sSubPr>
                         <m:ctrlPr>
                           <a:rPr lang="en-US" sz="2400" b="0" i="1" smtClean="0">
-                            <a:latin typeface="Cambria Math" charset="0"/>
+                            <a:latin typeface="Cambria Math" panose="02040503050406030204" pitchFamily="18" charset="0"/>
                           </a:rPr>
                         </m:ctrlPr>
                       </m:sSubPr>
@@ -42338,7 +43967,7 @@
                       <m:funcPr>
                         <m:ctrlPr>
                           <a:rPr lang="en-US" sz="2400" b="1" i="1" smtClean="0">
-                            <a:latin typeface="Cambria Math" charset="0"/>
+                            <a:latin typeface="Cambria Math" panose="02040503050406030204" pitchFamily="18" charset="0"/>
                           </a:rPr>
                         </m:ctrlPr>
                       </m:funcPr>
@@ -42469,7 +44098,7 @@
                       <m:funcPr>
                         <m:ctrlPr>
                           <a:rPr lang="en-US" sz="2400" b="0" i="1" smtClean="0">
-                            <a:latin typeface="Cambria Math" charset="0"/>
+                            <a:latin typeface="Cambria Math" panose="02040503050406030204" pitchFamily="18" charset="0"/>
                           </a:rPr>
                         </m:ctrlPr>
                       </m:funcPr>
@@ -42758,7 +44387,7 @@
                         <m:sSubPr>
                           <m:ctrlPr>
                             <a:rPr lang="en-US" b="0" i="1" dirty="0" smtClean="0">
-                              <a:latin typeface="Cambria Math" charset="0"/>
+                              <a:latin typeface="Cambria Math" panose="02040503050406030204" pitchFamily="18" charset="0"/>
                             </a:rPr>
                           </m:ctrlPr>
                         </m:sSubPr>
@@ -43075,7 +44704,7 @@
                         <m:sSubPr>
                           <m:ctrlPr>
                             <a:rPr lang="en-US" b="0" i="1" dirty="0" smtClean="0">
-                              <a:latin typeface="Cambria Math" charset="0"/>
+                              <a:latin typeface="Cambria Math" panose="02040503050406030204" pitchFamily="18" charset="0"/>
                             </a:rPr>
                           </m:ctrlPr>
                         </m:sSubPr>
@@ -43232,7 +44861,7 @@
                       <m:sSubPr>
                         <m:ctrlPr>
                           <a:rPr lang="en-US" b="0" i="1" dirty="0" smtClean="0">
-                            <a:latin typeface="Cambria Math" charset="0"/>
+                            <a:latin typeface="Cambria Math" panose="02040503050406030204" pitchFamily="18" charset="0"/>
                           </a:rPr>
                         </m:ctrlPr>
                       </m:sSubPr>
@@ -43541,7 +45170,7 @@
                               <a:solidFill>
                                 <a:srgbClr val="002060"/>
                               </a:solidFill>
-                              <a:latin typeface="Cambria Math" charset="0"/>
+                              <a:latin typeface="Cambria Math" panose="02040503050406030204" pitchFamily="18" charset="0"/>
                             </a:rPr>
                           </m:ctrlPr>
                         </m:sSubPr>
@@ -43581,7 +45210,7 @@
                               <a:solidFill>
                                 <a:srgbClr val="002060"/>
                               </a:solidFill>
-                              <a:latin typeface="Cambria Math" charset="0"/>
+                              <a:latin typeface="Cambria Math" panose="02040503050406030204" pitchFamily="18" charset="0"/>
                             </a:rPr>
                           </m:ctrlPr>
                         </m:dPr>
@@ -43613,7 +45242,7 @@
                               <a:solidFill>
                                 <a:srgbClr val="002060"/>
                               </a:solidFill>
-                              <a:latin typeface="Cambria Math" charset="0"/>
+                              <a:latin typeface="Cambria Math" panose="02040503050406030204" pitchFamily="18" charset="0"/>
                             </a:rPr>
                           </m:ctrlPr>
                         </m:sSubSupPr>
@@ -43658,7 +45287,7 @@
                               <a:solidFill>
                                 <a:srgbClr val="002060"/>
                               </a:solidFill>
-                              <a:latin typeface="Cambria Math" charset="0"/>
+                              <a:latin typeface="Cambria Math" panose="02040503050406030204" pitchFamily="18" charset="0"/>
                             </a:rPr>
                           </m:ctrlPr>
                         </m:sSubPr>

</xml_diff>